<commit_message>
Fragen zu projekt proposal und powerpoint erstmal gespeichert
</commit_message>
<xml_diff>
--- a/Project Proposal Ben.pptx
+++ b/Project Proposal Ben.pptx
@@ -8,8 +8,10 @@
     <p:sldId id="256" r:id="rId2"/>
     <p:sldId id="257" r:id="rId3"/>
     <p:sldId id="258" r:id="rId4"/>
-    <p:sldId id="259" r:id="rId5"/>
+    <p:sldId id="261" r:id="rId5"/>
     <p:sldId id="260" r:id="rId6"/>
+    <p:sldId id="262" r:id="rId7"/>
+    <p:sldId id="259" r:id="rId8"/>
   </p:sldIdLst>
   <p:sldSz cx="12192000" cy="6858000"/>
   <p:notesSz cx="6858000" cy="9144000"/>
@@ -265,7 +267,7 @@
           <a:p>
             <a:fld id="{AEE46315-4AAD-410B-89FA-21C15CCB14A3}" type="datetimeFigureOut">
               <a:rPr lang="de-DE" smtClean="0"/>
-              <a:t>10.05.2025</a:t>
+              <a:t>11.05.2025</a:t>
             </a:fld>
             <a:endParaRPr lang="de-DE"/>
           </a:p>
@@ -319,7 +321,7 @@
           <a:p>
             <a:fld id="{76CD8E94-8180-4651-B6B5-5A5ABA3C85A7}" type="slidenum">
               <a:rPr lang="de-DE" smtClean="0"/>
-              <a:t>‹Nr.›</a:t>
+              <a:t>‹#›</a:t>
             </a:fld>
             <a:endParaRPr lang="de-DE"/>
           </a:p>
@@ -465,7 +467,7 @@
           <a:p>
             <a:fld id="{AEE46315-4AAD-410B-89FA-21C15CCB14A3}" type="datetimeFigureOut">
               <a:rPr lang="de-DE" smtClean="0"/>
-              <a:t>10.05.2025</a:t>
+              <a:t>11.05.2025</a:t>
             </a:fld>
             <a:endParaRPr lang="de-DE"/>
           </a:p>
@@ -519,7 +521,7 @@
           <a:p>
             <a:fld id="{76CD8E94-8180-4651-B6B5-5A5ABA3C85A7}" type="slidenum">
               <a:rPr lang="de-DE" smtClean="0"/>
-              <a:t>‹Nr.›</a:t>
+              <a:t>‹#›</a:t>
             </a:fld>
             <a:endParaRPr lang="de-DE"/>
           </a:p>
@@ -675,7 +677,7 @@
           <a:p>
             <a:fld id="{AEE46315-4AAD-410B-89FA-21C15CCB14A3}" type="datetimeFigureOut">
               <a:rPr lang="de-DE" smtClean="0"/>
-              <a:t>10.05.2025</a:t>
+              <a:t>11.05.2025</a:t>
             </a:fld>
             <a:endParaRPr lang="de-DE"/>
           </a:p>
@@ -729,7 +731,7 @@
           <a:p>
             <a:fld id="{76CD8E94-8180-4651-B6B5-5A5ABA3C85A7}" type="slidenum">
               <a:rPr lang="de-DE" smtClean="0"/>
-              <a:t>‹Nr.›</a:t>
+              <a:t>‹#›</a:t>
             </a:fld>
             <a:endParaRPr lang="de-DE"/>
           </a:p>
@@ -875,7 +877,7 @@
           <a:p>
             <a:fld id="{AEE46315-4AAD-410B-89FA-21C15CCB14A3}" type="datetimeFigureOut">
               <a:rPr lang="de-DE" smtClean="0"/>
-              <a:t>10.05.2025</a:t>
+              <a:t>11.05.2025</a:t>
             </a:fld>
             <a:endParaRPr lang="de-DE"/>
           </a:p>
@@ -929,7 +931,7 @@
           <a:p>
             <a:fld id="{76CD8E94-8180-4651-B6B5-5A5ABA3C85A7}" type="slidenum">
               <a:rPr lang="de-DE" smtClean="0"/>
-              <a:t>‹Nr.›</a:t>
+              <a:t>‹#›</a:t>
             </a:fld>
             <a:endParaRPr lang="de-DE"/>
           </a:p>
@@ -1151,7 +1153,7 @@
           <a:p>
             <a:fld id="{AEE46315-4AAD-410B-89FA-21C15CCB14A3}" type="datetimeFigureOut">
               <a:rPr lang="de-DE" smtClean="0"/>
-              <a:t>10.05.2025</a:t>
+              <a:t>11.05.2025</a:t>
             </a:fld>
             <a:endParaRPr lang="de-DE"/>
           </a:p>
@@ -1205,7 +1207,7 @@
           <a:p>
             <a:fld id="{76CD8E94-8180-4651-B6B5-5A5ABA3C85A7}" type="slidenum">
               <a:rPr lang="de-DE" smtClean="0"/>
-              <a:t>‹Nr.›</a:t>
+              <a:t>‹#›</a:t>
             </a:fld>
             <a:endParaRPr lang="de-DE"/>
           </a:p>
@@ -1419,7 +1421,7 @@
           <a:p>
             <a:fld id="{AEE46315-4AAD-410B-89FA-21C15CCB14A3}" type="datetimeFigureOut">
               <a:rPr lang="de-DE" smtClean="0"/>
-              <a:t>10.05.2025</a:t>
+              <a:t>11.05.2025</a:t>
             </a:fld>
             <a:endParaRPr lang="de-DE"/>
           </a:p>
@@ -1473,7 +1475,7 @@
           <a:p>
             <a:fld id="{76CD8E94-8180-4651-B6B5-5A5ABA3C85A7}" type="slidenum">
               <a:rPr lang="de-DE" smtClean="0"/>
-              <a:t>‹Nr.›</a:t>
+              <a:t>‹#›</a:t>
             </a:fld>
             <a:endParaRPr lang="de-DE"/>
           </a:p>
@@ -1834,7 +1836,7 @@
           <a:p>
             <a:fld id="{AEE46315-4AAD-410B-89FA-21C15CCB14A3}" type="datetimeFigureOut">
               <a:rPr lang="de-DE" smtClean="0"/>
-              <a:t>10.05.2025</a:t>
+              <a:t>11.05.2025</a:t>
             </a:fld>
             <a:endParaRPr lang="de-DE"/>
           </a:p>
@@ -1888,7 +1890,7 @@
           <a:p>
             <a:fld id="{76CD8E94-8180-4651-B6B5-5A5ABA3C85A7}" type="slidenum">
               <a:rPr lang="de-DE" smtClean="0"/>
-              <a:t>‹Nr.›</a:t>
+              <a:t>‹#›</a:t>
             </a:fld>
             <a:endParaRPr lang="de-DE"/>
           </a:p>
@@ -1976,7 +1978,7 @@
           <a:p>
             <a:fld id="{AEE46315-4AAD-410B-89FA-21C15CCB14A3}" type="datetimeFigureOut">
               <a:rPr lang="de-DE" smtClean="0"/>
-              <a:t>10.05.2025</a:t>
+              <a:t>11.05.2025</a:t>
             </a:fld>
             <a:endParaRPr lang="de-DE"/>
           </a:p>
@@ -2030,7 +2032,7 @@
           <a:p>
             <a:fld id="{76CD8E94-8180-4651-B6B5-5A5ABA3C85A7}" type="slidenum">
               <a:rPr lang="de-DE" smtClean="0"/>
-              <a:t>‹Nr.›</a:t>
+              <a:t>‹#›</a:t>
             </a:fld>
             <a:endParaRPr lang="de-DE"/>
           </a:p>
@@ -2089,7 +2091,7 @@
           <a:p>
             <a:fld id="{AEE46315-4AAD-410B-89FA-21C15CCB14A3}" type="datetimeFigureOut">
               <a:rPr lang="de-DE" smtClean="0"/>
-              <a:t>10.05.2025</a:t>
+              <a:t>11.05.2025</a:t>
             </a:fld>
             <a:endParaRPr lang="de-DE"/>
           </a:p>
@@ -2143,7 +2145,7 @@
           <a:p>
             <a:fld id="{76CD8E94-8180-4651-B6B5-5A5ABA3C85A7}" type="slidenum">
               <a:rPr lang="de-DE" smtClean="0"/>
-              <a:t>‹Nr.›</a:t>
+              <a:t>‹#›</a:t>
             </a:fld>
             <a:endParaRPr lang="de-DE"/>
           </a:p>
@@ -2402,7 +2404,7 @@
           <a:p>
             <a:fld id="{AEE46315-4AAD-410B-89FA-21C15CCB14A3}" type="datetimeFigureOut">
               <a:rPr lang="de-DE" smtClean="0"/>
-              <a:t>10.05.2025</a:t>
+              <a:t>11.05.2025</a:t>
             </a:fld>
             <a:endParaRPr lang="de-DE"/>
           </a:p>
@@ -2456,7 +2458,7 @@
           <a:p>
             <a:fld id="{76CD8E94-8180-4651-B6B5-5A5ABA3C85A7}" type="slidenum">
               <a:rPr lang="de-DE" smtClean="0"/>
-              <a:t>‹Nr.›</a:t>
+              <a:t>‹#›</a:t>
             </a:fld>
             <a:endParaRPr lang="de-DE"/>
           </a:p>
@@ -2691,7 +2693,7 @@
           <a:p>
             <a:fld id="{AEE46315-4AAD-410B-89FA-21C15CCB14A3}" type="datetimeFigureOut">
               <a:rPr lang="de-DE" smtClean="0"/>
-              <a:t>10.05.2025</a:t>
+              <a:t>11.05.2025</a:t>
             </a:fld>
             <a:endParaRPr lang="de-DE"/>
           </a:p>
@@ -2745,7 +2747,7 @@
           <a:p>
             <a:fld id="{76CD8E94-8180-4651-B6B5-5A5ABA3C85A7}" type="slidenum">
               <a:rPr lang="de-DE" smtClean="0"/>
-              <a:t>‹Nr.›</a:t>
+              <a:t>‹#›</a:t>
             </a:fld>
             <a:endParaRPr lang="de-DE"/>
           </a:p>
@@ -2934,7 +2936,7 @@
           <a:p>
             <a:fld id="{AEE46315-4AAD-410B-89FA-21C15CCB14A3}" type="datetimeFigureOut">
               <a:rPr lang="de-DE" smtClean="0"/>
-              <a:t>10.05.2025</a:t>
+              <a:t>11.05.2025</a:t>
             </a:fld>
             <a:endParaRPr lang="de-DE"/>
           </a:p>
@@ -3024,7 +3026,7 @@
           <a:p>
             <a:fld id="{76CD8E94-8180-4651-B6B5-5A5ABA3C85A7}" type="slidenum">
               <a:rPr lang="de-DE" smtClean="0"/>
-              <a:t>‹Nr.›</a:t>
+              <a:t>‹#›</a:t>
             </a:fld>
             <a:endParaRPr lang="de-DE"/>
           </a:p>
@@ -3433,20 +3435,8 @@
           </a:p>
           <a:p>
             <a:r>
-              <a:rPr lang="en-GB" sz="1800" noProof="0"/>
-              <a:t>Julian Baureis, </a:t>
-            </a:r>
-            <a:r>
               <a:rPr lang="en-GB" sz="1800" noProof="0" dirty="0"/>
-              <a:t>Julia Ferdin</a:t>
-            </a:r>
-            <a:r>
-              <a:rPr lang="en-GB" sz="1800" noProof="0"/>
-              <a:t>, Benjamin </a:t>
-            </a:r>
-            <a:r>
-              <a:rPr lang="en-GB" sz="1800" noProof="0" dirty="0"/>
-              <a:t>Nicklas, Luisa Wintel</a:t>
+              <a:t>Julian Baureis, Julia Ferdin, Benjamin Nicklas, Luisa Wintel</a:t>
             </a:r>
           </a:p>
           <a:p>
@@ -3579,15 +3569,15 @@
           <a:lstStyle/>
           <a:p>
             <a:r>
-              <a:rPr lang="en-GB" dirty="0"/>
+              <a:rPr lang="en-GB" noProof="0" dirty="0"/>
               <a:t>Methode: RNA dependence (R-</a:t>
             </a:r>
             <a:r>
-              <a:rPr lang="en-GB" dirty="0" err="1"/>
+              <a:rPr lang="en-GB" noProof="0" dirty="0" err="1"/>
               <a:t>DeeP</a:t>
             </a:r>
             <a:r>
-              <a:rPr lang="en-GB" dirty="0"/>
+              <a:rPr lang="en-GB" noProof="0" dirty="0"/>
               <a:t>)</a:t>
             </a:r>
           </a:p>
@@ -3628,96 +3618,31 @@
           <p:cNvPr id="2" name="Title 1">
             <a:extLst>
               <a:ext uri="{FF2B5EF4-FFF2-40B4-BE49-F238E27FC236}">
-                <a16:creationId xmlns:a16="http://schemas.microsoft.com/office/drawing/2014/main" id="{7DDD5CD0-9213-6901-2300-795ABB73CF18}"/>
-              </a:ext>
-            </a:extLst>
-          </p:cNvPr>
-          <p:cNvSpPr>
-            <a:spLocks noGrp="1"/>
-          </p:cNvSpPr>
-          <p:nvPr>
-            <p:ph type="ctrTitle"/>
-          </p:nvPr>
-        </p:nvSpPr>
-        <p:spPr/>
-        <p:txBody>
-          <a:bodyPr/>
-          <a:lstStyle/>
-          <a:p>
-            <a:r>
-              <a:rPr lang="de-DE" dirty="0"/>
-              <a:t>Time Table</a:t>
-            </a:r>
-          </a:p>
-        </p:txBody>
-      </p:sp>
-      <p:sp>
-        <p:nvSpPr>
-          <p:cNvPr id="3" name="Subtitle 2">
-            <a:extLst>
-              <a:ext uri="{FF2B5EF4-FFF2-40B4-BE49-F238E27FC236}">
-                <a16:creationId xmlns:a16="http://schemas.microsoft.com/office/drawing/2014/main" id="{1690C50E-3847-EA70-3236-BCAA9B915E8E}"/>
-              </a:ext>
-            </a:extLst>
-          </p:cNvPr>
-          <p:cNvSpPr>
-            <a:spLocks noGrp="1"/>
-          </p:cNvSpPr>
-          <p:nvPr>
-            <p:ph type="subTitle" idx="1"/>
+                <a16:creationId xmlns:a16="http://schemas.microsoft.com/office/drawing/2014/main" id="{1C92489D-D876-496E-84EF-78B1EAEBF1DF}"/>
+              </a:ext>
+            </a:extLst>
+          </p:cNvPr>
+          <p:cNvSpPr>
+            <a:spLocks noGrp="1"/>
+          </p:cNvSpPr>
+          <p:nvPr>
+            <p:ph type="title"/>
           </p:nvPr>
         </p:nvSpPr>
         <p:spPr>
           <a:xfrm>
-            <a:off x="1524000" y="3602038"/>
-            <a:ext cx="9144000" cy="2941002"/>
+            <a:off x="838200" y="2766218"/>
+            <a:ext cx="10515600" cy="1325563"/>
           </a:xfrm>
         </p:spPr>
         <p:txBody>
-          <a:bodyPr>
-            <a:normAutofit lnSpcReduction="10000"/>
-          </a:bodyPr>
-          <a:lstStyle/>
-          <a:p>
-            <a:r>
-              <a:rPr lang="de-DE" dirty="0"/>
-              <a:t>19.05-25.05</a:t>
-            </a:r>
-          </a:p>
-          <a:p>
-            <a:r>
-              <a:rPr lang="de-DE" dirty="0"/>
-              <a:t>26.05-01.06</a:t>
-            </a:r>
-          </a:p>
-          <a:p>
-            <a:r>
-              <a:rPr lang="de-DE" dirty="0"/>
-              <a:t>02.06-08.06</a:t>
-            </a:r>
-          </a:p>
-          <a:p>
-            <a:r>
-              <a:rPr lang="de-DE" dirty="0"/>
-              <a:t>09.06-15.06</a:t>
-            </a:r>
-          </a:p>
-          <a:p>
-            <a:r>
-              <a:rPr lang="de-DE" dirty="0"/>
-              <a:t>16.06-22.06</a:t>
-            </a:r>
-          </a:p>
-          <a:p>
-            <a:r>
-              <a:rPr lang="de-DE" dirty="0"/>
-              <a:t>23.06-29.06</a:t>
-            </a:r>
-          </a:p>
-          <a:p>
-            <a:r>
-              <a:rPr lang="de-DE" dirty="0"/>
-              <a:t>30.06-06.07</a:t>
+          <a:bodyPr/>
+          <a:lstStyle/>
+          <a:p>
+            <a:pPr algn="ctr"/>
+            <a:r>
+              <a:rPr lang="en-GB" noProof="0" dirty="0"/>
+              <a:t>Which proteins in the non-synchronized HeLa cells are RNA-binding proteins?</a:t>
             </a:r>
           </a:p>
         </p:txBody>
@@ -3725,7 +3650,7 @@
     </p:spTree>
     <p:extLst>
       <p:ext uri="{BB962C8B-B14F-4D97-AF65-F5344CB8AC3E}">
-        <p14:creationId xmlns:p14="http://schemas.microsoft.com/office/powerpoint/2010/main" val="4114376445"/>
+        <p14:creationId xmlns:p14="http://schemas.microsoft.com/office/powerpoint/2010/main" val="2292762979"/>
       </p:ext>
     </p:extLst>
   </p:cSld>
@@ -3880,7 +3805,7 @@
           <a:p>
             <a:pPr algn="ctr"/>
             <a:r>
-              <a:rPr lang="en-GB" sz="2400" b="1" dirty="0">
+              <a:rPr lang="en-GB" sz="2400" b="1" noProof="0" dirty="0">
                 <a:solidFill>
                   <a:srgbClr val="1F2328"/>
                 </a:solidFill>
@@ -3949,7 +3874,7 @@
           <a:p>
             <a:pPr algn="ctr"/>
             <a:r>
-              <a:rPr lang="en-GB" sz="2400" b="1" dirty="0">
+              <a:rPr lang="en-GB" sz="2400" b="1" noProof="0" dirty="0">
                 <a:solidFill>
                   <a:srgbClr val="1F2328"/>
                 </a:solidFill>
@@ -4030,7 +3955,7 @@
           <a:p>
             <a:pPr algn="ctr"/>
             <a:r>
-              <a:rPr lang="en-GB" sz="1600" dirty="0"/>
+              <a:rPr lang="en-GB" sz="1600" noProof="0" dirty="0"/>
               <a:t>26.05-01.06</a:t>
             </a:r>
           </a:p>
@@ -4070,16 +3995,8 @@
           <a:p>
             <a:pPr algn="ctr"/>
             <a:r>
-              <a:rPr lang="en-GB" sz="1600" dirty="0"/>
-              <a:t>02.06-</a:t>
-            </a:r>
-            <a:r>
-              <a:rPr lang="de-DE" sz="1600" dirty="0"/>
-              <a:t>15</a:t>
-            </a:r>
-            <a:r>
-              <a:rPr lang="en-GB" sz="1600" dirty="0"/>
-              <a:t>.06</a:t>
+              <a:rPr lang="en-GB" sz="1600" noProof="0" dirty="0"/>
+              <a:t>02.06-15.06</a:t>
             </a:r>
           </a:p>
           <a:p>
@@ -4118,7 +4035,7 @@
           <a:p>
             <a:pPr algn="ctr"/>
             <a:r>
-              <a:rPr lang="de-DE" dirty="0"/>
+              <a:rPr lang="en-GB" noProof="0" dirty="0"/>
               <a:t>1. Week</a:t>
             </a:r>
           </a:p>
@@ -4154,7 +4071,7 @@
           <a:p>
             <a:pPr algn="ctr"/>
             <a:r>
-              <a:rPr lang="de-DE" dirty="0"/>
+              <a:rPr lang="en-GB" noProof="0" dirty="0"/>
               <a:t>2. Week</a:t>
             </a:r>
           </a:p>
@@ -4190,7 +4107,7 @@
           <a:p>
             <a:pPr algn="ctr"/>
             <a:r>
-              <a:rPr lang="de-DE" dirty="0"/>
+              <a:rPr lang="en-GB" noProof="0" dirty="0"/>
               <a:t>3./4. Week</a:t>
             </a:r>
           </a:p>
@@ -4229,7 +4146,7 @@
               <a:buChar char="•"/>
             </a:pPr>
             <a:r>
-              <a:rPr lang="en-US" b="0" i="0" dirty="0">
+              <a:rPr lang="en-GB" b="0" i="0" noProof="0" dirty="0">
                 <a:solidFill>
                   <a:srgbClr val="1F2328"/>
                 </a:solidFill>
@@ -4244,7 +4161,7 @@
               <a:buFont typeface="Arial" panose="020B0604020202020204" pitchFamily="34" charset="0"/>
               <a:buChar char="•"/>
             </a:pPr>
-            <a:endParaRPr lang="en-US" b="0" i="0" dirty="0">
+            <a:endParaRPr lang="en-GB" b="0" i="0" noProof="0" dirty="0">
               <a:solidFill>
                 <a:srgbClr val="1F2328"/>
               </a:solidFill>
@@ -4258,7 +4175,7 @@
               <a:buChar char="•"/>
             </a:pPr>
             <a:r>
-              <a:rPr lang="en-US" b="0" i="0" dirty="0">
+              <a:rPr lang="en-GB" b="0" i="0" noProof="0" dirty="0">
                 <a:solidFill>
                   <a:srgbClr val="1F2328"/>
                 </a:solidFill>
@@ -4273,7 +4190,7 @@
               <a:buFont typeface="Arial" panose="020B0604020202020204" pitchFamily="34" charset="0"/>
               <a:buChar char="•"/>
             </a:pPr>
-            <a:endParaRPr lang="en-US" b="0" i="0" dirty="0">
+            <a:endParaRPr lang="en-GB" b="0" i="0" noProof="0" dirty="0">
               <a:solidFill>
                 <a:srgbClr val="1F2328"/>
               </a:solidFill>
@@ -4287,7 +4204,7 @@
               <a:buChar char="•"/>
             </a:pPr>
             <a:r>
-              <a:rPr lang="en-US" b="0" i="0" dirty="0">
+              <a:rPr lang="en-GB" b="0" i="0" noProof="0" dirty="0">
                 <a:solidFill>
                   <a:srgbClr val="1F2328"/>
                 </a:solidFill>
@@ -4302,7 +4219,7 @@
               <a:buFont typeface="Arial" panose="020B0604020202020204" pitchFamily="34" charset="0"/>
               <a:buChar char="•"/>
             </a:pPr>
-            <a:endParaRPr lang="en-US" b="0" i="0" dirty="0">
+            <a:endParaRPr lang="en-GB" b="0" i="0" noProof="0" dirty="0">
               <a:solidFill>
                 <a:srgbClr val="1F2328"/>
               </a:solidFill>
@@ -4316,7 +4233,7 @@
               <a:buChar char="•"/>
             </a:pPr>
             <a:r>
-              <a:rPr lang="en-US" b="0" i="0" dirty="0">
+              <a:rPr lang="en-GB" b="0" i="0" noProof="0" dirty="0">
                 <a:solidFill>
                   <a:srgbClr val="1F2328"/>
                 </a:solidFill>
@@ -4327,7 +4244,7 @@
             </a:r>
           </a:p>
           <a:p>
-            <a:endParaRPr lang="de-DE" dirty="0"/>
+            <a:endParaRPr lang="en-GB" noProof="0" dirty="0"/>
           </a:p>
         </p:txBody>
       </p:sp>
@@ -4346,6 +4263,161 @@
         <p:spPr>
           <a:xfrm>
             <a:off x="4655820" y="4075331"/>
+            <a:ext cx="2880360" cy="2862322"/>
+          </a:xfrm>
+          <a:prstGeom prst="rect">
+            <a:avLst/>
+          </a:prstGeom>
+          <a:noFill/>
+        </p:spPr>
+        <p:txBody>
+          <a:bodyPr wrap="square" rtlCol="0">
+            <a:spAutoFit/>
+          </a:bodyPr>
+          <a:lstStyle/>
+          <a:p>
+            <a:pPr>
+              <a:buFont typeface="Arial" panose="020B0604020202020204" pitchFamily="34" charset="0"/>
+              <a:buChar char="•"/>
+            </a:pPr>
+            <a:r>
+              <a:rPr lang="en-GB" b="0" i="0" noProof="0" dirty="0">
+                <a:solidFill>
+                  <a:srgbClr val="1F2328"/>
+                </a:solidFill>
+                <a:effectLst/>
+                <a:latin typeface="-apple-system"/>
+              </a:rPr>
+              <a:t> inter-dependencies among samples etc.</a:t>
+            </a:r>
+          </a:p>
+          <a:p>
+            <a:pPr>
+              <a:buFont typeface="Arial" panose="020B0604020202020204" pitchFamily="34" charset="0"/>
+              <a:buChar char="•"/>
+            </a:pPr>
+            <a:endParaRPr lang="en-GB" b="0" i="0" noProof="0" dirty="0">
+              <a:solidFill>
+                <a:srgbClr val="1F2328"/>
+              </a:solidFill>
+              <a:effectLst/>
+              <a:latin typeface="-apple-system"/>
+            </a:endParaRPr>
+          </a:p>
+          <a:p>
+            <a:pPr algn="l">
+              <a:buFont typeface="Arial" panose="020B0604020202020204" pitchFamily="34" charset="0"/>
+              <a:buChar char="•"/>
+            </a:pPr>
+            <a:r>
+              <a:rPr lang="en-GB" b="0" i="0" noProof="0" dirty="0">
+                <a:solidFill>
+                  <a:srgbClr val="1F2328"/>
+                </a:solidFill>
+                <a:effectLst/>
+                <a:latin typeface="-apple-system"/>
+              </a:rPr>
+              <a:t> data distribution</a:t>
+            </a:r>
+          </a:p>
+          <a:p>
+            <a:pPr algn="l">
+              <a:buFont typeface="Arial" panose="020B0604020202020204" pitchFamily="34" charset="0"/>
+              <a:buChar char="•"/>
+            </a:pPr>
+            <a:endParaRPr lang="en-GB" b="0" i="0" noProof="0" dirty="0">
+              <a:solidFill>
+                <a:srgbClr val="1F2328"/>
+              </a:solidFill>
+              <a:effectLst/>
+              <a:latin typeface="-apple-system"/>
+            </a:endParaRPr>
+          </a:p>
+          <a:p>
+            <a:pPr>
+              <a:buFont typeface="Arial" panose="020B0604020202020204" pitchFamily="34" charset="0"/>
+              <a:buChar char="•"/>
+            </a:pPr>
+            <a:r>
+              <a:rPr lang="en-GB" noProof="0" dirty="0">
+                <a:solidFill>
+                  <a:srgbClr val="1F2328"/>
+                </a:solidFill>
+                <a:latin typeface="-apple-system"/>
+              </a:rPr>
+              <a:t> t-test</a:t>
+            </a:r>
+          </a:p>
+          <a:p>
+            <a:pPr>
+              <a:buFont typeface="Arial" panose="020B0604020202020204" pitchFamily="34" charset="0"/>
+              <a:buChar char="•"/>
+            </a:pPr>
+            <a:endParaRPr lang="en-GB" noProof="0" dirty="0">
+              <a:solidFill>
+                <a:srgbClr val="1F2328"/>
+              </a:solidFill>
+              <a:latin typeface="-apple-system"/>
+            </a:endParaRPr>
+          </a:p>
+          <a:p>
+            <a:pPr>
+              <a:buFont typeface="Arial" panose="020B0604020202020204" pitchFamily="34" charset="0"/>
+              <a:buChar char="•"/>
+            </a:pPr>
+            <a:r>
+              <a:rPr lang="en-GB" noProof="0" dirty="0">
+                <a:solidFill>
+                  <a:srgbClr val="1F2328"/>
+                </a:solidFill>
+                <a:latin typeface="-apple-system"/>
+              </a:rPr>
+              <a:t> correlation test</a:t>
+            </a:r>
+          </a:p>
+          <a:p>
+            <a:pPr algn="l">
+              <a:buFont typeface="Arial" panose="020B0604020202020204" pitchFamily="34" charset="0"/>
+              <a:buChar char="•"/>
+            </a:pPr>
+            <a:endParaRPr lang="en-GB" b="0" i="0" noProof="0" dirty="0">
+              <a:solidFill>
+                <a:srgbClr val="1F2328"/>
+              </a:solidFill>
+              <a:effectLst/>
+              <a:latin typeface="-apple-system"/>
+            </a:endParaRPr>
+          </a:p>
+          <a:p>
+            <a:pPr algn="l">
+              <a:buFont typeface="Arial" panose="020B0604020202020204" pitchFamily="34" charset="0"/>
+              <a:buChar char="•"/>
+            </a:pPr>
+            <a:endParaRPr lang="en-GB" b="0" i="0" noProof="0" dirty="0">
+              <a:solidFill>
+                <a:srgbClr val="1F2328"/>
+              </a:solidFill>
+              <a:effectLst/>
+              <a:latin typeface="-apple-system"/>
+            </a:endParaRPr>
+          </a:p>
+        </p:txBody>
+      </p:sp>
+      <p:sp>
+        <p:nvSpPr>
+          <p:cNvPr id="16" name="TextBox 15">
+            <a:extLst>
+              <a:ext uri="{FF2B5EF4-FFF2-40B4-BE49-F238E27FC236}">
+                <a16:creationId xmlns:a16="http://schemas.microsoft.com/office/drawing/2014/main" id="{A0C4236A-BAF4-FCDA-8910-27667A62398D}"/>
+              </a:ext>
+            </a:extLst>
+          </p:cNvPr>
+          <p:cNvSpPr txBox="1"/>
+          <p:nvPr/>
+        </p:nvSpPr>
+        <p:spPr>
+          <a:xfrm>
+            <a:off x="8473440" y="4075331"/>
             <a:ext cx="2880360" cy="1477328"/>
           </a:xfrm>
           <a:prstGeom prst="rect">
@@ -4359,27 +4431,27 @@
           </a:bodyPr>
           <a:lstStyle/>
           <a:p>
-            <a:pPr>
+            <a:pPr algn="l">
               <a:buFont typeface="Arial" panose="020B0604020202020204" pitchFamily="34" charset="0"/>
               <a:buChar char="•"/>
             </a:pPr>
             <a:r>
-              <a:rPr lang="en-US" b="0" i="0" dirty="0">
+              <a:rPr lang="en-GB" b="0" i="0" noProof="0" dirty="0">
                 <a:solidFill>
                   <a:srgbClr val="1F2328"/>
                 </a:solidFill>
                 <a:effectLst/>
                 <a:latin typeface="-apple-system"/>
               </a:rPr>
-              <a:t> inter-dependencies among samples etc.</a:t>
-            </a:r>
-          </a:p>
-          <a:p>
-            <a:pPr>
+              <a:t> PCR</a:t>
+            </a:r>
+          </a:p>
+          <a:p>
+            <a:pPr algn="l">
               <a:buFont typeface="Arial" panose="020B0604020202020204" pitchFamily="34" charset="0"/>
               <a:buChar char="•"/>
             </a:pPr>
-            <a:endParaRPr lang="en-US" b="0" i="0" dirty="0">
+            <a:endParaRPr lang="en-GB" b="0" i="0" noProof="0" dirty="0">
               <a:solidFill>
                 <a:srgbClr val="1F2328"/>
               </a:solidFill>
@@ -4393,22 +4465,285 @@
               <a:buChar char="•"/>
             </a:pPr>
             <a:r>
-              <a:rPr lang="en-US" b="0" i="0" dirty="0">
+              <a:rPr lang="en-GB" noProof="0" dirty="0">
+                <a:solidFill>
+                  <a:srgbClr val="1F2328"/>
+                </a:solidFill>
+                <a:latin typeface="-apple-system"/>
+              </a:rPr>
+              <a:t> k-means</a:t>
+            </a:r>
+          </a:p>
+          <a:p>
+            <a:pPr algn="l">
+              <a:buFont typeface="Arial" panose="020B0604020202020204" pitchFamily="34" charset="0"/>
+              <a:buChar char="•"/>
+            </a:pPr>
+            <a:endParaRPr lang="en-GB" noProof="0" dirty="0">
+              <a:solidFill>
+                <a:srgbClr val="1F2328"/>
+              </a:solidFill>
+              <a:latin typeface="-apple-system"/>
+            </a:endParaRPr>
+          </a:p>
+          <a:p>
+            <a:pPr algn="l">
+              <a:buFont typeface="Arial" panose="020B0604020202020204" pitchFamily="34" charset="0"/>
+              <a:buChar char="•"/>
+            </a:pPr>
+            <a:r>
+              <a:rPr lang="en-GB" noProof="0" dirty="0">
+                <a:solidFill>
+                  <a:srgbClr val="1F2328"/>
+                </a:solidFill>
+                <a:latin typeface="-apple-system"/>
+              </a:rPr>
+              <a:t> linear regression analysis</a:t>
+            </a:r>
+          </a:p>
+        </p:txBody>
+      </p:sp>
+    </p:spTree>
+    <p:extLst>
+      <p:ext uri="{BB962C8B-B14F-4D97-AF65-F5344CB8AC3E}">
+        <p14:creationId xmlns:p14="http://schemas.microsoft.com/office/powerpoint/2010/main" val="4084201588"/>
+      </p:ext>
+    </p:extLst>
+  </p:cSld>
+  <p:clrMapOvr>
+    <a:masterClrMapping/>
+  </p:clrMapOvr>
+</p:sld>
+</file>
+
+<file path=ppt/slides/slide6.xml><?xml version="1.0" encoding="utf-8"?>
+<p:sld xmlns:a="http://schemas.openxmlformats.org/drawingml/2006/main" xmlns:r="http://schemas.openxmlformats.org/officeDocument/2006/relationships" xmlns:p="http://schemas.openxmlformats.org/presentationml/2006/main">
+  <p:cSld>
+    <p:spTree>
+      <p:nvGrpSpPr>
+        <p:cNvPr id="1" name=""/>
+        <p:cNvGrpSpPr/>
+        <p:nvPr/>
+      </p:nvGrpSpPr>
+      <p:grpSpPr>
+        <a:xfrm>
+          <a:off x="0" y="0"/>
+          <a:ext cx="0" cy="0"/>
+          <a:chOff x="0" y="0"/>
+          <a:chExt cx="0" cy="0"/>
+        </a:xfrm>
+      </p:grpSpPr>
+      <p:sp>
+        <p:nvSpPr>
+          <p:cNvPr id="2" name="Rectangle: Rounded Corners 1">
+            <a:extLst>
+              <a:ext uri="{FF2B5EF4-FFF2-40B4-BE49-F238E27FC236}">
+                <a16:creationId xmlns:a16="http://schemas.microsoft.com/office/drawing/2014/main" id="{05512F64-50FF-BDB8-648D-F82B3800F2C6}"/>
+              </a:ext>
+            </a:extLst>
+          </p:cNvPr>
+          <p:cNvSpPr/>
+          <p:nvPr/>
+        </p:nvSpPr>
+        <p:spPr>
+          <a:xfrm>
+            <a:off x="2445174" y="1651000"/>
+            <a:ext cx="2880360" cy="1666240"/>
+          </a:xfrm>
+          <a:prstGeom prst="roundRect">
+            <a:avLst/>
+          </a:prstGeom>
+          <a:solidFill>
+            <a:schemeClr val="bg1"/>
+          </a:solidFill>
+          <a:ln w="34925">
+            <a:solidFill>
+              <a:schemeClr val="tx1"/>
+            </a:solidFill>
+          </a:ln>
+          <a:effectLst>
+            <a:outerShdw blurRad="317500" dir="2700000" algn="ctr">
+              <a:srgbClr val="000000">
+                <a:alpha val="43000"/>
+              </a:srgbClr>
+            </a:outerShdw>
+          </a:effectLst>
+        </p:spPr>
+        <p:style>
+          <a:lnRef idx="2">
+            <a:schemeClr val="accent1">
+              <a:shade val="15000"/>
+            </a:schemeClr>
+          </a:lnRef>
+          <a:fillRef idx="1">
+            <a:schemeClr val="accent1"/>
+          </a:fillRef>
+          <a:effectRef idx="0">
+            <a:schemeClr val="accent1"/>
+          </a:effectRef>
+          <a:fontRef idx="minor">
+            <a:schemeClr val="lt1"/>
+          </a:fontRef>
+        </p:style>
+        <p:txBody>
+          <a:bodyPr rtlCol="0" anchor="ctr"/>
+          <a:lstStyle/>
+          <a:p>
+            <a:pPr algn="ctr"/>
+            <a:r>
+              <a:rPr lang="en-GB" sz="2400" b="1" i="0" noProof="0" dirty="0">
                 <a:solidFill>
                   <a:srgbClr val="1F2328"/>
                 </a:solidFill>
                 <a:effectLst/>
                 <a:latin typeface="-apple-system"/>
               </a:rPr>
-              <a:t>data distribution</a:t>
-            </a:r>
-          </a:p>
-          <a:p>
-            <a:pPr algn="l">
-              <a:buFont typeface="Arial" panose="020B0604020202020204" pitchFamily="34" charset="0"/>
-              <a:buChar char="•"/>
-            </a:pPr>
-            <a:endParaRPr lang="en-US" b="0" i="0" dirty="0">
+              <a:t>Data modelling </a:t>
+            </a:r>
+          </a:p>
+        </p:txBody>
+      </p:sp>
+      <p:sp>
+        <p:nvSpPr>
+          <p:cNvPr id="3" name="TextBox 2">
+            <a:extLst>
+              <a:ext uri="{FF2B5EF4-FFF2-40B4-BE49-F238E27FC236}">
+                <a16:creationId xmlns:a16="http://schemas.microsoft.com/office/drawing/2014/main" id="{5916AC6C-6269-2996-591D-B808F78D1ABB}"/>
+              </a:ext>
+            </a:extLst>
+          </p:cNvPr>
+          <p:cNvSpPr txBox="1"/>
+          <p:nvPr/>
+        </p:nvSpPr>
+        <p:spPr>
+          <a:xfrm>
+            <a:off x="3181774" y="3366404"/>
+            <a:ext cx="1407160" cy="338554"/>
+          </a:xfrm>
+          <a:prstGeom prst="rect">
+            <a:avLst/>
+          </a:prstGeom>
+          <a:noFill/>
+        </p:spPr>
+        <p:txBody>
+          <a:bodyPr wrap="square" rtlCol="0">
+            <a:spAutoFit/>
+          </a:bodyPr>
+          <a:lstStyle/>
+          <a:p>
+            <a:pPr algn="ctr"/>
+            <a:r>
+              <a:rPr lang="en-GB" sz="1600" dirty="0"/>
+              <a:t>16.06-29.06</a:t>
+            </a:r>
+            <a:endParaRPr lang="en-GB" sz="1600" noProof="0" dirty="0"/>
+          </a:p>
+        </p:txBody>
+      </p:sp>
+      <p:sp>
+        <p:nvSpPr>
+          <p:cNvPr id="4" name="TextBox 3">
+            <a:extLst>
+              <a:ext uri="{FF2B5EF4-FFF2-40B4-BE49-F238E27FC236}">
+                <a16:creationId xmlns:a16="http://schemas.microsoft.com/office/drawing/2014/main" id="{3BD5B7F8-8F39-B6A1-3091-FF5F0DADBF38}"/>
+              </a:ext>
+            </a:extLst>
+          </p:cNvPr>
+          <p:cNvSpPr txBox="1"/>
+          <p:nvPr/>
+        </p:nvSpPr>
+        <p:spPr>
+          <a:xfrm>
+            <a:off x="7366847" y="1286748"/>
+            <a:ext cx="1879600" cy="369332"/>
+          </a:xfrm>
+          <a:prstGeom prst="rect">
+            <a:avLst/>
+          </a:prstGeom>
+          <a:noFill/>
+        </p:spPr>
+        <p:txBody>
+          <a:bodyPr wrap="square" rtlCol="0">
+            <a:spAutoFit/>
+          </a:bodyPr>
+          <a:lstStyle/>
+          <a:p>
+            <a:pPr algn="ctr"/>
+            <a:r>
+              <a:rPr lang="en-GB" noProof="0" dirty="0"/>
+              <a:t>7. Week</a:t>
+            </a:r>
+          </a:p>
+        </p:txBody>
+      </p:sp>
+      <p:sp>
+        <p:nvSpPr>
+          <p:cNvPr id="5" name="Rectangle: Rounded Corners 4">
+            <a:extLst>
+              <a:ext uri="{FF2B5EF4-FFF2-40B4-BE49-F238E27FC236}">
+                <a16:creationId xmlns:a16="http://schemas.microsoft.com/office/drawing/2014/main" id="{D1778EC7-0FC8-3E35-BCEE-26F938DA1D67}"/>
+              </a:ext>
+            </a:extLst>
+          </p:cNvPr>
+          <p:cNvSpPr/>
+          <p:nvPr/>
+        </p:nvSpPr>
+        <p:spPr>
+          <a:xfrm>
+            <a:off x="6866467" y="1656080"/>
+            <a:ext cx="2880360" cy="1666240"/>
+          </a:xfrm>
+          <a:prstGeom prst="roundRect">
+            <a:avLst/>
+          </a:prstGeom>
+          <a:solidFill>
+            <a:schemeClr val="bg1"/>
+          </a:solidFill>
+          <a:ln w="34925">
+            <a:solidFill>
+              <a:schemeClr val="tx1"/>
+            </a:solidFill>
+          </a:ln>
+          <a:effectLst>
+            <a:outerShdw blurRad="317500" dir="2700000" algn="ctr">
+              <a:srgbClr val="000000">
+                <a:alpha val="43000"/>
+              </a:srgbClr>
+            </a:outerShdw>
+          </a:effectLst>
+        </p:spPr>
+        <p:style>
+          <a:lnRef idx="2">
+            <a:schemeClr val="accent1">
+              <a:shade val="15000"/>
+            </a:schemeClr>
+          </a:lnRef>
+          <a:fillRef idx="1">
+            <a:schemeClr val="accent1"/>
+          </a:fillRef>
+          <a:effectRef idx="0">
+            <a:schemeClr val="accent1"/>
+          </a:effectRef>
+          <a:fontRef idx="minor">
+            <a:schemeClr val="lt1"/>
+          </a:fontRef>
+        </p:style>
+        <p:txBody>
+          <a:bodyPr rtlCol="0" anchor="ctr"/>
+          <a:lstStyle/>
+          <a:p>
+            <a:pPr algn="ctr"/>
+            <a:r>
+              <a:rPr lang="en-GB" sz="2400" b="1" i="0" noProof="0">
+                <a:solidFill>
+                  <a:srgbClr val="1F2328"/>
+                </a:solidFill>
+                <a:effectLst/>
+                <a:latin typeface="-apple-system"/>
+              </a:rPr>
+              <a:t>Data presentation</a:t>
+            </a:r>
+            <a:endParaRPr lang="en-GB" sz="2400" b="1" i="0" noProof="0" dirty="0">
               <a:solidFill>
                 <a:srgbClr val="1F2328"/>
               </a:solidFill>
@@ -4420,10 +4755,10 @@
       </p:sp>
       <p:sp>
         <p:nvSpPr>
-          <p:cNvPr id="16" name="TextBox 15">
-            <a:extLst>
-              <a:ext uri="{FF2B5EF4-FFF2-40B4-BE49-F238E27FC236}">
-                <a16:creationId xmlns:a16="http://schemas.microsoft.com/office/drawing/2014/main" id="{A0C4236A-BAF4-FCDA-8910-27667A62398D}"/>
+          <p:cNvPr id="6" name="TextBox 5">
+            <a:extLst>
+              <a:ext uri="{FF2B5EF4-FFF2-40B4-BE49-F238E27FC236}">
+                <a16:creationId xmlns:a16="http://schemas.microsoft.com/office/drawing/2014/main" id="{764C372E-0176-3994-F48C-A094AF2DAF2B}"/>
               </a:ext>
             </a:extLst>
           </p:cNvPr>
@@ -4432,8 +4767,8 @@
         </p:nvSpPr>
         <p:spPr>
           <a:xfrm>
-            <a:off x="8473440" y="4075331"/>
-            <a:ext cx="2880360" cy="1754326"/>
+            <a:off x="7603067" y="3366404"/>
+            <a:ext cx="1407160" cy="338554"/>
           </a:xfrm>
           <a:prstGeom prst="rect">
             <a:avLst/>
@@ -4446,19 +4781,96 @@
           </a:bodyPr>
           <a:lstStyle/>
           <a:p>
+            <a:pPr algn="ctr"/>
+            <a:r>
+              <a:rPr lang="en-GB" sz="1600" dirty="0"/>
+              <a:t>30.06-06.07</a:t>
+            </a:r>
+            <a:endParaRPr lang="en-GB" sz="1600" noProof="0" dirty="0"/>
+          </a:p>
+        </p:txBody>
+      </p:sp>
+      <p:sp>
+        <p:nvSpPr>
+          <p:cNvPr id="7" name="TextBox 6">
+            <a:extLst>
+              <a:ext uri="{FF2B5EF4-FFF2-40B4-BE49-F238E27FC236}">
+                <a16:creationId xmlns:a16="http://schemas.microsoft.com/office/drawing/2014/main" id="{20645158-6DA7-7F53-1657-FB61DAD109D4}"/>
+              </a:ext>
+            </a:extLst>
+          </p:cNvPr>
+          <p:cNvSpPr txBox="1"/>
+          <p:nvPr/>
+        </p:nvSpPr>
+        <p:spPr>
+          <a:xfrm>
+            <a:off x="2945554" y="1281668"/>
+            <a:ext cx="1879600" cy="369332"/>
+          </a:xfrm>
+          <a:prstGeom prst="rect">
+            <a:avLst/>
+          </a:prstGeom>
+          <a:noFill/>
+        </p:spPr>
+        <p:txBody>
+          <a:bodyPr wrap="square" rtlCol="0">
+            <a:spAutoFit/>
+          </a:bodyPr>
+          <a:lstStyle/>
+          <a:p>
+            <a:pPr algn="ctr"/>
+            <a:r>
+              <a:rPr lang="en-GB" dirty="0"/>
+              <a:t>5</a:t>
+            </a:r>
+            <a:r>
+              <a:rPr lang="en-GB" noProof="0" dirty="0"/>
+              <a:t>./6. Week</a:t>
+            </a:r>
+          </a:p>
+        </p:txBody>
+      </p:sp>
+      <p:sp>
+        <p:nvSpPr>
+          <p:cNvPr id="8" name="TextBox 7">
+            <a:extLst>
+              <a:ext uri="{FF2B5EF4-FFF2-40B4-BE49-F238E27FC236}">
+                <a16:creationId xmlns:a16="http://schemas.microsoft.com/office/drawing/2014/main" id="{559D090E-F8F2-A638-2C03-6C7108CFA6F0}"/>
+              </a:ext>
+            </a:extLst>
+          </p:cNvPr>
+          <p:cNvSpPr txBox="1"/>
+          <p:nvPr/>
+        </p:nvSpPr>
+        <p:spPr>
+          <a:xfrm>
+            <a:off x="6866467" y="3982197"/>
+            <a:ext cx="2880360" cy="923330"/>
+          </a:xfrm>
+          <a:prstGeom prst="rect">
+            <a:avLst/>
+          </a:prstGeom>
+          <a:noFill/>
+        </p:spPr>
+        <p:txBody>
+          <a:bodyPr wrap="square" rtlCol="0">
+            <a:spAutoFit/>
+          </a:bodyPr>
+          <a:lstStyle/>
+          <a:p>
             <a:pPr algn="l">
               <a:buFont typeface="Arial" panose="020B0604020202020204" pitchFamily="34" charset="0"/>
               <a:buChar char="•"/>
             </a:pPr>
             <a:r>
-              <a:rPr lang="en-US" b="0" i="0" dirty="0">
+              <a:rPr lang="en-GB" b="0" i="0" noProof="0" dirty="0">
                 <a:solidFill>
                   <a:srgbClr val="1F2328"/>
                 </a:solidFill>
                 <a:effectLst/>
                 <a:latin typeface="-apple-system"/>
               </a:rPr>
-              <a:t> dimension reduction analysis</a:t>
+              <a:t>poster</a:t>
             </a:r>
           </a:p>
           <a:p>
@@ -4466,14 +4878,58 @@
               <a:buFont typeface="Arial" panose="020B0604020202020204" pitchFamily="34" charset="0"/>
               <a:buChar char="•"/>
             </a:pPr>
-            <a:endParaRPr lang="en-US" b="0" i="0" dirty="0">
+            <a:endParaRPr lang="en-GB" dirty="0">
               <a:solidFill>
                 <a:srgbClr val="1F2328"/>
               </a:solidFill>
-              <a:effectLst/>
               <a:latin typeface="-apple-system"/>
             </a:endParaRPr>
           </a:p>
+          <a:p>
+            <a:pPr algn="l">
+              <a:buFont typeface="Arial" panose="020B0604020202020204" pitchFamily="34" charset="0"/>
+              <a:buChar char="•"/>
+            </a:pPr>
+            <a:r>
+              <a:rPr lang="en-GB" b="0" i="0" noProof="0" dirty="0">
+                <a:solidFill>
+                  <a:srgbClr val="1F2328"/>
+                </a:solidFill>
+                <a:effectLst/>
+                <a:latin typeface="-apple-system"/>
+              </a:rPr>
+              <a:t>Final presentation</a:t>
+            </a:r>
+          </a:p>
+        </p:txBody>
+      </p:sp>
+      <p:sp>
+        <p:nvSpPr>
+          <p:cNvPr id="9" name="TextBox 8">
+            <a:extLst>
+              <a:ext uri="{FF2B5EF4-FFF2-40B4-BE49-F238E27FC236}">
+                <a16:creationId xmlns:a16="http://schemas.microsoft.com/office/drawing/2014/main" id="{22651553-1F68-EF2C-CCFC-698851FBD9F2}"/>
+              </a:ext>
+            </a:extLst>
+          </p:cNvPr>
+          <p:cNvSpPr txBox="1"/>
+          <p:nvPr/>
+        </p:nvSpPr>
+        <p:spPr>
+          <a:xfrm>
+            <a:off x="2445174" y="3982197"/>
+            <a:ext cx="2880360" cy="646331"/>
+          </a:xfrm>
+          <a:prstGeom prst="rect">
+            <a:avLst/>
+          </a:prstGeom>
+          <a:noFill/>
+        </p:spPr>
+        <p:txBody>
+          <a:bodyPr wrap="square" rtlCol="0">
+            <a:spAutoFit/>
+          </a:bodyPr>
+          <a:lstStyle/>
           <a:p>
             <a:pPr algn="l">
               <a:buFont typeface="Arial" panose="020B0604020202020204" pitchFamily="34" charset="0"/>
@@ -4486,42 +4942,150 @@
                 </a:solidFill>
                 <a:latin typeface="-apple-system"/>
               </a:rPr>
-              <a:t> statistical tests</a:t>
-            </a:r>
-          </a:p>
-          <a:p>
-            <a:pPr algn="l">
-              <a:buFont typeface="Arial" panose="020B0604020202020204" pitchFamily="34" charset="0"/>
-              <a:buChar char="•"/>
-            </a:pPr>
-            <a:endParaRPr lang="en-US" dirty="0">
+              <a:t> predict whether a protein is a RBP</a:t>
+            </a:r>
+            <a:endParaRPr lang="en-GB" dirty="0">
               <a:solidFill>
                 <a:srgbClr val="1F2328"/>
               </a:solidFill>
               <a:latin typeface="-apple-system"/>
             </a:endParaRPr>
           </a:p>
-          <a:p>
-            <a:pPr algn="l">
-              <a:buFont typeface="Arial" panose="020B0604020202020204" pitchFamily="34" charset="0"/>
-              <a:buChar char="•"/>
-            </a:pPr>
-            <a:r>
-              <a:rPr lang="en-US" dirty="0">
-                <a:solidFill>
-                  <a:srgbClr val="1F2328"/>
-                </a:solidFill>
-                <a:latin typeface="-apple-system"/>
-              </a:rPr>
-              <a:t> linear regression analysis</a:t>
-            </a:r>
-          </a:p>
         </p:txBody>
       </p:sp>
     </p:spTree>
     <p:extLst>
       <p:ext uri="{BB962C8B-B14F-4D97-AF65-F5344CB8AC3E}">
-        <p14:creationId xmlns:p14="http://schemas.microsoft.com/office/powerpoint/2010/main" val="4084201588"/>
+        <p14:creationId xmlns:p14="http://schemas.microsoft.com/office/powerpoint/2010/main" val="584243160"/>
+      </p:ext>
+    </p:extLst>
+  </p:cSld>
+  <p:clrMapOvr>
+    <a:masterClrMapping/>
+  </p:clrMapOvr>
+</p:sld>
+</file>
+
+<file path=ppt/slides/slide7.xml><?xml version="1.0" encoding="utf-8"?>
+<p:sld xmlns:a="http://schemas.openxmlformats.org/drawingml/2006/main" xmlns:r="http://schemas.openxmlformats.org/officeDocument/2006/relationships" xmlns:p="http://schemas.openxmlformats.org/presentationml/2006/main">
+  <p:cSld>
+    <p:spTree>
+      <p:nvGrpSpPr>
+        <p:cNvPr id="1" name=""/>
+        <p:cNvGrpSpPr/>
+        <p:nvPr/>
+      </p:nvGrpSpPr>
+      <p:grpSpPr>
+        <a:xfrm>
+          <a:off x="0" y="0"/>
+          <a:ext cx="0" cy="0"/>
+          <a:chOff x="0" y="0"/>
+          <a:chExt cx="0" cy="0"/>
+        </a:xfrm>
+      </p:grpSpPr>
+      <p:sp>
+        <p:nvSpPr>
+          <p:cNvPr id="2" name="Title 1">
+            <a:extLst>
+              <a:ext uri="{FF2B5EF4-FFF2-40B4-BE49-F238E27FC236}">
+                <a16:creationId xmlns:a16="http://schemas.microsoft.com/office/drawing/2014/main" id="{7DDD5CD0-9213-6901-2300-795ABB73CF18}"/>
+              </a:ext>
+            </a:extLst>
+          </p:cNvPr>
+          <p:cNvSpPr>
+            <a:spLocks noGrp="1"/>
+          </p:cNvSpPr>
+          <p:nvPr>
+            <p:ph type="ctrTitle"/>
+          </p:nvPr>
+        </p:nvSpPr>
+        <p:spPr/>
+        <p:txBody>
+          <a:bodyPr/>
+          <a:lstStyle/>
+          <a:p>
+            <a:r>
+              <a:rPr lang="en-GB" noProof="0" dirty="0"/>
+              <a:t>Time Table</a:t>
+            </a:r>
+          </a:p>
+        </p:txBody>
+      </p:sp>
+      <p:sp>
+        <p:nvSpPr>
+          <p:cNvPr id="3" name="Subtitle 2">
+            <a:extLst>
+              <a:ext uri="{FF2B5EF4-FFF2-40B4-BE49-F238E27FC236}">
+                <a16:creationId xmlns:a16="http://schemas.microsoft.com/office/drawing/2014/main" id="{1690C50E-3847-EA70-3236-BCAA9B915E8E}"/>
+              </a:ext>
+            </a:extLst>
+          </p:cNvPr>
+          <p:cNvSpPr>
+            <a:spLocks noGrp="1"/>
+          </p:cNvSpPr>
+          <p:nvPr>
+            <p:ph type="subTitle" idx="1"/>
+          </p:nvPr>
+        </p:nvSpPr>
+        <p:spPr>
+          <a:xfrm>
+            <a:off x="1524000" y="3602038"/>
+            <a:ext cx="9144000" cy="2941002"/>
+          </a:xfrm>
+        </p:spPr>
+        <p:txBody>
+          <a:bodyPr>
+            <a:normAutofit lnSpcReduction="10000"/>
+          </a:bodyPr>
+          <a:lstStyle/>
+          <a:p>
+            <a:r>
+              <a:rPr lang="en-GB" noProof="0" dirty="0"/>
+              <a:t>19.05-25.05</a:t>
+            </a:r>
+          </a:p>
+          <a:p>
+            <a:r>
+              <a:rPr lang="en-GB" noProof="0" dirty="0"/>
+              <a:t>26.05-01.06</a:t>
+            </a:r>
+          </a:p>
+          <a:p>
+            <a:r>
+              <a:rPr lang="en-GB" noProof="0" dirty="0"/>
+              <a:t>02.06-08.06</a:t>
+            </a:r>
+          </a:p>
+          <a:p>
+            <a:r>
+              <a:rPr lang="en-GB" noProof="0" dirty="0"/>
+              <a:t>09.06-15.06</a:t>
+            </a:r>
+          </a:p>
+          <a:p>
+            <a:r>
+              <a:rPr lang="en-GB" noProof="0" dirty="0"/>
+              <a:t>16.06-22.06</a:t>
+            </a:r>
+          </a:p>
+          <a:p>
+            <a:r>
+              <a:rPr lang="en-GB" noProof="0" dirty="0"/>
+              <a:t>23.06-29.06</a:t>
+            </a:r>
+          </a:p>
+          <a:p>
+            <a:r>
+              <a:rPr lang="en-GB" noProof="0" dirty="0"/>
+              <a:t>30.06-06.07</a:t>
+            </a:r>
+          </a:p>
+        </p:txBody>
+      </p:sp>
+    </p:spTree>
+    <p:extLst>
+      <p:ext uri="{BB962C8B-B14F-4D97-AF65-F5344CB8AC3E}">
+        <p14:creationId xmlns:p14="http://schemas.microsoft.com/office/powerpoint/2010/main" val="4114376445"/>
       </p:ext>
     </p:extLst>
   </p:cSld>

</xml_diff>

<commit_message>
Quellen von Deutsch in Englisch und einen Tippfehler korrigiert
</commit_message>
<xml_diff>
--- a/Project Proposal Ben.pptx
+++ b/Project Proposal Ben.pptx
@@ -373,7 +373,7 @@
           <a:p>
             <a:fld id="{5CE5EABD-9B00-4D4A-AB75-54D2757912B9}" type="slidenum">
               <a:rPr lang="de-DE" smtClean="0"/>
-              <a:t>‹Nr.›</a:t>
+              <a:t>‹#›</a:t>
             </a:fld>
             <a:endParaRPr lang="de-DE"/>
           </a:p>
@@ -1534,7 +1534,7 @@
           <a:p>
             <a:fld id="{76CD8E94-8180-4651-B6B5-5A5ABA3C85A7}" type="slidenum">
               <a:rPr lang="de-DE" smtClean="0"/>
-              <a:t>‹Nr.›</a:t>
+              <a:t>‹#›</a:t>
             </a:fld>
             <a:endParaRPr lang="de-DE"/>
           </a:p>
@@ -1734,7 +1734,7 @@
           <a:p>
             <a:fld id="{76CD8E94-8180-4651-B6B5-5A5ABA3C85A7}" type="slidenum">
               <a:rPr lang="de-DE" smtClean="0"/>
-              <a:t>‹Nr.›</a:t>
+              <a:t>‹#›</a:t>
             </a:fld>
             <a:endParaRPr lang="de-DE"/>
           </a:p>
@@ -1944,7 +1944,7 @@
           <a:p>
             <a:fld id="{76CD8E94-8180-4651-B6B5-5A5ABA3C85A7}" type="slidenum">
               <a:rPr lang="de-DE" smtClean="0"/>
-              <a:t>‹Nr.›</a:t>
+              <a:t>‹#›</a:t>
             </a:fld>
             <a:endParaRPr lang="de-DE"/>
           </a:p>
@@ -2144,7 +2144,7 @@
           <a:p>
             <a:fld id="{76CD8E94-8180-4651-B6B5-5A5ABA3C85A7}" type="slidenum">
               <a:rPr lang="de-DE" smtClean="0"/>
-              <a:t>‹Nr.›</a:t>
+              <a:t>‹#›</a:t>
             </a:fld>
             <a:endParaRPr lang="de-DE"/>
           </a:p>
@@ -2420,7 +2420,7 @@
           <a:p>
             <a:fld id="{76CD8E94-8180-4651-B6B5-5A5ABA3C85A7}" type="slidenum">
               <a:rPr lang="de-DE" smtClean="0"/>
-              <a:t>‹Nr.›</a:t>
+              <a:t>‹#›</a:t>
             </a:fld>
             <a:endParaRPr lang="de-DE"/>
           </a:p>
@@ -2688,7 +2688,7 @@
           <a:p>
             <a:fld id="{76CD8E94-8180-4651-B6B5-5A5ABA3C85A7}" type="slidenum">
               <a:rPr lang="de-DE" smtClean="0"/>
-              <a:t>‹Nr.›</a:t>
+              <a:t>‹#›</a:t>
             </a:fld>
             <a:endParaRPr lang="de-DE"/>
           </a:p>
@@ -3103,7 +3103,7 @@
           <a:p>
             <a:fld id="{76CD8E94-8180-4651-B6B5-5A5ABA3C85A7}" type="slidenum">
               <a:rPr lang="de-DE" smtClean="0"/>
-              <a:t>‹Nr.›</a:t>
+              <a:t>‹#›</a:t>
             </a:fld>
             <a:endParaRPr lang="de-DE"/>
           </a:p>
@@ -3245,7 +3245,7 @@
           <a:p>
             <a:fld id="{76CD8E94-8180-4651-B6B5-5A5ABA3C85A7}" type="slidenum">
               <a:rPr lang="de-DE" smtClean="0"/>
-              <a:t>‹Nr.›</a:t>
+              <a:t>‹#›</a:t>
             </a:fld>
             <a:endParaRPr lang="de-DE"/>
           </a:p>
@@ -3358,7 +3358,7 @@
           <a:p>
             <a:fld id="{76CD8E94-8180-4651-B6B5-5A5ABA3C85A7}" type="slidenum">
               <a:rPr lang="de-DE" smtClean="0"/>
-              <a:t>‹Nr.›</a:t>
+              <a:t>‹#›</a:t>
             </a:fld>
             <a:endParaRPr lang="de-DE"/>
           </a:p>
@@ -3671,7 +3671,7 @@
           <a:p>
             <a:fld id="{76CD8E94-8180-4651-B6B5-5A5ABA3C85A7}" type="slidenum">
               <a:rPr lang="de-DE" smtClean="0"/>
-              <a:t>‹Nr.›</a:t>
+              <a:t>‹#›</a:t>
             </a:fld>
             <a:endParaRPr lang="de-DE"/>
           </a:p>
@@ -3960,7 +3960,7 @@
           <a:p>
             <a:fld id="{76CD8E94-8180-4651-B6B5-5A5ABA3C85A7}" type="slidenum">
               <a:rPr lang="de-DE" smtClean="0"/>
-              <a:t>‹Nr.›</a:t>
+              <a:t>‹#›</a:t>
             </a:fld>
             <a:endParaRPr lang="de-DE"/>
           </a:p>
@@ -4239,7 +4239,7 @@
           <a:p>
             <a:fld id="{76CD8E94-8180-4651-B6B5-5A5ABA3C85A7}" type="slidenum">
               <a:rPr lang="de-DE" smtClean="0"/>
-              <a:t>‹Nr.›</a:t>
+              <a:t>‹#›</a:t>
             </a:fld>
             <a:endParaRPr lang="de-DE"/>
           </a:p>
@@ -4754,29 +4754,14 @@
           <a:lstStyle/>
           <a:p>
             <a:r>
-              <a:rPr lang="en-GB" sz="1000" u="sng" noProof="0" dirty="0" err="1"/>
+              <a:rPr lang="en-US" sz="1000" u="sng" noProof="0" dirty="0" err="1"/>
               <a:t>Bioinfo</a:t>
             </a:r>
             <a:r>
-              <a:rPr lang="en-GB" sz="1000" u="sng" noProof="0" dirty="0"/>
-              <a:t>-Slides </a:t>
-            </a:r>
-            <a:r>
-              <a:rPr lang="en-GB" sz="1000" u="sng" noProof="0" dirty="0" err="1"/>
-              <a:t>aus</a:t>
-            </a:r>
-            <a:r>
-              <a:rPr lang="en-GB" sz="1000" u="sng" noProof="0" dirty="0"/>
-              <a:t> </a:t>
-            </a:r>
-            <a:r>
-              <a:rPr lang="en-GB" sz="1000" u="sng" noProof="0" dirty="0" err="1"/>
-              <a:t>dem</a:t>
-            </a:r>
-            <a:r>
-              <a:rPr lang="en-GB" sz="1000" u="sng" noProof="0" dirty="0"/>
-              <a:t> 3. Semester</a:t>
-            </a:r>
+              <a:rPr lang="en-US" sz="1000" u="sng" noProof="0" dirty="0"/>
+              <a:t> slides from the 3rd semester</a:t>
+            </a:r>
+            <a:endParaRPr lang="en-GB" sz="1000" u="sng" noProof="0" dirty="0"/>
           </a:p>
         </p:txBody>
       </p:sp>
@@ -5250,7 +5235,7 @@
           <a:p>
             <a:pPr algn="ctr"/>
             <a:r>
-              <a:rPr lang="de-DE" dirty="0"/>
+              <a:rPr lang="en-GB" noProof="0" dirty="0"/>
               <a:t>16.06.-06.07.</a:t>
             </a:r>
           </a:p>
@@ -5793,53 +5778,247 @@
           <a:lstStyle/>
           <a:p>
             <a:r>
-              <a:rPr lang="de-DE" dirty="0"/>
-              <a:t>Vorteile: Enrichment-</a:t>
-            </a:r>
-            <a:r>
-              <a:rPr lang="de-DE" dirty="0" err="1"/>
-              <a:t>free</a:t>
-            </a:r>
-            <a:r>
-              <a:rPr lang="de-DE" dirty="0"/>
-              <a:t>: Basiert nicht auf den Unterschieden von Affinität oder Eigenschaften der einzelnen Proteine, auch nicht auf bestimmten RNA/Protein-Sequenzen, liefert quantitative Aussagen über den Anteil jedes </a:t>
-            </a:r>
-            <a:r>
-              <a:rPr lang="de-DE" dirty="0" err="1"/>
-              <a:t>RBP</a:t>
-            </a:r>
-            <a:r>
-              <a:rPr lang="de-DE" dirty="0"/>
-              <a:t>, der tatsächlich an die RNA angelagert ist</a:t>
-            </a:r>
-          </a:p>
-          <a:p>
-            <a:r>
-              <a:rPr lang="de-DE" dirty="0"/>
-              <a:t>Limitationen: Identifiziert nicht die </a:t>
-            </a:r>
-            <a:r>
-              <a:rPr lang="de-DE" dirty="0" err="1"/>
-              <a:t>binding</a:t>
-            </a:r>
-            <a:r>
-              <a:rPr lang="de-DE" dirty="0"/>
+              <a:rPr lang="en-GB" noProof="0" dirty="0" err="1"/>
+              <a:t>Vorteile</a:t>
+            </a:r>
+            <a:r>
+              <a:rPr lang="en-GB" noProof="0" dirty="0"/>
+              <a:t>: Enrichment-free: </a:t>
+            </a:r>
+            <a:r>
+              <a:rPr lang="en-GB" noProof="0" dirty="0" err="1"/>
+              <a:t>Basiert</a:t>
+            </a:r>
+            <a:r>
+              <a:rPr lang="en-GB" noProof="0" dirty="0"/>
               <a:t> </a:t>
             </a:r>
             <a:r>
-              <a:rPr lang="de-DE" dirty="0" err="1"/>
-              <a:t>sites</a:t>
-            </a:r>
-            <a:r>
-              <a:rPr lang="de-DE" dirty="0"/>
-              <a:t>, keine Unterscheidung zwischen direkten und indirekten Interaktionen</a:t>
-            </a:r>
+              <a:rPr lang="en-GB" noProof="0" dirty="0" err="1"/>
+              <a:t>nicht</a:t>
+            </a:r>
+            <a:r>
+              <a:rPr lang="en-GB" noProof="0" dirty="0"/>
+              <a:t> auf den </a:t>
+            </a:r>
+            <a:r>
+              <a:rPr lang="en-GB" noProof="0" dirty="0" err="1"/>
+              <a:t>Unterschieden</a:t>
+            </a:r>
+            <a:r>
+              <a:rPr lang="en-GB" noProof="0" dirty="0"/>
+              <a:t> von </a:t>
+            </a:r>
+            <a:r>
+              <a:rPr lang="en-GB" noProof="0" dirty="0" err="1"/>
+              <a:t>Affinität</a:t>
+            </a:r>
+            <a:r>
+              <a:rPr lang="en-GB" noProof="0" dirty="0"/>
+              <a:t> </a:t>
+            </a:r>
+            <a:r>
+              <a:rPr lang="en-GB" noProof="0" dirty="0" err="1"/>
+              <a:t>oder</a:t>
+            </a:r>
+            <a:r>
+              <a:rPr lang="en-GB" noProof="0" dirty="0"/>
+              <a:t> </a:t>
+            </a:r>
+            <a:r>
+              <a:rPr lang="en-GB" noProof="0" dirty="0" err="1"/>
+              <a:t>Eigenschaften</a:t>
+            </a:r>
+            <a:r>
+              <a:rPr lang="en-GB" noProof="0" dirty="0"/>
+              <a:t> der </a:t>
+            </a:r>
+            <a:r>
+              <a:rPr lang="en-GB" noProof="0" dirty="0" err="1"/>
+              <a:t>einzelnen</a:t>
+            </a:r>
+            <a:r>
+              <a:rPr lang="en-GB" noProof="0" dirty="0"/>
+              <a:t> </a:t>
+            </a:r>
+            <a:r>
+              <a:rPr lang="en-GB" noProof="0" dirty="0" err="1"/>
+              <a:t>Proteine</a:t>
+            </a:r>
+            <a:r>
+              <a:rPr lang="en-GB" noProof="0" dirty="0"/>
+              <a:t>, </a:t>
+            </a:r>
+            <a:r>
+              <a:rPr lang="en-GB" noProof="0" dirty="0" err="1"/>
+              <a:t>auch</a:t>
+            </a:r>
+            <a:r>
+              <a:rPr lang="en-GB" noProof="0" dirty="0"/>
+              <a:t> </a:t>
+            </a:r>
+            <a:r>
+              <a:rPr lang="en-GB" noProof="0" dirty="0" err="1"/>
+              <a:t>nicht</a:t>
+            </a:r>
+            <a:r>
+              <a:rPr lang="en-GB" noProof="0" dirty="0"/>
+              <a:t> auf </a:t>
+            </a:r>
+            <a:r>
+              <a:rPr lang="en-GB" noProof="0" dirty="0" err="1"/>
+              <a:t>bestimmten</a:t>
+            </a:r>
+            <a:r>
+              <a:rPr lang="en-GB" noProof="0" dirty="0"/>
+              <a:t> RNA/Protein-</a:t>
+            </a:r>
+            <a:r>
+              <a:rPr lang="en-GB" noProof="0" dirty="0" err="1"/>
+              <a:t>Sequenzen</a:t>
+            </a:r>
+            <a:r>
+              <a:rPr lang="en-GB" noProof="0" dirty="0"/>
+              <a:t>, </a:t>
+            </a:r>
+            <a:r>
+              <a:rPr lang="en-GB" noProof="0" dirty="0" err="1"/>
+              <a:t>liefert</a:t>
+            </a:r>
+            <a:r>
+              <a:rPr lang="en-GB" noProof="0" dirty="0"/>
+              <a:t> quantitative </a:t>
+            </a:r>
+            <a:r>
+              <a:rPr lang="en-GB" noProof="0" dirty="0" err="1"/>
+              <a:t>Aussagen</a:t>
+            </a:r>
+            <a:r>
+              <a:rPr lang="en-GB" noProof="0" dirty="0"/>
+              <a:t> </a:t>
+            </a:r>
+            <a:r>
+              <a:rPr lang="en-GB" noProof="0" dirty="0" err="1"/>
+              <a:t>über</a:t>
+            </a:r>
+            <a:r>
+              <a:rPr lang="en-GB" noProof="0" dirty="0"/>
+              <a:t> den </a:t>
+            </a:r>
+            <a:r>
+              <a:rPr lang="en-GB" noProof="0" dirty="0" err="1"/>
+              <a:t>Anteil</a:t>
+            </a:r>
+            <a:r>
+              <a:rPr lang="en-GB" noProof="0" dirty="0"/>
+              <a:t> </a:t>
+            </a:r>
+            <a:r>
+              <a:rPr lang="en-GB" noProof="0" dirty="0" err="1"/>
+              <a:t>jedes</a:t>
+            </a:r>
+            <a:r>
+              <a:rPr lang="en-GB" noProof="0" dirty="0"/>
+              <a:t> RBP, der </a:t>
+            </a:r>
+            <a:r>
+              <a:rPr lang="en-GB" noProof="0" dirty="0" err="1"/>
+              <a:t>tatsächlich</a:t>
+            </a:r>
+            <a:r>
+              <a:rPr lang="en-GB" noProof="0" dirty="0"/>
+              <a:t> an die RNA </a:t>
+            </a:r>
+            <a:r>
+              <a:rPr lang="en-GB" noProof="0" dirty="0" err="1"/>
+              <a:t>angelagert</a:t>
+            </a:r>
+            <a:r>
+              <a:rPr lang="en-GB" noProof="0" dirty="0"/>
+              <a:t> </a:t>
+            </a:r>
+            <a:r>
+              <a:rPr lang="en-GB" noProof="0" dirty="0" err="1"/>
+              <a:t>ist</a:t>
+            </a:r>
+            <a:endParaRPr lang="en-GB" noProof="0" dirty="0"/>
+          </a:p>
+          <a:p>
+            <a:r>
+              <a:rPr lang="en-GB" noProof="0" dirty="0" err="1"/>
+              <a:t>Limitationen</a:t>
+            </a:r>
+            <a:r>
+              <a:rPr lang="en-GB" noProof="0" dirty="0"/>
+              <a:t>: </a:t>
+            </a:r>
+            <a:r>
+              <a:rPr lang="en-GB" noProof="0" dirty="0" err="1"/>
+              <a:t>Identifiziert</a:t>
+            </a:r>
+            <a:r>
+              <a:rPr lang="en-GB" noProof="0" dirty="0"/>
+              <a:t> </a:t>
+            </a:r>
+            <a:r>
+              <a:rPr lang="en-GB" noProof="0" dirty="0" err="1"/>
+              <a:t>nicht</a:t>
+            </a:r>
+            <a:r>
+              <a:rPr lang="en-GB" noProof="0" dirty="0"/>
+              <a:t> die binding sites, </a:t>
+            </a:r>
+            <a:r>
+              <a:rPr lang="en-GB" noProof="0" dirty="0" err="1"/>
+              <a:t>keine</a:t>
+            </a:r>
+            <a:r>
+              <a:rPr lang="en-GB" noProof="0" dirty="0"/>
+              <a:t> </a:t>
+            </a:r>
+            <a:r>
+              <a:rPr lang="en-GB" noProof="0" dirty="0" err="1"/>
+              <a:t>Unterscheidung</a:t>
+            </a:r>
+            <a:r>
+              <a:rPr lang="en-GB" noProof="0" dirty="0"/>
+              <a:t> </a:t>
+            </a:r>
+            <a:r>
+              <a:rPr lang="en-GB" noProof="0" dirty="0" err="1"/>
+              <a:t>zwischen</a:t>
+            </a:r>
+            <a:r>
+              <a:rPr lang="en-GB" noProof="0" dirty="0"/>
+              <a:t> </a:t>
+            </a:r>
+            <a:r>
+              <a:rPr lang="en-GB" noProof="0" dirty="0" err="1"/>
+              <a:t>direkten</a:t>
+            </a:r>
+            <a:r>
+              <a:rPr lang="en-GB" noProof="0" dirty="0"/>
+              <a:t> und </a:t>
+            </a:r>
+            <a:r>
+              <a:rPr lang="en-GB" noProof="0" dirty="0" err="1"/>
+              <a:t>indirekten</a:t>
+            </a:r>
+            <a:r>
+              <a:rPr lang="en-GB" noProof="0" dirty="0"/>
+              <a:t> </a:t>
+            </a:r>
+            <a:r>
+              <a:rPr lang="en-GB" noProof="0" dirty="0" err="1"/>
+              <a:t>Interaktionen</a:t>
+            </a:r>
+            <a:endParaRPr lang="en-GB" noProof="0" dirty="0"/>
           </a:p>
           <a:p>
             <a:pPr marL="0" indent="0">
               <a:buNone/>
             </a:pPr>
-            <a:endParaRPr lang="de-DE" dirty="0"/>
+            <a:endParaRPr lang="en-GB" noProof="0" dirty="0"/>
           </a:p>
         </p:txBody>
       </p:sp>
@@ -5872,113 +6051,25 @@
           <a:lstStyle/>
           <a:p>
             <a:r>
-              <a:rPr lang="de-DE" dirty="0" err="1"/>
-              <a:t>Detection</a:t>
-            </a:r>
-            <a:r>
-              <a:rPr lang="de-DE" dirty="0"/>
-              <a:t> </a:t>
-            </a:r>
-            <a:r>
-              <a:rPr lang="de-DE" dirty="0" err="1"/>
-              <a:t>of</a:t>
-            </a:r>
-            <a:r>
-              <a:rPr lang="de-DE" dirty="0"/>
-              <a:t> all RNA-</a:t>
-            </a:r>
-            <a:r>
-              <a:rPr lang="de-DE" dirty="0" err="1"/>
-              <a:t>dependent</a:t>
-            </a:r>
-            <a:r>
-              <a:rPr lang="de-DE" dirty="0"/>
-              <a:t> </a:t>
-            </a:r>
-            <a:r>
-              <a:rPr lang="de-DE" dirty="0" err="1"/>
-              <a:t>proteins</a:t>
-            </a:r>
-            <a:r>
-              <a:rPr lang="de-DE" dirty="0"/>
-              <a:t>, </a:t>
-            </a:r>
-            <a:r>
-              <a:rPr lang="de-DE" dirty="0" err="1"/>
-              <a:t>that</a:t>
-            </a:r>
-            <a:r>
-              <a:rPr lang="de-DE" dirty="0"/>
-              <a:t> </a:t>
-            </a:r>
-            <a:r>
-              <a:rPr lang="de-DE" dirty="0" err="1"/>
-              <a:t>interact</a:t>
-            </a:r>
-            <a:r>
-              <a:rPr lang="de-DE" dirty="0"/>
-              <a:t> </a:t>
-            </a:r>
-            <a:r>
-              <a:rPr lang="de-DE" dirty="0" err="1"/>
+              <a:rPr lang="en-GB" noProof="0" dirty="0"/>
+              <a:t>Detection of all RNA-dependent proteins, that interact </a:t>
+            </a:r>
+            <a:r>
+              <a:rPr lang="en-GB" noProof="0" dirty="0" err="1"/>
               <a:t>direclty</a:t>
             </a:r>
             <a:r>
-              <a:rPr lang="de-DE" dirty="0"/>
-              <a:t> </a:t>
-            </a:r>
-            <a:r>
-              <a:rPr lang="de-DE" dirty="0" err="1"/>
-              <a:t>or</a:t>
-            </a:r>
-            <a:r>
-              <a:rPr lang="de-DE" dirty="0"/>
-              <a:t> </a:t>
-            </a:r>
-            <a:r>
-              <a:rPr lang="de-DE" dirty="0" err="1"/>
-              <a:t>indirectly</a:t>
-            </a:r>
-            <a:r>
-              <a:rPr lang="de-DE" dirty="0"/>
-              <a:t> </a:t>
-            </a:r>
-            <a:r>
-              <a:rPr lang="de-DE" dirty="0" err="1"/>
-              <a:t>with</a:t>
-            </a:r>
-            <a:r>
-              <a:rPr lang="de-DE" dirty="0"/>
-              <a:t> RNA</a:t>
-            </a:r>
-          </a:p>
-          <a:p>
-            <a:endParaRPr lang="de-DE" dirty="0"/>
-          </a:p>
-          <a:p>
-            <a:r>
-              <a:rPr lang="de-DE" dirty="0" err="1"/>
-              <a:t>Proteome-wide</a:t>
-            </a:r>
-            <a:r>
-              <a:rPr lang="de-DE" dirty="0"/>
-              <a:t>, </a:t>
-            </a:r>
-            <a:r>
-              <a:rPr lang="de-DE" dirty="0" err="1"/>
-              <a:t>unbiased</a:t>
-            </a:r>
-            <a:r>
-              <a:rPr lang="de-DE" dirty="0"/>
-              <a:t>, </a:t>
-            </a:r>
-            <a:r>
-              <a:rPr lang="de-DE" dirty="0" err="1"/>
-              <a:t>enrichment-free</a:t>
-            </a:r>
-            <a:r>
-              <a:rPr lang="de-DE" dirty="0"/>
-              <a:t> screen </a:t>
+              <a:rPr lang="en-GB" noProof="0" dirty="0"/>
+              <a:t> or indirectly with RNA</a:t>
+            </a:r>
+          </a:p>
+          <a:p>
+            <a:endParaRPr lang="en-GB" noProof="0" dirty="0"/>
+          </a:p>
+          <a:p>
+            <a:r>
+              <a:rPr lang="en-GB" noProof="0" dirty="0"/>
+              <a:t>Proteome-wide, unbiased, enrichment-free screen </a:t>
             </a:r>
           </a:p>
         </p:txBody>
@@ -6089,7 +6180,7 @@
           <a:lstStyle/>
           <a:p>
             <a:r>
-              <a:rPr lang="de-DE" sz="2400" dirty="0"/>
+              <a:rPr lang="en-GB" sz="2400" noProof="0" dirty="0"/>
               <a:t>Advantages</a:t>
             </a:r>
           </a:p>
@@ -6098,7 +6189,7 @@
               <a:buFont typeface="Arial" panose="020B0604020202020204" pitchFamily="34" charset="0"/>
               <a:buChar char="•"/>
             </a:pPr>
-            <a:endParaRPr lang="de-DE" sz="2400" dirty="0"/>
+            <a:endParaRPr lang="en-GB" sz="2400" noProof="0" dirty="0"/>
           </a:p>
           <a:p>
             <a:pPr marL="342900" indent="-342900">
@@ -6106,14 +6197,9 @@
               <a:buChar char="•"/>
             </a:pPr>
             <a:r>
-              <a:rPr lang="de-DE" sz="2400" dirty="0"/>
-              <a:t>Quantitative </a:t>
-            </a:r>
-            <a:r>
-              <a:rPr lang="de-DE" sz="2400" dirty="0" err="1"/>
-              <a:t>information</a:t>
-            </a:r>
-            <a:endParaRPr lang="de-DE" sz="2400" dirty="0"/>
+              <a:rPr lang="en-GB" sz="2400" noProof="0" dirty="0"/>
+              <a:t>Quantitative information</a:t>
+            </a:r>
           </a:p>
           <a:p>
             <a:pPr marL="342900" indent="-342900">
@@ -6121,34 +6207,17 @@
               <a:buChar char="•"/>
             </a:pPr>
             <a:r>
-              <a:rPr lang="de-DE" sz="2400" dirty="0" err="1"/>
-              <a:t>independent</a:t>
-            </a:r>
-            <a:r>
-              <a:rPr lang="de-DE" sz="2400" dirty="0"/>
-              <a:t> </a:t>
-            </a:r>
-            <a:r>
-              <a:rPr lang="de-DE" sz="2400" dirty="0" err="1"/>
-              <a:t>of</a:t>
-            </a:r>
-            <a:r>
-              <a:rPr lang="de-DE" sz="2400" dirty="0"/>
-              <a:t> </a:t>
-            </a:r>
-            <a:r>
-              <a:rPr lang="de-DE" sz="2400" dirty="0" err="1"/>
+              <a:rPr lang="en-GB" sz="2400" noProof="0" dirty="0"/>
+              <a:t>independent of </a:t>
+            </a:r>
+            <a:r>
+              <a:rPr lang="en-GB" sz="2400" noProof="0" dirty="0" err="1"/>
               <a:t>purifiction</a:t>
             </a:r>
             <a:r>
-              <a:rPr lang="de-DE" sz="2400" dirty="0"/>
-              <a:t> </a:t>
-            </a:r>
-            <a:r>
-              <a:rPr lang="de-DE" sz="2400" dirty="0" err="1"/>
-              <a:t>procedures</a:t>
-            </a:r>
-            <a:endParaRPr lang="de-DE" sz="2400" dirty="0"/>
+              <a:rPr lang="en-GB" sz="2400" noProof="0" dirty="0"/>
+              <a:t> procedures</a:t>
+            </a:r>
           </a:p>
           <a:p>
             <a:pPr marL="342900" indent="-342900">
@@ -6156,26 +6225,17 @@
               <a:buChar char="•"/>
             </a:pPr>
             <a:r>
-              <a:rPr lang="de-DE" sz="2400" dirty="0" err="1"/>
-              <a:t>specific</a:t>
-            </a:r>
-            <a:r>
-              <a:rPr lang="de-DE" sz="2400" dirty="0"/>
-              <a:t> </a:t>
-            </a:r>
-            <a:r>
-              <a:rPr lang="de-DE" sz="2400" dirty="0" err="1"/>
+              <a:rPr lang="en-GB" sz="2400" noProof="0" dirty="0"/>
+              <a:t>specific </a:t>
+            </a:r>
+            <a:r>
+              <a:rPr lang="en-GB" sz="2400" noProof="0" dirty="0" err="1"/>
               <a:t>fo</a:t>
             </a:r>
             <a:r>
-              <a:rPr lang="de-DE" sz="2400" dirty="0"/>
-              <a:t> RNA-</a:t>
-            </a:r>
-            <a:r>
-              <a:rPr lang="de-DE" sz="2400" dirty="0" err="1"/>
-              <a:t>dependency</a:t>
-            </a:r>
-            <a:endParaRPr lang="de-DE" sz="2400" dirty="0"/>
+              <a:rPr lang="en-GB" sz="2400" noProof="0" dirty="0"/>
+              <a:t> RNA-dependency</a:t>
+            </a:r>
           </a:p>
         </p:txBody>
       </p:sp>
@@ -6208,13 +6268,12 @@
           <a:lstStyle/>
           <a:p>
             <a:r>
-              <a:rPr lang="de-DE" sz="2400" dirty="0" err="1"/>
+              <a:rPr lang="en-GB" sz="2400" noProof="0" dirty="0"/>
               <a:t>Limitations</a:t>
             </a:r>
-            <a:endParaRPr lang="de-DE" sz="2400" dirty="0"/>
-          </a:p>
-          <a:p>
-            <a:endParaRPr lang="de-DE" sz="2400" dirty="0"/>
+          </a:p>
+          <a:p>
+            <a:endParaRPr lang="en-GB" sz="2400" noProof="0" dirty="0"/>
           </a:p>
           <a:p>
             <a:pPr marL="342900" indent="-342900">
@@ -6222,42 +6281,17 @@
               <a:buChar char="•"/>
             </a:pPr>
             <a:r>
-              <a:rPr lang="de-DE" sz="2400" dirty="0" err="1"/>
-              <a:t>No</a:t>
-            </a:r>
-            <a:r>
-              <a:rPr lang="de-DE" sz="2400" dirty="0"/>
-              <a:t> </a:t>
-            </a:r>
-            <a:r>
-              <a:rPr lang="de-DE" sz="2400" dirty="0" err="1"/>
+              <a:rPr lang="en-GB" sz="2400" noProof="0" dirty="0"/>
+              <a:t>No </a:t>
+            </a:r>
+            <a:r>
+              <a:rPr lang="en-GB" sz="2400" noProof="0" dirty="0" err="1"/>
               <a:t>idenfitication</a:t>
             </a:r>
             <a:r>
-              <a:rPr lang="de-DE" sz="2400" dirty="0"/>
-              <a:t> </a:t>
-            </a:r>
-            <a:r>
-              <a:rPr lang="de-DE" sz="2400" dirty="0" err="1"/>
-              <a:t>of</a:t>
-            </a:r>
-            <a:r>
-              <a:rPr lang="de-DE" sz="2400" dirty="0"/>
-              <a:t> </a:t>
-            </a:r>
-            <a:r>
-              <a:rPr lang="de-DE" sz="2400" dirty="0" err="1"/>
-              <a:t>binding</a:t>
-            </a:r>
-            <a:r>
-              <a:rPr lang="de-DE" sz="2400" dirty="0"/>
-              <a:t> </a:t>
-            </a:r>
-            <a:r>
-              <a:rPr lang="de-DE" sz="2400" dirty="0" err="1"/>
-              <a:t>sites</a:t>
-            </a:r>
-            <a:endParaRPr lang="de-DE" sz="2400" dirty="0"/>
+              <a:rPr lang="en-GB" sz="2400" noProof="0" dirty="0"/>
+              <a:t> of binding sites</a:t>
+            </a:r>
           </a:p>
           <a:p>
             <a:pPr marL="342900" indent="-342900">
@@ -6265,66 +6299,9 @@
               <a:buChar char="•"/>
             </a:pPr>
             <a:r>
-              <a:rPr lang="de-DE" sz="2400" dirty="0" err="1"/>
-              <a:t>No</a:t>
-            </a:r>
-            <a:r>
-              <a:rPr lang="de-DE" sz="2400" dirty="0"/>
-              <a:t> </a:t>
-            </a:r>
-            <a:r>
-              <a:rPr lang="de-DE" sz="2400" dirty="0" err="1"/>
-              <a:t>differentiation</a:t>
-            </a:r>
-            <a:r>
-              <a:rPr lang="de-DE" sz="2400" dirty="0"/>
-              <a:t> </a:t>
-            </a:r>
-            <a:r>
-              <a:rPr lang="de-DE" sz="2400" dirty="0" err="1"/>
-              <a:t>of</a:t>
-            </a:r>
-            <a:r>
-              <a:rPr lang="de-DE" sz="2400" dirty="0"/>
-              <a:t> </a:t>
-            </a:r>
-            <a:r>
-              <a:rPr lang="de-DE" sz="2400" dirty="0" err="1"/>
-              <a:t>direct</a:t>
-            </a:r>
-            <a:r>
-              <a:rPr lang="de-DE" sz="2400" dirty="0"/>
-              <a:t> and </a:t>
-            </a:r>
-            <a:r>
-              <a:rPr lang="de-DE" sz="2400" dirty="0" err="1"/>
-              <a:t>indirect</a:t>
-            </a:r>
-            <a:r>
-              <a:rPr lang="de-DE" sz="2400" dirty="0"/>
-              <a:t> </a:t>
-            </a:r>
-            <a:r>
-              <a:rPr lang="de-DE" sz="2400" dirty="0" err="1"/>
-              <a:t>interactions</a:t>
-            </a:r>
-            <a:r>
-              <a:rPr lang="de-DE" sz="2400" dirty="0"/>
-              <a:t> </a:t>
-            </a:r>
-            <a:r>
-              <a:rPr lang="de-DE" sz="2400" dirty="0" err="1"/>
-              <a:t>of</a:t>
-            </a:r>
-            <a:r>
-              <a:rPr lang="de-DE" sz="2400" dirty="0"/>
-              <a:t> </a:t>
-            </a:r>
-            <a:r>
-              <a:rPr lang="de-DE" sz="2400" dirty="0" err="1"/>
-              <a:t>RBPs</a:t>
-            </a:r>
-            <a:endParaRPr lang="de-DE" sz="2400" dirty="0"/>
+              <a:rPr lang="en-GB" sz="2400" noProof="0" dirty="0"/>
+              <a:t>No differentiation of direct and indirect interactions of RBPs</a:t>
+            </a:r>
           </a:p>
         </p:txBody>
       </p:sp>
@@ -6691,24 +6668,16 @@
           <a:p>
             <a:pPr algn="ctr"/>
             <a:r>
-              <a:rPr lang="de-DE" dirty="0"/>
+              <a:rPr lang="en-GB" noProof="0" dirty="0"/>
               <a:t>R-</a:t>
             </a:r>
             <a:r>
-              <a:rPr lang="de-DE" dirty="0" err="1"/>
+              <a:rPr lang="en-GB" noProof="0" dirty="0" err="1"/>
               <a:t>DeeP</a:t>
             </a:r>
             <a:r>
-              <a:rPr lang="de-DE" dirty="0"/>
-              <a:t> – </a:t>
-            </a:r>
-            <a:r>
-              <a:rPr lang="de-DE" dirty="0" err="1"/>
-              <a:t>Principle</a:t>
-            </a:r>
-            <a:r>
-              <a:rPr lang="de-DE" dirty="0"/>
-              <a:t> </a:t>
+              <a:rPr lang="en-GB" noProof="0" dirty="0"/>
+              <a:t> – Principle </a:t>
             </a:r>
           </a:p>
         </p:txBody>
@@ -6747,70 +6716,10 @@
               </a:lnSpc>
             </a:pPr>
             <a:r>
-              <a:rPr lang="de-DE" sz="2000" dirty="0">
+              <a:rPr lang="en-GB" sz="2000" noProof="0" dirty="0">
                 <a:sym typeface="Wingdings" panose="05000000000000000000" pitchFamily="2" charset="2"/>
               </a:rPr>
-              <a:t>RNA </a:t>
-            </a:r>
-            <a:r>
-              <a:rPr lang="de-DE" sz="2000" dirty="0" err="1">
-                <a:sym typeface="Wingdings" panose="05000000000000000000" pitchFamily="2" charset="2"/>
-              </a:rPr>
-              <a:t>degradation</a:t>
-            </a:r>
-            <a:r>
-              <a:rPr lang="de-DE" sz="2000" dirty="0">
-                <a:sym typeface="Wingdings" panose="05000000000000000000" pitchFamily="2" charset="2"/>
-              </a:rPr>
-              <a:t> </a:t>
-            </a:r>
-            <a:r>
-              <a:rPr lang="de-DE" sz="2000" dirty="0" err="1">
-                <a:sym typeface="Wingdings" panose="05000000000000000000" pitchFamily="2" charset="2"/>
-              </a:rPr>
-              <a:t>leads</a:t>
-            </a:r>
-            <a:r>
-              <a:rPr lang="de-DE" sz="2000" dirty="0">
-                <a:sym typeface="Wingdings" panose="05000000000000000000" pitchFamily="2" charset="2"/>
-              </a:rPr>
-              <a:t> </a:t>
-            </a:r>
-            <a:r>
-              <a:rPr lang="de-DE" sz="2000" dirty="0" err="1">
-                <a:sym typeface="Wingdings" panose="05000000000000000000" pitchFamily="2" charset="2"/>
-              </a:rPr>
-              <a:t>to</a:t>
-            </a:r>
-            <a:r>
-              <a:rPr lang="de-DE" sz="2000" dirty="0">
-                <a:sym typeface="Wingdings" panose="05000000000000000000" pitchFamily="2" charset="2"/>
-              </a:rPr>
-              <a:t> </a:t>
-            </a:r>
-            <a:r>
-              <a:rPr lang="de-DE" sz="2000" dirty="0" err="1">
-                <a:sym typeface="Wingdings" panose="05000000000000000000" pitchFamily="2" charset="2"/>
-              </a:rPr>
-              <a:t>dissolved</a:t>
-            </a:r>
-            <a:r>
-              <a:rPr lang="de-DE" sz="2000" dirty="0">
-                <a:sym typeface="Wingdings" panose="05000000000000000000" pitchFamily="2" charset="2"/>
-              </a:rPr>
-              <a:t> RNP-</a:t>
-            </a:r>
-            <a:r>
-              <a:rPr lang="de-DE" sz="2000" dirty="0" err="1">
-                <a:sym typeface="Wingdings" panose="05000000000000000000" pitchFamily="2" charset="2"/>
-              </a:rPr>
-              <a:t>complexes</a:t>
-            </a:r>
-            <a:r>
-              <a:rPr lang="de-DE" sz="2000" dirty="0">
-                <a:sym typeface="Wingdings" panose="05000000000000000000" pitchFamily="2" charset="2"/>
-              </a:rPr>
-              <a:t> </a:t>
+              <a:t>RNA degradation leads to dissolved RNP-complexes </a:t>
             </a:r>
           </a:p>
           <a:p>
@@ -6820,7 +6729,7 @@
               </a:lnSpc>
               <a:buNone/>
             </a:pPr>
-            <a:endParaRPr lang="de-DE" sz="800" dirty="0">
+            <a:endParaRPr lang="en-GB" sz="800" noProof="0" dirty="0">
               <a:sym typeface="Wingdings" panose="05000000000000000000" pitchFamily="2" charset="2"/>
             </a:endParaRPr>
           </a:p>
@@ -6831,81 +6740,21 @@
               </a:lnSpc>
             </a:pPr>
             <a:r>
-              <a:rPr lang="de-DE" sz="2000" dirty="0" err="1">
+              <a:rPr lang="en-GB" sz="2000" noProof="0" dirty="0">
                 <a:sym typeface="Wingdings" panose="05000000000000000000" pitchFamily="2" charset="2"/>
               </a:rPr>
-              <a:t>Released</a:t>
-            </a:r>
-            <a:r>
-              <a:rPr lang="de-DE" sz="2000" dirty="0">
-                <a:sym typeface="Wingdings" panose="05000000000000000000" pitchFamily="2" charset="2"/>
-              </a:rPr>
-              <a:t> </a:t>
-            </a:r>
-            <a:r>
-              <a:rPr lang="de-DE" sz="2000" dirty="0" err="1">
-                <a:sym typeface="Wingdings" panose="05000000000000000000" pitchFamily="2" charset="2"/>
-              </a:rPr>
-              <a:t>proteins</a:t>
-            </a:r>
-            <a:r>
-              <a:rPr lang="de-DE" sz="2000" dirty="0">
-                <a:sym typeface="Wingdings" panose="05000000000000000000" pitchFamily="2" charset="2"/>
-              </a:rPr>
-              <a:t> </a:t>
-            </a:r>
-            <a:r>
-              <a:rPr lang="de-DE" sz="2000" dirty="0" err="1">
-                <a:sym typeface="Wingdings" panose="05000000000000000000" pitchFamily="2" charset="2"/>
-              </a:rPr>
-              <a:t>migrate</a:t>
-            </a:r>
-            <a:r>
-              <a:rPr lang="de-DE" sz="2000" dirty="0">
-                <a:sym typeface="Wingdings" panose="05000000000000000000" pitchFamily="2" charset="2"/>
-              </a:rPr>
-              <a:t> </a:t>
-            </a:r>
-            <a:r>
-              <a:rPr lang="de-DE" sz="2000" dirty="0" err="1">
-                <a:sym typeface="Wingdings" panose="05000000000000000000" pitchFamily="2" charset="2"/>
-              </a:rPr>
-              <a:t>into</a:t>
-            </a:r>
-            <a:r>
-              <a:rPr lang="de-DE" sz="2000" dirty="0">
-                <a:sym typeface="Wingdings" panose="05000000000000000000" pitchFamily="2" charset="2"/>
-              </a:rPr>
-              <a:t> different </a:t>
+              <a:t>Released proteins migrate into different </a:t>
             </a:r>
             <a:br>
-              <a:rPr lang="de-DE" sz="2000" dirty="0">
+              <a:rPr lang="en-GB" sz="2000" noProof="0" dirty="0">
                 <a:sym typeface="Wingdings" panose="05000000000000000000" pitchFamily="2" charset="2"/>
               </a:rPr>
             </a:br>
             <a:r>
-              <a:rPr lang="de-DE" sz="2000" dirty="0" err="1">
+              <a:rPr lang="en-GB" sz="2000" noProof="0" dirty="0">
                 <a:sym typeface="Wingdings" panose="05000000000000000000" pitchFamily="2" charset="2"/>
               </a:rPr>
-              <a:t>density</a:t>
-            </a:r>
-            <a:r>
-              <a:rPr lang="de-DE" sz="2000" dirty="0">
-                <a:sym typeface="Wingdings" panose="05000000000000000000" pitchFamily="2" charset="2"/>
-              </a:rPr>
-              <a:t> </a:t>
-            </a:r>
-            <a:r>
-              <a:rPr lang="de-DE" sz="2000" dirty="0" err="1">
-                <a:sym typeface="Wingdings" panose="05000000000000000000" pitchFamily="2" charset="2"/>
-              </a:rPr>
-              <a:t>fractions</a:t>
-            </a:r>
-            <a:r>
-              <a:rPr lang="de-DE" sz="2000" dirty="0">
-                <a:sym typeface="Wingdings" panose="05000000000000000000" pitchFamily="2" charset="2"/>
-              </a:rPr>
-              <a:t> </a:t>
+              <a:t>density fractions </a:t>
             </a:r>
           </a:p>
           <a:p>
@@ -6915,7 +6764,7 @@
               </a:lnSpc>
               <a:buNone/>
             </a:pPr>
-            <a:endParaRPr lang="de-DE" sz="800" dirty="0"/>
+            <a:endParaRPr lang="en-GB" sz="800" noProof="0" dirty="0"/>
           </a:p>
           <a:p>
             <a:pPr>
@@ -6924,96 +6773,18 @@
               </a:lnSpc>
             </a:pPr>
             <a:r>
-              <a:rPr lang="de-DE" sz="2000" dirty="0" err="1">
+              <a:rPr lang="en-GB" sz="2000" noProof="0" dirty="0">
                 <a:sym typeface="Wingdings" panose="05000000000000000000" pitchFamily="2" charset="2"/>
               </a:rPr>
-              <a:t>Quantity</a:t>
-            </a:r>
-            <a:r>
-              <a:rPr lang="de-DE" sz="2000" dirty="0">
-                <a:sym typeface="Wingdings" panose="05000000000000000000" pitchFamily="2" charset="2"/>
-              </a:rPr>
-              <a:t> </a:t>
-            </a:r>
-            <a:r>
-              <a:rPr lang="de-DE" sz="2000" dirty="0" err="1">
-                <a:sym typeface="Wingdings" panose="05000000000000000000" pitchFamily="2" charset="2"/>
-              </a:rPr>
-              <a:t>of</a:t>
-            </a:r>
-            <a:r>
-              <a:rPr lang="de-DE" sz="2000" dirty="0">
-                <a:sym typeface="Wingdings" panose="05000000000000000000" pitchFamily="2" charset="2"/>
-              </a:rPr>
-              <a:t> </a:t>
-            </a:r>
-            <a:r>
-              <a:rPr lang="de-DE" sz="2000" dirty="0" err="1">
-                <a:sym typeface="Wingdings" panose="05000000000000000000" pitchFamily="2" charset="2"/>
-              </a:rPr>
-              <a:t>peptides</a:t>
-            </a:r>
-            <a:r>
-              <a:rPr lang="de-DE" sz="2000" dirty="0">
-                <a:sym typeface="Wingdings" panose="05000000000000000000" pitchFamily="2" charset="2"/>
-              </a:rPr>
-              <a:t> in </a:t>
-            </a:r>
-            <a:r>
-              <a:rPr lang="de-DE" sz="2000" dirty="0" err="1">
-                <a:sym typeface="Wingdings" panose="05000000000000000000" pitchFamily="2" charset="2"/>
-              </a:rPr>
-              <a:t>the</a:t>
-            </a:r>
-            <a:r>
-              <a:rPr lang="de-DE" sz="2000" dirty="0">
-                <a:sym typeface="Wingdings" panose="05000000000000000000" pitchFamily="2" charset="2"/>
-              </a:rPr>
-              <a:t> different </a:t>
-            </a:r>
-            <a:r>
-              <a:rPr lang="de-DE" sz="2000" dirty="0" err="1">
-                <a:sym typeface="Wingdings" panose="05000000000000000000" pitchFamily="2" charset="2"/>
-              </a:rPr>
-              <a:t>density</a:t>
-            </a:r>
-            <a:r>
-              <a:rPr lang="de-DE" sz="2000" dirty="0">
-                <a:sym typeface="Wingdings" panose="05000000000000000000" pitchFamily="2" charset="2"/>
-              </a:rPr>
-              <a:t> </a:t>
-            </a:r>
-            <a:r>
-              <a:rPr lang="de-DE" sz="2000" dirty="0" err="1">
-                <a:sym typeface="Wingdings" panose="05000000000000000000" pitchFamily="2" charset="2"/>
-              </a:rPr>
-              <a:t>fractions</a:t>
-            </a:r>
-            <a:r>
-              <a:rPr lang="de-DE" sz="2000" dirty="0">
-                <a:sym typeface="Wingdings" panose="05000000000000000000" pitchFamily="2" charset="2"/>
-              </a:rPr>
-              <a:t> </a:t>
-            </a:r>
-            <a:r>
-              <a:rPr lang="de-DE" sz="2000" dirty="0" err="1">
-                <a:sym typeface="Wingdings" panose="05000000000000000000" pitchFamily="2" charset="2"/>
-              </a:rPr>
-              <a:t>is</a:t>
-            </a:r>
-            <a:r>
-              <a:rPr lang="de-DE" sz="2000" dirty="0">
-                <a:sym typeface="Wingdings" panose="05000000000000000000" pitchFamily="2" charset="2"/>
-              </a:rPr>
-              <a:t> </a:t>
-            </a:r>
-            <a:r>
-              <a:rPr lang="de-DE" sz="2000" dirty="0" err="1">
+              <a:t>Quantity of peptides in the different density fractions is </a:t>
+            </a:r>
+            <a:r>
+              <a:rPr lang="en-GB" sz="2000" noProof="0" dirty="0" err="1">
                 <a:sym typeface="Wingdings" panose="05000000000000000000" pitchFamily="2" charset="2"/>
               </a:rPr>
               <a:t>analyzed</a:t>
             </a:r>
-            <a:endParaRPr lang="de-DE" sz="2000" dirty="0"/>
+            <a:endParaRPr lang="en-GB" sz="2000" noProof="0" dirty="0"/>
           </a:p>
         </p:txBody>
       </p:sp>
@@ -7051,48 +6822,8 @@
           <a:lstStyle/>
           <a:p>
             <a:r>
-              <a:rPr lang="de-DE" sz="2400" dirty="0"/>
-              <a:t>An RNA-</a:t>
-            </a:r>
-            <a:r>
-              <a:rPr lang="de-DE" sz="2400" dirty="0" err="1"/>
-              <a:t>dependent</a:t>
-            </a:r>
-            <a:r>
-              <a:rPr lang="de-DE" sz="2400" dirty="0"/>
-              <a:t> </a:t>
-            </a:r>
-            <a:r>
-              <a:rPr lang="de-DE" sz="2400" dirty="0" err="1"/>
-              <a:t>protein</a:t>
-            </a:r>
-            <a:r>
-              <a:rPr lang="de-DE" sz="2400" dirty="0"/>
-              <a:t> </a:t>
-            </a:r>
-            <a:r>
-              <a:rPr lang="de-DE" sz="2400" dirty="0" err="1"/>
-              <a:t>must</a:t>
-            </a:r>
-            <a:r>
-              <a:rPr lang="de-DE" sz="2400" dirty="0"/>
-              <a:t> </a:t>
-            </a:r>
-            <a:r>
-              <a:rPr lang="de-DE" sz="2400" dirty="0" err="1"/>
-              <a:t>exhibit</a:t>
-            </a:r>
-            <a:r>
-              <a:rPr lang="de-DE" sz="2400" dirty="0"/>
-              <a:t> a </a:t>
-            </a:r>
-            <a:r>
-              <a:rPr lang="de-DE" sz="2400" dirty="0" err="1"/>
-              <a:t>significant</a:t>
-            </a:r>
-            <a:r>
-              <a:rPr lang="de-DE" sz="2400" dirty="0"/>
-              <a:t> shift </a:t>
+              <a:rPr lang="en-GB" sz="2400" noProof="0" dirty="0"/>
+              <a:t>An RNA-dependent protein must exhibit a significant shift </a:t>
             </a:r>
           </a:p>
         </p:txBody>
@@ -7126,127 +6857,17 @@
           <a:lstStyle/>
           <a:p>
             <a:r>
-              <a:rPr lang="de-DE" sz="1200" dirty="0" err="1">
+              <a:rPr lang="en-GB" sz="1200" noProof="0" dirty="0">
                 <a:solidFill>
                   <a:schemeClr val="bg1">
                     <a:lumMod val="65000"/>
                   </a:schemeClr>
                 </a:solidFill>
               </a:rPr>
-              <a:t>Adapted</a:t>
-            </a:r>
-            <a:r>
-              <a:rPr lang="de-DE" sz="1200" dirty="0">
-                <a:solidFill>
-                  <a:schemeClr val="bg1">
-                    <a:lumMod val="65000"/>
-                  </a:schemeClr>
-                </a:solidFill>
-              </a:rPr>
-              <a:t> </a:t>
-            </a:r>
-            <a:r>
-              <a:rPr lang="de-DE" sz="1200" dirty="0" err="1">
-                <a:solidFill>
-                  <a:schemeClr val="bg1">
-                    <a:lumMod val="65000"/>
-                  </a:schemeClr>
-                </a:solidFill>
-              </a:rPr>
-              <a:t>from</a:t>
-            </a:r>
-            <a:r>
-              <a:rPr lang="de-DE" sz="1200" dirty="0">
-                <a:solidFill>
-                  <a:schemeClr val="bg1">
-                    <a:lumMod val="65000"/>
-                  </a:schemeClr>
-                </a:solidFill>
-              </a:rPr>
-              <a:t>: Caudron-Herger, M., </a:t>
-            </a:r>
-            <a:r>
-              <a:rPr lang="de-DE" sz="1200" dirty="0" err="1">
-                <a:solidFill>
-                  <a:schemeClr val="bg1">
-                    <a:lumMod val="65000"/>
-                  </a:schemeClr>
-                </a:solidFill>
-              </a:rPr>
-              <a:t>Rusin</a:t>
-            </a:r>
-            <a:r>
-              <a:rPr lang="de-DE" sz="1200" dirty="0">
-                <a:solidFill>
-                  <a:schemeClr val="bg1">
-                    <a:lumMod val="65000"/>
-                  </a:schemeClr>
-                </a:solidFill>
-              </a:rPr>
-              <a:t>, </a:t>
-            </a:r>
-            <a:r>
-              <a:rPr lang="de-DE" sz="1200" dirty="0" err="1">
-                <a:solidFill>
-                  <a:schemeClr val="bg1">
-                    <a:lumMod val="65000"/>
-                  </a:schemeClr>
-                </a:solidFill>
-              </a:rPr>
-              <a:t>S.F</a:t>
-            </a:r>
-            <a:r>
-              <a:rPr lang="de-DE" sz="1200" dirty="0">
-                <a:solidFill>
-                  <a:schemeClr val="bg1">
-                    <a:lumMod val="65000"/>
-                  </a:schemeClr>
-                </a:solidFill>
-              </a:rPr>
-              <a:t>., Adamo, M.E., Seiler, J., Schmid, </a:t>
-            </a:r>
-            <a:r>
-              <a:rPr lang="de-DE" sz="1200" dirty="0" err="1">
-                <a:solidFill>
-                  <a:schemeClr val="bg1">
-                    <a:lumMod val="65000"/>
-                  </a:schemeClr>
-                </a:solidFill>
-              </a:rPr>
-              <a:t>V.K</a:t>
-            </a:r>
-            <a:r>
-              <a:rPr lang="de-DE" sz="1200" dirty="0">
-                <a:solidFill>
-                  <a:schemeClr val="bg1">
-                    <a:lumMod val="65000"/>
-                  </a:schemeClr>
-                </a:solidFill>
-              </a:rPr>
-              <a:t>., </a:t>
-            </a:r>
-            <a:r>
-              <a:rPr lang="de-DE" sz="1200" dirty="0" err="1">
-                <a:solidFill>
-                  <a:schemeClr val="bg1">
-                    <a:lumMod val="65000"/>
-                  </a:schemeClr>
-                </a:solidFill>
-              </a:rPr>
-              <a:t>Barreau</a:t>
-            </a:r>
-            <a:r>
-              <a:rPr lang="de-DE" sz="1200" dirty="0">
-                <a:solidFill>
-                  <a:schemeClr val="bg1">
-                    <a:lumMod val="65000"/>
-                  </a:schemeClr>
-                </a:solidFill>
-              </a:rPr>
-              <a:t>, E., Kettenbach, A.N., and Diederichs, S. (2019). R-</a:t>
-            </a:r>
-            <a:r>
-              <a:rPr lang="de-DE" sz="1200" dirty="0" err="1">
+              <a:t>Adapted from: Caudron-Herger, M., Rusin, S.F., Adamo, M.E., Seiler, J., Schmid, V.K., Barreau, E., Kettenbach, A.N., and Diederichs, S. (2019). R-</a:t>
+            </a:r>
+            <a:r>
+              <a:rPr lang="en-GB" sz="1200" noProof="0" dirty="0" err="1">
                 <a:solidFill>
                   <a:schemeClr val="bg1">
                     <a:lumMod val="65000"/>
@@ -7256,177 +6877,17 @@
               <a:t>DeeP</a:t>
             </a:r>
             <a:r>
-              <a:rPr lang="de-DE" sz="1200" dirty="0">
+              <a:rPr lang="en-GB" sz="1200" noProof="0" dirty="0">
                 <a:solidFill>
                   <a:schemeClr val="bg1">
                     <a:lumMod val="65000"/>
                   </a:schemeClr>
                 </a:solidFill>
               </a:rPr>
-              <a:t>: </a:t>
-            </a:r>
-            <a:r>
-              <a:rPr lang="de-DE" sz="1200" dirty="0" err="1">
-                <a:solidFill>
-                  <a:schemeClr val="bg1">
-                    <a:lumMod val="65000"/>
-                  </a:schemeClr>
-                </a:solidFill>
-              </a:rPr>
-              <a:t>Proteome-wide</a:t>
-            </a:r>
-            <a:r>
-              <a:rPr lang="de-DE" sz="1200" dirty="0">
-                <a:solidFill>
-                  <a:schemeClr val="bg1">
-                    <a:lumMod val="65000"/>
-                  </a:schemeClr>
-                </a:solidFill>
-              </a:rPr>
-              <a:t> and Quantitative </a:t>
-            </a:r>
-            <a:r>
-              <a:rPr lang="de-DE" sz="1200" dirty="0" err="1">
-                <a:solidFill>
-                  <a:schemeClr val="bg1">
-                    <a:lumMod val="65000"/>
-                  </a:schemeClr>
-                </a:solidFill>
-              </a:rPr>
-              <a:t>Identification</a:t>
-            </a:r>
-            <a:r>
-              <a:rPr lang="de-DE" sz="1200" dirty="0">
-                <a:solidFill>
-                  <a:schemeClr val="bg1">
-                    <a:lumMod val="65000"/>
-                  </a:schemeClr>
-                </a:solidFill>
-              </a:rPr>
-              <a:t> </a:t>
-            </a:r>
-            <a:r>
-              <a:rPr lang="de-DE" sz="1200" dirty="0" err="1">
-                <a:solidFill>
-                  <a:schemeClr val="bg1">
-                    <a:lumMod val="65000"/>
-                  </a:schemeClr>
-                </a:solidFill>
-              </a:rPr>
-              <a:t>of</a:t>
-            </a:r>
-            <a:r>
-              <a:rPr lang="de-DE" sz="1200" dirty="0">
-                <a:solidFill>
-                  <a:schemeClr val="bg1">
-                    <a:lumMod val="65000"/>
-                  </a:schemeClr>
-                </a:solidFill>
-              </a:rPr>
-              <a:t> RNA-</a:t>
-            </a:r>
-            <a:r>
-              <a:rPr lang="de-DE" sz="1200" dirty="0" err="1">
-                <a:solidFill>
-                  <a:schemeClr val="bg1">
-                    <a:lumMod val="65000"/>
-                  </a:schemeClr>
-                </a:solidFill>
-              </a:rPr>
-              <a:t>Dependent</a:t>
-            </a:r>
-            <a:r>
-              <a:rPr lang="de-DE" sz="1200" dirty="0">
-                <a:solidFill>
-                  <a:schemeClr val="bg1">
-                    <a:lumMod val="65000"/>
-                  </a:schemeClr>
-                </a:solidFill>
-              </a:rPr>
-              <a:t> Proteins </a:t>
-            </a:r>
-            <a:r>
-              <a:rPr lang="de-DE" sz="1200" dirty="0" err="1">
-                <a:solidFill>
-                  <a:schemeClr val="bg1">
-                    <a:lumMod val="65000"/>
-                  </a:schemeClr>
-                </a:solidFill>
-              </a:rPr>
-              <a:t>by</a:t>
-            </a:r>
-            <a:r>
-              <a:rPr lang="de-DE" sz="1200" dirty="0">
-                <a:solidFill>
-                  <a:schemeClr val="bg1">
-                    <a:lumMod val="65000"/>
-                  </a:schemeClr>
-                </a:solidFill>
-              </a:rPr>
-              <a:t> Density Gradient </a:t>
-            </a:r>
-            <a:r>
-              <a:rPr lang="de-DE" sz="1200" dirty="0" err="1">
-                <a:solidFill>
-                  <a:schemeClr val="bg1">
-                    <a:lumMod val="65000"/>
-                  </a:schemeClr>
-                </a:solidFill>
-              </a:rPr>
-              <a:t>Ultracentrifugation</a:t>
-            </a:r>
-            <a:r>
-              <a:rPr lang="de-DE" sz="1200" dirty="0">
-                <a:solidFill>
-                  <a:schemeClr val="bg1">
-                    <a:lumMod val="65000"/>
-                  </a:schemeClr>
-                </a:solidFill>
-              </a:rPr>
-              <a:t>. </a:t>
-            </a:r>
-            <a:r>
-              <a:rPr lang="de-DE" sz="1200" dirty="0" err="1">
-                <a:solidFill>
-                  <a:schemeClr val="bg1">
-                    <a:lumMod val="65000"/>
-                  </a:schemeClr>
-                </a:solidFill>
-              </a:rPr>
-              <a:t>Molecular</a:t>
-            </a:r>
-            <a:r>
-              <a:rPr lang="de-DE" sz="1200" dirty="0">
-                <a:solidFill>
-                  <a:schemeClr val="bg1">
-                    <a:lumMod val="65000"/>
-                  </a:schemeClr>
-                </a:solidFill>
-              </a:rPr>
-              <a:t> </a:t>
-            </a:r>
-            <a:r>
-              <a:rPr lang="de-DE" sz="1200" dirty="0" err="1">
-                <a:solidFill>
-                  <a:schemeClr val="bg1">
-                    <a:lumMod val="65000"/>
-                  </a:schemeClr>
-                </a:solidFill>
-              </a:rPr>
-              <a:t>Cell</a:t>
-            </a:r>
-            <a:r>
-              <a:rPr lang="de-DE" sz="1200" dirty="0">
-                <a:solidFill>
-                  <a:schemeClr val="bg1">
-                    <a:lumMod val="65000"/>
-                  </a:schemeClr>
-                </a:solidFill>
-              </a:rPr>
-              <a:t> </a:t>
-            </a:r>
-            <a:r>
-              <a:rPr lang="de-DE" sz="1200" i="1" dirty="0">
+              <a:t>: Proteome-wide and Quantitative Identification of RNA-Dependent Proteins by Density Gradient Ultracentrifugation. Molecular Cell </a:t>
+            </a:r>
+            <a:r>
+              <a:rPr lang="en-GB" sz="1200" i="1" noProof="0" dirty="0">
                 <a:solidFill>
                   <a:schemeClr val="bg1">
                     <a:lumMod val="65000"/>
@@ -7436,7 +6897,7 @@
               <a:t>75</a:t>
             </a:r>
             <a:r>
-              <a:rPr lang="de-DE" sz="1200" i="0" dirty="0">
+              <a:rPr lang="en-GB" sz="1200" i="0" noProof="0" dirty="0">
                 <a:solidFill>
                   <a:schemeClr val="bg1">
                     <a:lumMod val="65000"/>
@@ -7445,7 +6906,7 @@
               </a:rPr>
               <a:t>, 184-199.e110.</a:t>
             </a:r>
-            <a:endParaRPr lang="de-DE" sz="1200" dirty="0">
+            <a:endParaRPr lang="en-GB" sz="1200" noProof="0" dirty="0">
               <a:solidFill>
                 <a:schemeClr val="bg1">
                   <a:lumMod val="65000"/>
@@ -7485,7 +6946,7 @@
           </a:bodyPr>
           <a:lstStyle/>
           <a:p>
-            <a:endParaRPr lang="de-DE" dirty="0"/>
+            <a:endParaRPr lang="en-GB" noProof="0" dirty="0"/>
           </a:p>
         </p:txBody>
       </p:sp>
@@ -7850,36 +7311,8 @@
           <a:lstStyle/>
           <a:p>
             <a:r>
-              <a:rPr lang="de-DE" dirty="0" err="1"/>
-              <a:t>Meaning</a:t>
-            </a:r>
-            <a:r>
-              <a:rPr lang="de-DE" dirty="0"/>
-              <a:t> </a:t>
-            </a:r>
-            <a:r>
-              <a:rPr lang="de-DE" dirty="0" err="1"/>
-              <a:t>of</a:t>
-            </a:r>
-            <a:r>
-              <a:rPr lang="de-DE" dirty="0"/>
-              <a:t> </a:t>
-            </a:r>
-            <a:r>
-              <a:rPr lang="de-DE" dirty="0" err="1"/>
-              <a:t>the</a:t>
-            </a:r>
-            <a:r>
-              <a:rPr lang="de-DE" dirty="0"/>
-              <a:t> </a:t>
-            </a:r>
-            <a:r>
-              <a:rPr lang="de-DE" dirty="0" err="1"/>
-              <a:t>shifts</a:t>
-            </a:r>
-            <a:r>
-              <a:rPr lang="de-DE" dirty="0"/>
-              <a:t>  </a:t>
+              <a:rPr lang="en-GB" noProof="0" dirty="0"/>
+              <a:t>Meaning of the shifts  </a:t>
             </a:r>
           </a:p>
         </p:txBody>
@@ -7960,12 +7393,8 @@
           <a:lstStyle/>
           <a:p>
             <a:r>
-              <a:rPr lang="de-DE" dirty="0" err="1"/>
-              <a:t>Left</a:t>
-            </a:r>
-            <a:r>
-              <a:rPr lang="de-DE" dirty="0"/>
-              <a:t> shift (1.)</a:t>
+              <a:rPr lang="en-GB" noProof="0" dirty="0"/>
+              <a:t>Left shift (1.)</a:t>
             </a:r>
           </a:p>
         </p:txBody>
@@ -8046,7 +7475,7 @@
           <a:lstStyle/>
           <a:p>
             <a:r>
-              <a:rPr lang="de-DE" dirty="0"/>
+              <a:rPr lang="en-GB" noProof="0" dirty="0"/>
               <a:t>Right shift (1.)</a:t>
             </a:r>
           </a:p>
@@ -8128,12 +7557,8 @@
           <a:lstStyle/>
           <a:p>
             <a:r>
-              <a:rPr lang="de-DE" dirty="0" err="1"/>
-              <a:t>No</a:t>
-            </a:r>
-            <a:r>
-              <a:rPr lang="de-DE" dirty="0"/>
-              <a:t> shift (3.)</a:t>
+              <a:rPr lang="en-GB" noProof="0" dirty="0"/>
+              <a:t>No shift (3.)</a:t>
             </a:r>
           </a:p>
         </p:txBody>
@@ -8214,7 +7639,7 @@
           <a:lstStyle/>
           <a:p>
             <a:r>
-              <a:rPr lang="de-DE" dirty="0"/>
+              <a:rPr lang="en-GB" noProof="0" dirty="0"/>
               <a:t>Partial shift (2.) </a:t>
             </a:r>
           </a:p>
@@ -8296,12 +7721,8 @@
           <a:lstStyle/>
           <a:p>
             <a:r>
-              <a:rPr lang="de-DE" dirty="0" err="1"/>
-              <a:t>Precipitated</a:t>
-            </a:r>
-            <a:r>
-              <a:rPr lang="de-DE" dirty="0"/>
-              <a:t> (1.)</a:t>
+              <a:rPr lang="en-GB" noProof="0" dirty="0"/>
+              <a:t>Precipitated (1.)</a:t>
             </a:r>
           </a:p>
         </p:txBody>
@@ -8340,77 +7761,35 @@
           <a:lstStyle/>
           <a:p>
             <a:r>
-              <a:rPr lang="de-DE" sz="2000" dirty="0"/>
-              <a:t>Classification </a:t>
-            </a:r>
-            <a:r>
-              <a:rPr lang="de-DE" sz="2000" dirty="0" err="1"/>
-              <a:t>of</a:t>
-            </a:r>
-            <a:r>
-              <a:rPr lang="de-DE" sz="2000" dirty="0"/>
-              <a:t> </a:t>
-            </a:r>
-            <a:r>
-              <a:rPr lang="de-DE" sz="2000" dirty="0" err="1"/>
-              <a:t>proteins</a:t>
-            </a:r>
-            <a:r>
-              <a:rPr lang="de-DE" sz="2000" dirty="0"/>
-              <a:t>:</a:t>
-            </a:r>
-          </a:p>
-          <a:p>
-            <a:endParaRPr lang="de-DE" sz="2000" dirty="0"/>
-          </a:p>
-          <a:p>
-            <a:r>
-              <a:rPr lang="de-DE" sz="2000" dirty="0"/>
-              <a:t>1. RNA-</a:t>
-            </a:r>
-            <a:r>
-              <a:rPr lang="de-DE" sz="2000" dirty="0" err="1"/>
-              <a:t>dependent</a:t>
-            </a:r>
-            <a:endParaRPr lang="de-DE" sz="2000" dirty="0"/>
-          </a:p>
-          <a:p>
-            <a:endParaRPr lang="de-DE" sz="800" dirty="0"/>
-          </a:p>
-          <a:p>
-            <a:r>
-              <a:rPr lang="de-DE" sz="2000" dirty="0"/>
-              <a:t>2. </a:t>
-            </a:r>
-            <a:r>
-              <a:rPr lang="de-DE" sz="2000" dirty="0" err="1"/>
-              <a:t>Partially</a:t>
-            </a:r>
-            <a:r>
-              <a:rPr lang="de-DE" sz="2000" dirty="0"/>
-              <a:t> RNA-</a:t>
-            </a:r>
-            <a:r>
-              <a:rPr lang="de-DE" sz="2000" dirty="0" err="1"/>
-              <a:t>dependent</a:t>
-            </a:r>
-            <a:endParaRPr lang="de-DE" sz="2000" dirty="0"/>
-          </a:p>
-          <a:p>
-            <a:endParaRPr lang="de-DE" sz="800" dirty="0"/>
-          </a:p>
-          <a:p>
-            <a:r>
-              <a:rPr lang="de-DE" sz="2000" dirty="0"/>
-              <a:t>3. Not RNA-</a:t>
-            </a:r>
-            <a:r>
-              <a:rPr lang="de-DE" sz="2000" dirty="0" err="1"/>
-              <a:t>dependent</a:t>
-            </a:r>
-            <a:r>
-              <a:rPr lang="de-DE" sz="2000" dirty="0"/>
-              <a:t> </a:t>
+              <a:rPr lang="en-GB" sz="2000" noProof="0" dirty="0"/>
+              <a:t>Classification of proteins:</a:t>
+            </a:r>
+          </a:p>
+          <a:p>
+            <a:endParaRPr lang="en-GB" sz="2000" noProof="0" dirty="0"/>
+          </a:p>
+          <a:p>
+            <a:r>
+              <a:rPr lang="en-GB" sz="2000" noProof="0" dirty="0"/>
+              <a:t>1. RNA-dependent</a:t>
+            </a:r>
+          </a:p>
+          <a:p>
+            <a:endParaRPr lang="en-GB" sz="800" noProof="0" dirty="0"/>
+          </a:p>
+          <a:p>
+            <a:r>
+              <a:rPr lang="en-GB" sz="2000" noProof="0" dirty="0"/>
+              <a:t>2. Partially RNA-dependent</a:t>
+            </a:r>
+          </a:p>
+          <a:p>
+            <a:endParaRPr lang="en-GB" sz="800" noProof="0" dirty="0"/>
+          </a:p>
+          <a:p>
+            <a:r>
+              <a:rPr lang="en-GB" sz="2000" noProof="0" dirty="0"/>
+              <a:t>3. Not RNA-dependent </a:t>
             </a:r>
           </a:p>
         </p:txBody>
@@ -8923,135 +8302,42 @@
           <a:lstStyle/>
           <a:p>
             <a:r>
-              <a:rPr lang="de-DE" sz="2000" dirty="0" err="1"/>
-              <a:t>Mass</a:t>
-            </a:r>
-            <a:r>
-              <a:rPr lang="de-DE" sz="2000" dirty="0"/>
-              <a:t> </a:t>
-            </a:r>
-            <a:r>
-              <a:rPr lang="de-DE" sz="2000" dirty="0" err="1"/>
-              <a:t>spectrometric</a:t>
-            </a:r>
-            <a:r>
-              <a:rPr lang="de-DE" sz="2000" dirty="0"/>
-              <a:t> quantitative </a:t>
-            </a:r>
-            <a:r>
-              <a:rPr lang="de-DE" sz="2000" dirty="0" err="1"/>
-              <a:t>results</a:t>
-            </a:r>
-            <a:r>
-              <a:rPr lang="de-DE" sz="2000" dirty="0"/>
-              <a:t> per </a:t>
-            </a:r>
-            <a:r>
-              <a:rPr lang="de-DE" sz="2000" dirty="0" err="1"/>
-              <a:t>protein</a:t>
-            </a:r>
-            <a:r>
-              <a:rPr lang="de-DE" sz="2000" dirty="0"/>
-              <a:t> per </a:t>
-            </a:r>
-            <a:r>
-              <a:rPr lang="de-DE" sz="2000" dirty="0" err="1"/>
-              <a:t>fraction</a:t>
-            </a:r>
-            <a:endParaRPr lang="de-DE" sz="2000" dirty="0"/>
+              <a:rPr lang="en-GB" sz="2000" noProof="0" dirty="0"/>
+              <a:t>Mass spectrometric quantitative results per protein per fraction</a:t>
+            </a:r>
           </a:p>
           <a:p>
             <a:pPr marL="0" indent="0">
               <a:buNone/>
             </a:pPr>
-            <a:endParaRPr lang="de-DE" sz="800" dirty="0"/>
-          </a:p>
-          <a:p>
-            <a:r>
-              <a:rPr lang="de-DE" sz="2000" dirty="0" err="1"/>
-              <a:t>Comparison</a:t>
-            </a:r>
-            <a:r>
-              <a:rPr lang="de-DE" sz="2000" dirty="0"/>
-              <a:t> </a:t>
-            </a:r>
-            <a:r>
-              <a:rPr lang="de-DE" sz="2000" dirty="0" err="1"/>
-              <a:t>of</a:t>
-            </a:r>
-            <a:r>
-              <a:rPr lang="de-DE" sz="2000" dirty="0"/>
-              <a:t> </a:t>
-            </a:r>
-            <a:r>
-              <a:rPr lang="de-DE" sz="2000" dirty="0" err="1"/>
-              <a:t>the</a:t>
-            </a:r>
-            <a:r>
-              <a:rPr lang="de-DE" sz="2000" dirty="0"/>
-              <a:t> </a:t>
-            </a:r>
-            <a:r>
-              <a:rPr lang="de-DE" sz="2000" dirty="0" err="1"/>
+            <a:endParaRPr lang="en-GB" sz="800" noProof="0" dirty="0"/>
+          </a:p>
+          <a:p>
+            <a:r>
+              <a:rPr lang="en-GB" sz="2000" noProof="0" dirty="0"/>
+              <a:t>Comparison of the </a:t>
+            </a:r>
+            <a:r>
+              <a:rPr lang="en-GB" sz="2000" noProof="0" dirty="0" err="1"/>
               <a:t>occurence</a:t>
             </a:r>
             <a:r>
-              <a:rPr lang="de-DE" sz="2000" dirty="0"/>
-              <a:t> </a:t>
-            </a:r>
-            <a:r>
-              <a:rPr lang="de-DE" sz="2000" dirty="0" err="1"/>
-              <a:t>of</a:t>
-            </a:r>
-            <a:r>
-              <a:rPr lang="de-DE" sz="2000" dirty="0"/>
-              <a:t> </a:t>
-            </a:r>
-            <a:r>
-              <a:rPr lang="de-DE" sz="2000" dirty="0" err="1"/>
-              <a:t>proteins</a:t>
-            </a:r>
-            <a:r>
-              <a:rPr lang="de-DE" sz="2000" dirty="0"/>
-              <a:t> in different </a:t>
-            </a:r>
-            <a:r>
-              <a:rPr lang="de-DE" sz="2000" dirty="0" err="1"/>
-              <a:t>fractions</a:t>
-            </a:r>
-            <a:r>
-              <a:rPr lang="de-DE" sz="2000" dirty="0"/>
-              <a:t> </a:t>
-            </a:r>
-            <a:r>
-              <a:rPr lang="de-DE" sz="2000" dirty="0" err="1"/>
-              <a:t>of</a:t>
-            </a:r>
-            <a:r>
-              <a:rPr lang="de-DE" sz="2000" dirty="0"/>
-              <a:t> Control and </a:t>
-            </a:r>
-            <a:r>
-              <a:rPr lang="de-DE" sz="2000" dirty="0" err="1"/>
-              <a:t>RNase</a:t>
-            </a:r>
-            <a:r>
-              <a:rPr lang="de-DE" sz="2000" dirty="0"/>
-              <a:t> </a:t>
-            </a:r>
-          </a:p>
-          <a:p>
-            <a:endParaRPr lang="de-DE" sz="800" dirty="0"/>
-          </a:p>
-          <a:p>
-            <a:endParaRPr lang="de-DE" sz="800" dirty="0"/>
+              <a:rPr lang="en-GB" sz="2000" noProof="0" dirty="0"/>
+              <a:t> of proteins in different fractions of Control and RNase </a:t>
+            </a:r>
+          </a:p>
+          <a:p>
+            <a:endParaRPr lang="en-GB" sz="800" noProof="0" dirty="0"/>
+          </a:p>
+          <a:p>
+            <a:endParaRPr lang="en-GB" sz="800" noProof="0" dirty="0"/>
           </a:p>
           <a:p>
             <a:pPr marL="0" indent="0">
               <a:buNone/>
             </a:pPr>
             <a:r>
-              <a:rPr lang="de-DE" b="1" dirty="0">
+              <a:rPr lang="en-GB" b="1" noProof="0" dirty="0">
                 <a:sym typeface="Wingdings" panose="05000000000000000000" pitchFamily="2" charset="2"/>
               </a:rPr>
               <a:t> </a:t>
@@ -9060,19 +8346,18 @@
               <a:rPr lang="en-GB" b="1" noProof="0" dirty="0"/>
               <a:t>Which proteins are RNA-dependent?</a:t>
             </a:r>
-            <a:endParaRPr lang="de-DE" b="1" dirty="0"/>
           </a:p>
           <a:p>
             <a:pPr marL="0" indent="0">
               <a:buNone/>
             </a:pPr>
-            <a:endParaRPr lang="de-DE" dirty="0"/>
+            <a:endParaRPr lang="en-GB" noProof="0" dirty="0"/>
           </a:p>
           <a:p>
             <a:pPr marL="0" indent="0">
               <a:buNone/>
             </a:pPr>
-            <a:endParaRPr lang="de-DE" dirty="0"/>
+            <a:endParaRPr lang="en-GB" noProof="0" dirty="0"/>
           </a:p>
         </p:txBody>
       </p:sp>
@@ -9188,24 +8473,8 @@
           <a:p>
             <a:pPr algn="ctr"/>
             <a:r>
-              <a:rPr lang="de-DE" sz="1400" dirty="0"/>
-              <a:t>Control and </a:t>
-            </a:r>
-            <a:r>
-              <a:rPr lang="de-DE" sz="1400" dirty="0" err="1"/>
-              <a:t>RNase</a:t>
-            </a:r>
-            <a:r>
-              <a:rPr lang="de-DE" sz="1400" dirty="0"/>
-              <a:t> </a:t>
-            </a:r>
-            <a:r>
-              <a:rPr lang="de-DE" sz="1400" dirty="0" err="1"/>
-              <a:t>fractions</a:t>
-            </a:r>
-            <a:r>
-              <a:rPr lang="de-DE" sz="1400" dirty="0"/>
-              <a:t> </a:t>
+              <a:rPr lang="en-GB" sz="1400" noProof="0" dirty="0"/>
+              <a:t>Control and RNase fractions </a:t>
             </a:r>
           </a:p>
         </p:txBody>
@@ -9239,7 +8508,7 @@
           <a:lstStyle/>
           <a:p>
             <a:r>
-              <a:rPr lang="de-DE" sz="1400" dirty="0"/>
+              <a:rPr lang="en-GB" sz="1400" noProof="0" dirty="0"/>
               <a:t>Different Proteins </a:t>
             </a:r>
           </a:p>
@@ -9274,7 +8543,7 @@
           <a:lstStyle/>
           <a:p>
             <a:r>
-              <a:rPr lang="de-DE" dirty="0"/>
+              <a:rPr lang="en-GB" noProof="0" dirty="0"/>
               <a:t>Dimension: 4765 x 150</a:t>
             </a:r>
           </a:p>
@@ -9308,52 +8577,8 @@
           <a:p>
             <a:pPr algn="ctr"/>
             <a:r>
-              <a:rPr lang="de-DE" dirty="0" err="1"/>
-              <a:t>What</a:t>
-            </a:r>
-            <a:r>
-              <a:rPr lang="de-DE" dirty="0"/>
-              <a:t> </a:t>
-            </a:r>
-            <a:r>
-              <a:rPr lang="de-DE" dirty="0" err="1"/>
-              <a:t>is</a:t>
-            </a:r>
-            <a:r>
-              <a:rPr lang="de-DE" dirty="0"/>
-              <a:t> </a:t>
-            </a:r>
-            <a:r>
-              <a:rPr lang="de-DE" dirty="0" err="1"/>
-              <a:t>our</a:t>
-            </a:r>
-            <a:r>
-              <a:rPr lang="de-DE" dirty="0"/>
-              <a:t> </a:t>
-            </a:r>
-            <a:r>
-              <a:rPr lang="de-DE" dirty="0" err="1"/>
-              <a:t>data</a:t>
-            </a:r>
-            <a:r>
-              <a:rPr lang="de-DE" dirty="0"/>
-              <a:t> </a:t>
-            </a:r>
-            <a:r>
-              <a:rPr lang="de-DE" dirty="0" err="1"/>
-              <a:t>set</a:t>
-            </a:r>
-            <a:r>
-              <a:rPr lang="de-DE" dirty="0"/>
-              <a:t> </a:t>
-            </a:r>
-            <a:r>
-              <a:rPr lang="de-DE" dirty="0" err="1"/>
-              <a:t>showing</a:t>
-            </a:r>
-            <a:r>
-              <a:rPr lang="de-DE" dirty="0"/>
-              <a:t>?  </a:t>
+              <a:rPr lang="en-GB" noProof="0" dirty="0"/>
+              <a:t>What is our data set showing?  </a:t>
             </a:r>
           </a:p>
         </p:txBody>
@@ -9758,124 +8983,42 @@
           <a:lstStyle/>
           <a:p>
             <a:r>
-              <a:rPr lang="de-DE" sz="2000" dirty="0" err="1"/>
-              <a:t>Mass</a:t>
-            </a:r>
-            <a:r>
-              <a:rPr lang="de-DE" sz="2000" dirty="0"/>
-              <a:t> </a:t>
-            </a:r>
-            <a:r>
-              <a:rPr lang="de-DE" sz="2000" dirty="0" err="1"/>
-              <a:t>spectrometric</a:t>
-            </a:r>
-            <a:r>
-              <a:rPr lang="de-DE" sz="2000" dirty="0"/>
-              <a:t> quantitative </a:t>
-            </a:r>
-            <a:r>
-              <a:rPr lang="de-DE" sz="2000" dirty="0" err="1"/>
-              <a:t>results</a:t>
-            </a:r>
-            <a:r>
-              <a:rPr lang="de-DE" sz="2000" dirty="0"/>
-              <a:t> per </a:t>
-            </a:r>
-            <a:r>
-              <a:rPr lang="de-DE" sz="2000" dirty="0" err="1"/>
-              <a:t>protein</a:t>
-            </a:r>
-            <a:r>
-              <a:rPr lang="de-DE" sz="2000" dirty="0"/>
-              <a:t> per </a:t>
-            </a:r>
-            <a:r>
-              <a:rPr lang="de-DE" sz="2000" dirty="0" err="1"/>
-              <a:t>fraction</a:t>
-            </a:r>
-            <a:endParaRPr lang="de-DE" sz="2000" dirty="0"/>
+              <a:rPr lang="en-GB" sz="2000" noProof="0" dirty="0"/>
+              <a:t>Mass spectrometric quantitative results per protein per fraction</a:t>
+            </a:r>
           </a:p>
           <a:p>
             <a:pPr marL="0" indent="0">
               <a:buNone/>
             </a:pPr>
-            <a:endParaRPr lang="de-DE" sz="800" dirty="0"/>
-          </a:p>
-          <a:p>
-            <a:r>
-              <a:rPr lang="de-DE" sz="2000" dirty="0" err="1"/>
-              <a:t>Allows</a:t>
-            </a:r>
-            <a:r>
-              <a:rPr lang="de-DE" sz="2000" dirty="0"/>
-              <a:t> relative </a:t>
-            </a:r>
-            <a:r>
-              <a:rPr lang="de-DE" sz="2000" dirty="0" err="1"/>
-              <a:t>comparison</a:t>
-            </a:r>
-            <a:r>
-              <a:rPr lang="de-DE" sz="2000" dirty="0"/>
-              <a:t> </a:t>
-            </a:r>
-            <a:r>
-              <a:rPr lang="de-DE" sz="2000" dirty="0" err="1"/>
-              <a:t>of</a:t>
-            </a:r>
-            <a:r>
-              <a:rPr lang="de-DE" sz="2000" dirty="0"/>
-              <a:t> </a:t>
-            </a:r>
-            <a:r>
-              <a:rPr lang="de-DE" sz="2000" dirty="0" err="1"/>
-              <a:t>the</a:t>
-            </a:r>
-            <a:r>
-              <a:rPr lang="de-DE" sz="2000" dirty="0"/>
-              <a:t> </a:t>
-            </a:r>
-            <a:r>
-              <a:rPr lang="de-DE" sz="2000" dirty="0" err="1"/>
+            <a:endParaRPr lang="en-GB" sz="800" noProof="0" dirty="0"/>
+          </a:p>
+          <a:p>
+            <a:r>
+              <a:rPr lang="en-GB" sz="2000" noProof="0" dirty="0"/>
+              <a:t>Allows relative comparison of the </a:t>
+            </a:r>
+            <a:r>
+              <a:rPr lang="en-GB" sz="2000" noProof="0" dirty="0" err="1"/>
               <a:t>occurence</a:t>
             </a:r>
             <a:r>
-              <a:rPr lang="de-DE" sz="2000" dirty="0"/>
-              <a:t> </a:t>
-            </a:r>
-            <a:r>
-              <a:rPr lang="de-DE" sz="2000" dirty="0" err="1"/>
-              <a:t>of</a:t>
-            </a:r>
-            <a:r>
-              <a:rPr lang="de-DE" sz="2000" dirty="0"/>
-              <a:t> </a:t>
-            </a:r>
-            <a:r>
-              <a:rPr lang="de-DE" sz="2000" dirty="0" err="1"/>
-              <a:t>proteins</a:t>
-            </a:r>
-            <a:r>
-              <a:rPr lang="de-DE" sz="2000" dirty="0"/>
-              <a:t> in different </a:t>
-            </a:r>
-            <a:r>
-              <a:rPr lang="de-DE" sz="2000" dirty="0" err="1"/>
-              <a:t>fractions</a:t>
-            </a:r>
-            <a:endParaRPr lang="de-DE" sz="2000" dirty="0"/>
+              <a:rPr lang="en-GB" sz="2000" noProof="0" dirty="0"/>
+              <a:t> of proteins in different fractions</a:t>
+            </a:r>
           </a:p>
           <a:p>
             <a:pPr marL="0" indent="0">
               <a:buNone/>
             </a:pPr>
-            <a:endParaRPr lang="de-DE" sz="800" dirty="0"/>
+            <a:endParaRPr lang="en-GB" sz="800" noProof="0" dirty="0"/>
           </a:p>
           <a:p>
             <a:pPr marL="0" indent="0">
               <a:buNone/>
             </a:pPr>
             <a:r>
-              <a:rPr lang="de-DE" sz="2400" b="1" dirty="0">
+              <a:rPr lang="en-GB" sz="2400" b="1" noProof="0" dirty="0">
                 <a:sym typeface="Wingdings" panose="05000000000000000000" pitchFamily="2" charset="2"/>
               </a:rPr>
               <a:t> </a:t>
@@ -9884,19 +9027,18 @@
               <a:rPr lang="en-GB" sz="2400" b="1" noProof="0" dirty="0"/>
               <a:t>Which proteins in the non-synchronized HeLa cells are RNA-dependent proteins?</a:t>
             </a:r>
-            <a:endParaRPr lang="de-DE" sz="2400" b="1" dirty="0"/>
           </a:p>
           <a:p>
             <a:pPr marL="0" indent="0">
               <a:buNone/>
             </a:pPr>
-            <a:endParaRPr lang="de-DE" dirty="0"/>
+            <a:endParaRPr lang="en-GB" noProof="0" dirty="0"/>
           </a:p>
           <a:p>
             <a:pPr marL="0" indent="0">
               <a:buNone/>
             </a:pPr>
-            <a:endParaRPr lang="de-DE" dirty="0"/>
+            <a:endParaRPr lang="en-GB" noProof="0" dirty="0"/>
           </a:p>
         </p:txBody>
       </p:sp>
@@ -10012,32 +9154,8 @@
           <a:p>
             <a:pPr algn="ctr"/>
             <a:r>
-              <a:rPr lang="de-DE" sz="1400" dirty="0"/>
-              <a:t>Control and </a:t>
-            </a:r>
-            <a:r>
-              <a:rPr lang="de-DE" sz="1400" dirty="0" err="1"/>
-              <a:t>RNase</a:t>
-            </a:r>
-            <a:r>
-              <a:rPr lang="de-DE" sz="1400" dirty="0"/>
-              <a:t> </a:t>
-            </a:r>
-            <a:r>
-              <a:rPr lang="de-DE" sz="1400" dirty="0" err="1"/>
-              <a:t>fractions</a:t>
-            </a:r>
-            <a:r>
-              <a:rPr lang="de-DE" sz="1400" dirty="0"/>
-              <a:t> 1-25 in </a:t>
-            </a:r>
-            <a:r>
-              <a:rPr lang="de-DE" sz="1400" dirty="0" err="1"/>
-              <a:t>triplicates</a:t>
-            </a:r>
-            <a:r>
-              <a:rPr lang="de-DE" sz="1400" dirty="0"/>
-              <a:t> </a:t>
+              <a:rPr lang="en-GB" sz="1400" noProof="0" dirty="0"/>
+              <a:t>Control and RNase fractions 1-25 in triplicates </a:t>
             </a:r>
           </a:p>
         </p:txBody>
@@ -10071,7 +9189,7 @@
           <a:lstStyle/>
           <a:p>
             <a:r>
-              <a:rPr lang="de-DE" sz="1400" dirty="0"/>
+              <a:rPr lang="en-GB" sz="1400" noProof="0" dirty="0"/>
               <a:t>Different Proteins </a:t>
             </a:r>
           </a:p>
@@ -10106,7 +9224,7 @@
           <a:lstStyle/>
           <a:p>
             <a:r>
-              <a:rPr lang="de-DE" dirty="0"/>
+              <a:rPr lang="en-GB" noProof="0" dirty="0"/>
               <a:t>Dimension: 4765 x 150</a:t>
             </a:r>
           </a:p>
@@ -10140,52 +9258,8 @@
           <a:p>
             <a:pPr algn="ctr"/>
             <a:r>
-              <a:rPr lang="de-DE" dirty="0" err="1"/>
-              <a:t>What</a:t>
-            </a:r>
-            <a:r>
-              <a:rPr lang="de-DE" dirty="0"/>
-              <a:t> </a:t>
-            </a:r>
-            <a:r>
-              <a:rPr lang="de-DE" dirty="0" err="1"/>
-              <a:t>is</a:t>
-            </a:r>
-            <a:r>
-              <a:rPr lang="de-DE" dirty="0"/>
-              <a:t> </a:t>
-            </a:r>
-            <a:r>
-              <a:rPr lang="de-DE" dirty="0" err="1"/>
-              <a:t>our</a:t>
-            </a:r>
-            <a:r>
-              <a:rPr lang="de-DE" dirty="0"/>
-              <a:t> </a:t>
-            </a:r>
-            <a:r>
-              <a:rPr lang="de-DE" dirty="0" err="1"/>
-              <a:t>data</a:t>
-            </a:r>
-            <a:r>
-              <a:rPr lang="de-DE" dirty="0"/>
-              <a:t> </a:t>
-            </a:r>
-            <a:r>
-              <a:rPr lang="de-DE" dirty="0" err="1"/>
-              <a:t>set</a:t>
-            </a:r>
-            <a:r>
-              <a:rPr lang="de-DE" dirty="0"/>
-              <a:t> </a:t>
-            </a:r>
-            <a:r>
-              <a:rPr lang="de-DE" dirty="0" err="1"/>
-              <a:t>showing</a:t>
-            </a:r>
-            <a:r>
-              <a:rPr lang="de-DE" dirty="0"/>
-              <a:t>?  </a:t>
+              <a:rPr lang="en-GB" noProof="0" dirty="0"/>
+              <a:t>What is our data set showing?  </a:t>
             </a:r>
           </a:p>
         </p:txBody>
@@ -10401,7 +9475,7 @@
           <a:p>
             <a:pPr algn="ctr"/>
             <a:r>
-              <a:rPr lang="en-GB" sz="2400" dirty="0"/>
+              <a:rPr lang="en-GB" sz="2400" noProof="0" dirty="0"/>
               <a:t>non-synchronized HeLa cells</a:t>
             </a:r>
           </a:p>
@@ -10440,46 +9514,9 @@
               <a:buChar char="•"/>
             </a:pPr>
             <a:r>
-              <a:rPr lang="de-DE" sz="2400" dirty="0"/>
-              <a:t>RNA </a:t>
-            </a:r>
-            <a:r>
-              <a:rPr lang="de-DE" sz="2400" dirty="0" err="1"/>
-              <a:t>metabolism</a:t>
-            </a:r>
-            <a:r>
-              <a:rPr lang="de-DE" sz="2400" dirty="0"/>
-              <a:t> &amp; </a:t>
-            </a:r>
-            <a:r>
-              <a:rPr lang="de-DE" sz="2400" dirty="0" err="1"/>
-              <a:t>regulation</a:t>
-            </a:r>
-            <a:r>
-              <a:rPr lang="de-DE" sz="2400" dirty="0"/>
-              <a:t> </a:t>
-            </a:r>
-            <a:r>
-              <a:rPr lang="de-DE" sz="2400" dirty="0" err="1"/>
-              <a:t>of</a:t>
-            </a:r>
-            <a:r>
-              <a:rPr lang="de-DE" sz="2400" dirty="0"/>
-              <a:t> </a:t>
-            </a:r>
-            <a:r>
-              <a:rPr lang="de-DE" sz="2400" dirty="0" err="1"/>
-              <a:t>gene</a:t>
-            </a:r>
-            <a:r>
-              <a:rPr lang="de-DE" sz="2400" dirty="0"/>
-              <a:t> </a:t>
-            </a:r>
-            <a:r>
-              <a:rPr lang="de-DE" sz="2400" dirty="0" err="1"/>
-              <a:t>expression</a:t>
-            </a:r>
-            <a:endParaRPr lang="de-DE" sz="2400" dirty="0"/>
+              <a:rPr lang="en-GB" sz="2400" noProof="0" dirty="0"/>
+              <a:t>RNA metabolism &amp; regulation of gene expression</a:t>
+            </a:r>
           </a:p>
           <a:p>
             <a:pPr marL="342900" indent="-342900">
@@ -10487,54 +9524,10 @@
               <a:buChar char="•"/>
             </a:pPr>
             <a:r>
-              <a:rPr lang="de-DE" sz="2400" dirty="0" err="1"/>
-              <a:t>Defects</a:t>
-            </a:r>
-            <a:r>
-              <a:rPr lang="de-DE" sz="2400" dirty="0"/>
-              <a:t> </a:t>
-            </a:r>
-            <a:r>
-              <a:rPr lang="de-DE" sz="2400" dirty="0" err="1"/>
-              <a:t>are</a:t>
-            </a:r>
-            <a:r>
-              <a:rPr lang="de-DE" sz="2400" dirty="0"/>
-              <a:t> </a:t>
-            </a:r>
-            <a:r>
-              <a:rPr lang="de-DE" sz="2400" dirty="0" err="1"/>
-              <a:t>linked</a:t>
-            </a:r>
-            <a:r>
-              <a:rPr lang="de-DE" sz="2400" dirty="0"/>
-              <a:t> </a:t>
-            </a:r>
-            <a:r>
-              <a:rPr lang="de-DE" sz="2400" dirty="0" err="1"/>
-              <a:t>to</a:t>
-            </a:r>
-            <a:r>
-              <a:rPr lang="de-DE" sz="2400" dirty="0"/>
-              <a:t>  neurodegenerative </a:t>
-            </a:r>
-            <a:r>
-              <a:rPr lang="de-DE" sz="2400" dirty="0" err="1"/>
-              <a:t>disorders</a:t>
-            </a:r>
-            <a:r>
-              <a:rPr lang="de-DE" sz="2400" dirty="0"/>
-              <a:t> and </a:t>
-            </a:r>
-            <a:r>
-              <a:rPr lang="de-DE" sz="2400" dirty="0" err="1"/>
-              <a:t>cancer</a:t>
-            </a:r>
-            <a:r>
-              <a:rPr lang="de-DE" sz="2400" dirty="0"/>
-              <a:t> </a:t>
-            </a:r>
-            <a:endParaRPr lang="de-DE" dirty="0"/>
+              <a:rPr lang="en-GB" sz="2400" noProof="0" dirty="0"/>
+              <a:t>Defects are linked to  neurodegenerative disorders and cancer </a:t>
+            </a:r>
+            <a:endParaRPr lang="en-GB" noProof="0" dirty="0"/>
           </a:p>
         </p:txBody>
       </p:sp>
@@ -10766,24 +9759,16 @@
           <a:p>
             <a:pPr algn="ctr"/>
             <a:r>
-              <a:rPr lang="de-DE" dirty="0"/>
+              <a:rPr lang="en-GB" noProof="0" dirty="0"/>
               <a:t>R-</a:t>
             </a:r>
             <a:r>
-              <a:rPr lang="de-DE" dirty="0" err="1"/>
+              <a:rPr lang="en-GB" noProof="0" dirty="0" err="1"/>
               <a:t>DeeP</a:t>
             </a:r>
             <a:r>
-              <a:rPr lang="de-DE" dirty="0"/>
-              <a:t> – </a:t>
-            </a:r>
-            <a:r>
-              <a:rPr lang="de-DE" dirty="0" err="1"/>
-              <a:t>Principle</a:t>
-            </a:r>
-            <a:r>
-              <a:rPr lang="de-DE" dirty="0"/>
-              <a:t> </a:t>
+              <a:rPr lang="en-GB" noProof="0" dirty="0"/>
+              <a:t> – Principle </a:t>
             </a:r>
           </a:p>
         </p:txBody>
@@ -10822,70 +9807,10 @@
               </a:lnSpc>
             </a:pPr>
             <a:r>
-              <a:rPr lang="de-DE" sz="2000" dirty="0">
+              <a:rPr lang="en-GB" sz="2000" noProof="0" dirty="0">
                 <a:sym typeface="Wingdings" panose="05000000000000000000" pitchFamily="2" charset="2"/>
               </a:rPr>
-              <a:t>RNA </a:t>
-            </a:r>
-            <a:r>
-              <a:rPr lang="de-DE" sz="2000" dirty="0" err="1">
-                <a:sym typeface="Wingdings" panose="05000000000000000000" pitchFamily="2" charset="2"/>
-              </a:rPr>
-              <a:t>degradation</a:t>
-            </a:r>
-            <a:r>
-              <a:rPr lang="de-DE" sz="2000" dirty="0">
-                <a:sym typeface="Wingdings" panose="05000000000000000000" pitchFamily="2" charset="2"/>
-              </a:rPr>
-              <a:t> </a:t>
-            </a:r>
-            <a:r>
-              <a:rPr lang="de-DE" sz="2000" dirty="0" err="1">
-                <a:sym typeface="Wingdings" panose="05000000000000000000" pitchFamily="2" charset="2"/>
-              </a:rPr>
-              <a:t>leads</a:t>
-            </a:r>
-            <a:r>
-              <a:rPr lang="de-DE" sz="2000" dirty="0">
-                <a:sym typeface="Wingdings" panose="05000000000000000000" pitchFamily="2" charset="2"/>
-              </a:rPr>
-              <a:t> </a:t>
-            </a:r>
-            <a:r>
-              <a:rPr lang="de-DE" sz="2000" dirty="0" err="1">
-                <a:sym typeface="Wingdings" panose="05000000000000000000" pitchFamily="2" charset="2"/>
-              </a:rPr>
-              <a:t>to</a:t>
-            </a:r>
-            <a:r>
-              <a:rPr lang="de-DE" sz="2000" dirty="0">
-                <a:sym typeface="Wingdings" panose="05000000000000000000" pitchFamily="2" charset="2"/>
-              </a:rPr>
-              <a:t> </a:t>
-            </a:r>
-            <a:r>
-              <a:rPr lang="de-DE" sz="2000" dirty="0" err="1">
-                <a:sym typeface="Wingdings" panose="05000000000000000000" pitchFamily="2" charset="2"/>
-              </a:rPr>
-              <a:t>dissolved</a:t>
-            </a:r>
-            <a:r>
-              <a:rPr lang="de-DE" sz="2000" dirty="0">
-                <a:sym typeface="Wingdings" panose="05000000000000000000" pitchFamily="2" charset="2"/>
-              </a:rPr>
-              <a:t> RNP-</a:t>
-            </a:r>
-            <a:r>
-              <a:rPr lang="de-DE" sz="2000" dirty="0" err="1">
-                <a:sym typeface="Wingdings" panose="05000000000000000000" pitchFamily="2" charset="2"/>
-              </a:rPr>
-              <a:t>complexes</a:t>
-            </a:r>
-            <a:r>
-              <a:rPr lang="de-DE" sz="2000" dirty="0">
-                <a:sym typeface="Wingdings" panose="05000000000000000000" pitchFamily="2" charset="2"/>
-              </a:rPr>
-              <a:t> </a:t>
+              <a:t>RNA degradation leads to dissolved RNP-complexes </a:t>
             </a:r>
           </a:p>
           <a:p>
@@ -10895,7 +9820,7 @@
               </a:lnSpc>
               <a:buNone/>
             </a:pPr>
-            <a:endParaRPr lang="de-DE" sz="800" dirty="0">
+            <a:endParaRPr lang="en-GB" sz="800" noProof="0" dirty="0">
               <a:sym typeface="Wingdings" panose="05000000000000000000" pitchFamily="2" charset="2"/>
             </a:endParaRPr>
           </a:p>
@@ -10906,81 +9831,21 @@
               </a:lnSpc>
             </a:pPr>
             <a:r>
-              <a:rPr lang="de-DE" sz="2000" dirty="0" err="1">
+              <a:rPr lang="en-GB" sz="2000" noProof="0" dirty="0">
                 <a:sym typeface="Wingdings" panose="05000000000000000000" pitchFamily="2" charset="2"/>
               </a:rPr>
-              <a:t>Released</a:t>
-            </a:r>
-            <a:r>
-              <a:rPr lang="de-DE" sz="2000" dirty="0">
-                <a:sym typeface="Wingdings" panose="05000000000000000000" pitchFamily="2" charset="2"/>
-              </a:rPr>
-              <a:t> </a:t>
-            </a:r>
-            <a:r>
-              <a:rPr lang="de-DE" sz="2000" dirty="0" err="1">
-                <a:sym typeface="Wingdings" panose="05000000000000000000" pitchFamily="2" charset="2"/>
-              </a:rPr>
-              <a:t>proteins</a:t>
-            </a:r>
-            <a:r>
-              <a:rPr lang="de-DE" sz="2000" dirty="0">
-                <a:sym typeface="Wingdings" panose="05000000000000000000" pitchFamily="2" charset="2"/>
-              </a:rPr>
-              <a:t> </a:t>
-            </a:r>
-            <a:r>
-              <a:rPr lang="de-DE" sz="2000" dirty="0" err="1">
-                <a:sym typeface="Wingdings" panose="05000000000000000000" pitchFamily="2" charset="2"/>
-              </a:rPr>
-              <a:t>migrate</a:t>
-            </a:r>
-            <a:r>
-              <a:rPr lang="de-DE" sz="2000" dirty="0">
-                <a:sym typeface="Wingdings" panose="05000000000000000000" pitchFamily="2" charset="2"/>
-              </a:rPr>
-              <a:t> </a:t>
-            </a:r>
-            <a:r>
-              <a:rPr lang="de-DE" sz="2000" dirty="0" err="1">
-                <a:sym typeface="Wingdings" panose="05000000000000000000" pitchFamily="2" charset="2"/>
-              </a:rPr>
-              <a:t>into</a:t>
-            </a:r>
-            <a:r>
-              <a:rPr lang="de-DE" sz="2000" dirty="0">
-                <a:sym typeface="Wingdings" panose="05000000000000000000" pitchFamily="2" charset="2"/>
-              </a:rPr>
-              <a:t> different </a:t>
+              <a:t>Released proteins migrate into different </a:t>
             </a:r>
             <a:br>
-              <a:rPr lang="de-DE" sz="2000" dirty="0">
+              <a:rPr lang="en-GB" sz="2000" noProof="0" dirty="0">
                 <a:sym typeface="Wingdings" panose="05000000000000000000" pitchFamily="2" charset="2"/>
               </a:rPr>
             </a:br>
             <a:r>
-              <a:rPr lang="de-DE" sz="2000" dirty="0" err="1">
+              <a:rPr lang="en-GB" sz="2000" noProof="0" dirty="0">
                 <a:sym typeface="Wingdings" panose="05000000000000000000" pitchFamily="2" charset="2"/>
               </a:rPr>
-              <a:t>density</a:t>
-            </a:r>
-            <a:r>
-              <a:rPr lang="de-DE" sz="2000" dirty="0">
-                <a:sym typeface="Wingdings" panose="05000000000000000000" pitchFamily="2" charset="2"/>
-              </a:rPr>
-              <a:t> </a:t>
-            </a:r>
-            <a:r>
-              <a:rPr lang="de-DE" sz="2000" dirty="0" err="1">
-                <a:sym typeface="Wingdings" panose="05000000000000000000" pitchFamily="2" charset="2"/>
-              </a:rPr>
-              <a:t>fractions</a:t>
-            </a:r>
-            <a:r>
-              <a:rPr lang="de-DE" sz="2000" dirty="0">
-                <a:sym typeface="Wingdings" panose="05000000000000000000" pitchFamily="2" charset="2"/>
-              </a:rPr>
-              <a:t> </a:t>
+              <a:t>density fractions </a:t>
             </a:r>
           </a:p>
           <a:p>
@@ -10990,7 +9855,7 @@
               </a:lnSpc>
               <a:buNone/>
             </a:pPr>
-            <a:endParaRPr lang="de-DE" sz="800" dirty="0"/>
+            <a:endParaRPr lang="en-GB" sz="800" noProof="0" dirty="0"/>
           </a:p>
           <a:p>
             <a:pPr>
@@ -10999,96 +9864,18 @@
               </a:lnSpc>
             </a:pPr>
             <a:r>
-              <a:rPr lang="de-DE" sz="2000" dirty="0" err="1">
+              <a:rPr lang="en-GB" sz="2000" noProof="0" dirty="0">
                 <a:sym typeface="Wingdings" panose="05000000000000000000" pitchFamily="2" charset="2"/>
               </a:rPr>
-              <a:t>Quantity</a:t>
-            </a:r>
-            <a:r>
-              <a:rPr lang="de-DE" sz="2000" dirty="0">
-                <a:sym typeface="Wingdings" panose="05000000000000000000" pitchFamily="2" charset="2"/>
-              </a:rPr>
-              <a:t> </a:t>
-            </a:r>
-            <a:r>
-              <a:rPr lang="de-DE" sz="2000" dirty="0" err="1">
-                <a:sym typeface="Wingdings" panose="05000000000000000000" pitchFamily="2" charset="2"/>
-              </a:rPr>
-              <a:t>of</a:t>
-            </a:r>
-            <a:r>
-              <a:rPr lang="de-DE" sz="2000" dirty="0">
-                <a:sym typeface="Wingdings" panose="05000000000000000000" pitchFamily="2" charset="2"/>
-              </a:rPr>
-              <a:t> </a:t>
-            </a:r>
-            <a:r>
-              <a:rPr lang="de-DE" sz="2000" dirty="0" err="1">
-                <a:sym typeface="Wingdings" panose="05000000000000000000" pitchFamily="2" charset="2"/>
-              </a:rPr>
-              <a:t>peptides</a:t>
-            </a:r>
-            <a:r>
-              <a:rPr lang="de-DE" sz="2000" dirty="0">
-                <a:sym typeface="Wingdings" panose="05000000000000000000" pitchFamily="2" charset="2"/>
-              </a:rPr>
-              <a:t> in </a:t>
-            </a:r>
-            <a:r>
-              <a:rPr lang="de-DE" sz="2000" dirty="0" err="1">
-                <a:sym typeface="Wingdings" panose="05000000000000000000" pitchFamily="2" charset="2"/>
-              </a:rPr>
-              <a:t>the</a:t>
-            </a:r>
-            <a:r>
-              <a:rPr lang="de-DE" sz="2000" dirty="0">
-                <a:sym typeface="Wingdings" panose="05000000000000000000" pitchFamily="2" charset="2"/>
-              </a:rPr>
-              <a:t> different </a:t>
-            </a:r>
-            <a:r>
-              <a:rPr lang="de-DE" sz="2000" dirty="0" err="1">
-                <a:sym typeface="Wingdings" panose="05000000000000000000" pitchFamily="2" charset="2"/>
-              </a:rPr>
-              <a:t>density</a:t>
-            </a:r>
-            <a:r>
-              <a:rPr lang="de-DE" sz="2000" dirty="0">
-                <a:sym typeface="Wingdings" panose="05000000000000000000" pitchFamily="2" charset="2"/>
-              </a:rPr>
-              <a:t> </a:t>
-            </a:r>
-            <a:r>
-              <a:rPr lang="de-DE" sz="2000" dirty="0" err="1">
-                <a:sym typeface="Wingdings" panose="05000000000000000000" pitchFamily="2" charset="2"/>
-              </a:rPr>
-              <a:t>fractions</a:t>
-            </a:r>
-            <a:r>
-              <a:rPr lang="de-DE" sz="2000" dirty="0">
-                <a:sym typeface="Wingdings" panose="05000000000000000000" pitchFamily="2" charset="2"/>
-              </a:rPr>
-              <a:t> </a:t>
-            </a:r>
-            <a:r>
-              <a:rPr lang="de-DE" sz="2000" dirty="0" err="1">
-                <a:sym typeface="Wingdings" panose="05000000000000000000" pitchFamily="2" charset="2"/>
-              </a:rPr>
-              <a:t>is</a:t>
-            </a:r>
-            <a:r>
-              <a:rPr lang="de-DE" sz="2000" dirty="0">
-                <a:sym typeface="Wingdings" panose="05000000000000000000" pitchFamily="2" charset="2"/>
-              </a:rPr>
-              <a:t> </a:t>
-            </a:r>
-            <a:r>
-              <a:rPr lang="de-DE" sz="2000" dirty="0" err="1">
+              <a:t>Quantity of peptides in the different density fractions is </a:t>
+            </a:r>
+            <a:r>
+              <a:rPr lang="en-GB" sz="2000" noProof="0" dirty="0" err="1">
                 <a:sym typeface="Wingdings" panose="05000000000000000000" pitchFamily="2" charset="2"/>
               </a:rPr>
               <a:t>analyzed</a:t>
             </a:r>
-            <a:endParaRPr lang="de-DE" sz="2000" dirty="0"/>
+            <a:endParaRPr lang="en-GB" sz="2000" noProof="0" dirty="0"/>
           </a:p>
         </p:txBody>
       </p:sp>
@@ -11126,48 +9913,8 @@
           <a:lstStyle/>
           <a:p>
             <a:r>
-              <a:rPr lang="de-DE" sz="2400" dirty="0"/>
-              <a:t>An RNA-</a:t>
-            </a:r>
-            <a:r>
-              <a:rPr lang="de-DE" sz="2400" dirty="0" err="1"/>
-              <a:t>dependent</a:t>
-            </a:r>
-            <a:r>
-              <a:rPr lang="de-DE" sz="2400" dirty="0"/>
-              <a:t> </a:t>
-            </a:r>
-            <a:r>
-              <a:rPr lang="de-DE" sz="2400" dirty="0" err="1"/>
-              <a:t>protein</a:t>
-            </a:r>
-            <a:r>
-              <a:rPr lang="de-DE" sz="2400" dirty="0"/>
-              <a:t> </a:t>
-            </a:r>
-            <a:r>
-              <a:rPr lang="de-DE" sz="2400" dirty="0" err="1"/>
-              <a:t>must</a:t>
-            </a:r>
-            <a:r>
-              <a:rPr lang="de-DE" sz="2400" dirty="0"/>
-              <a:t> </a:t>
-            </a:r>
-            <a:r>
-              <a:rPr lang="de-DE" sz="2400" dirty="0" err="1"/>
-              <a:t>exhibit</a:t>
-            </a:r>
-            <a:r>
-              <a:rPr lang="de-DE" sz="2400" dirty="0"/>
-              <a:t> a </a:t>
-            </a:r>
-            <a:r>
-              <a:rPr lang="de-DE" sz="2400" dirty="0" err="1"/>
-              <a:t>significant</a:t>
-            </a:r>
-            <a:r>
-              <a:rPr lang="de-DE" sz="2400" dirty="0"/>
-              <a:t> shift </a:t>
+              <a:rPr lang="en-GB" sz="2400" noProof="0" dirty="0"/>
+              <a:t>An RNA-dependent protein must exhibit a significant shift </a:t>
             </a:r>
           </a:p>
         </p:txBody>
@@ -11201,127 +9948,17 @@
           <a:lstStyle/>
           <a:p>
             <a:r>
-              <a:rPr lang="de-DE" sz="1200" dirty="0" err="1">
+              <a:rPr lang="en-GB" sz="1200" noProof="0" dirty="0">
                 <a:solidFill>
                   <a:schemeClr val="bg1">
                     <a:lumMod val="65000"/>
                   </a:schemeClr>
                 </a:solidFill>
               </a:rPr>
-              <a:t>Adapted</a:t>
-            </a:r>
-            <a:r>
-              <a:rPr lang="de-DE" sz="1200" dirty="0">
-                <a:solidFill>
-                  <a:schemeClr val="bg1">
-                    <a:lumMod val="65000"/>
-                  </a:schemeClr>
-                </a:solidFill>
-              </a:rPr>
-              <a:t> </a:t>
-            </a:r>
-            <a:r>
-              <a:rPr lang="de-DE" sz="1200" dirty="0" err="1">
-                <a:solidFill>
-                  <a:schemeClr val="bg1">
-                    <a:lumMod val="65000"/>
-                  </a:schemeClr>
-                </a:solidFill>
-              </a:rPr>
-              <a:t>from</a:t>
-            </a:r>
-            <a:r>
-              <a:rPr lang="de-DE" sz="1200" dirty="0">
-                <a:solidFill>
-                  <a:schemeClr val="bg1">
-                    <a:lumMod val="65000"/>
-                  </a:schemeClr>
-                </a:solidFill>
-              </a:rPr>
-              <a:t>: Caudron-Herger, M., </a:t>
-            </a:r>
-            <a:r>
-              <a:rPr lang="de-DE" sz="1200" dirty="0" err="1">
-                <a:solidFill>
-                  <a:schemeClr val="bg1">
-                    <a:lumMod val="65000"/>
-                  </a:schemeClr>
-                </a:solidFill>
-              </a:rPr>
-              <a:t>Rusin</a:t>
-            </a:r>
-            <a:r>
-              <a:rPr lang="de-DE" sz="1200" dirty="0">
-                <a:solidFill>
-                  <a:schemeClr val="bg1">
-                    <a:lumMod val="65000"/>
-                  </a:schemeClr>
-                </a:solidFill>
-              </a:rPr>
-              <a:t>, </a:t>
-            </a:r>
-            <a:r>
-              <a:rPr lang="de-DE" sz="1200" dirty="0" err="1">
-                <a:solidFill>
-                  <a:schemeClr val="bg1">
-                    <a:lumMod val="65000"/>
-                  </a:schemeClr>
-                </a:solidFill>
-              </a:rPr>
-              <a:t>S.F</a:t>
-            </a:r>
-            <a:r>
-              <a:rPr lang="de-DE" sz="1200" dirty="0">
-                <a:solidFill>
-                  <a:schemeClr val="bg1">
-                    <a:lumMod val="65000"/>
-                  </a:schemeClr>
-                </a:solidFill>
-              </a:rPr>
-              <a:t>., Adamo, M.E., Seiler, J., Schmid, </a:t>
-            </a:r>
-            <a:r>
-              <a:rPr lang="de-DE" sz="1200" dirty="0" err="1">
-                <a:solidFill>
-                  <a:schemeClr val="bg1">
-                    <a:lumMod val="65000"/>
-                  </a:schemeClr>
-                </a:solidFill>
-              </a:rPr>
-              <a:t>V.K</a:t>
-            </a:r>
-            <a:r>
-              <a:rPr lang="de-DE" sz="1200" dirty="0">
-                <a:solidFill>
-                  <a:schemeClr val="bg1">
-                    <a:lumMod val="65000"/>
-                  </a:schemeClr>
-                </a:solidFill>
-              </a:rPr>
-              <a:t>., </a:t>
-            </a:r>
-            <a:r>
-              <a:rPr lang="de-DE" sz="1200" dirty="0" err="1">
-                <a:solidFill>
-                  <a:schemeClr val="bg1">
-                    <a:lumMod val="65000"/>
-                  </a:schemeClr>
-                </a:solidFill>
-              </a:rPr>
-              <a:t>Barreau</a:t>
-            </a:r>
-            <a:r>
-              <a:rPr lang="de-DE" sz="1200" dirty="0">
-                <a:solidFill>
-                  <a:schemeClr val="bg1">
-                    <a:lumMod val="65000"/>
-                  </a:schemeClr>
-                </a:solidFill>
-              </a:rPr>
-              <a:t>, E., Kettenbach, A.N., and Diederichs, S. (2019). R-</a:t>
-            </a:r>
-            <a:r>
-              <a:rPr lang="de-DE" sz="1200" dirty="0" err="1">
+              <a:t>Adapted from: Caudron-Herger, M., Rusin, S.F., Adamo, M.E., Seiler, J., Schmid, V.K., Barreau, E., Kettenbach, A.N., and Diederichs, S. (2019). R-</a:t>
+            </a:r>
+            <a:r>
+              <a:rPr lang="en-GB" sz="1200" noProof="0" dirty="0" err="1">
                 <a:solidFill>
                   <a:schemeClr val="bg1">
                     <a:lumMod val="65000"/>
@@ -11331,177 +9968,17 @@
               <a:t>DeeP</a:t>
             </a:r>
             <a:r>
-              <a:rPr lang="de-DE" sz="1200" dirty="0">
+              <a:rPr lang="en-GB" sz="1200" noProof="0" dirty="0">
                 <a:solidFill>
                   <a:schemeClr val="bg1">
                     <a:lumMod val="65000"/>
                   </a:schemeClr>
                 </a:solidFill>
               </a:rPr>
-              <a:t>: </a:t>
-            </a:r>
-            <a:r>
-              <a:rPr lang="de-DE" sz="1200" dirty="0" err="1">
-                <a:solidFill>
-                  <a:schemeClr val="bg1">
-                    <a:lumMod val="65000"/>
-                  </a:schemeClr>
-                </a:solidFill>
-              </a:rPr>
-              <a:t>Proteome-wide</a:t>
-            </a:r>
-            <a:r>
-              <a:rPr lang="de-DE" sz="1200" dirty="0">
-                <a:solidFill>
-                  <a:schemeClr val="bg1">
-                    <a:lumMod val="65000"/>
-                  </a:schemeClr>
-                </a:solidFill>
-              </a:rPr>
-              <a:t> and Quantitative </a:t>
-            </a:r>
-            <a:r>
-              <a:rPr lang="de-DE" sz="1200" dirty="0" err="1">
-                <a:solidFill>
-                  <a:schemeClr val="bg1">
-                    <a:lumMod val="65000"/>
-                  </a:schemeClr>
-                </a:solidFill>
-              </a:rPr>
-              <a:t>Identification</a:t>
-            </a:r>
-            <a:r>
-              <a:rPr lang="de-DE" sz="1200" dirty="0">
-                <a:solidFill>
-                  <a:schemeClr val="bg1">
-                    <a:lumMod val="65000"/>
-                  </a:schemeClr>
-                </a:solidFill>
-              </a:rPr>
-              <a:t> </a:t>
-            </a:r>
-            <a:r>
-              <a:rPr lang="de-DE" sz="1200" dirty="0" err="1">
-                <a:solidFill>
-                  <a:schemeClr val="bg1">
-                    <a:lumMod val="65000"/>
-                  </a:schemeClr>
-                </a:solidFill>
-              </a:rPr>
-              <a:t>of</a:t>
-            </a:r>
-            <a:r>
-              <a:rPr lang="de-DE" sz="1200" dirty="0">
-                <a:solidFill>
-                  <a:schemeClr val="bg1">
-                    <a:lumMod val="65000"/>
-                  </a:schemeClr>
-                </a:solidFill>
-              </a:rPr>
-              <a:t> RNA-</a:t>
-            </a:r>
-            <a:r>
-              <a:rPr lang="de-DE" sz="1200" dirty="0" err="1">
-                <a:solidFill>
-                  <a:schemeClr val="bg1">
-                    <a:lumMod val="65000"/>
-                  </a:schemeClr>
-                </a:solidFill>
-              </a:rPr>
-              <a:t>Dependent</a:t>
-            </a:r>
-            <a:r>
-              <a:rPr lang="de-DE" sz="1200" dirty="0">
-                <a:solidFill>
-                  <a:schemeClr val="bg1">
-                    <a:lumMod val="65000"/>
-                  </a:schemeClr>
-                </a:solidFill>
-              </a:rPr>
-              <a:t> Proteins </a:t>
-            </a:r>
-            <a:r>
-              <a:rPr lang="de-DE" sz="1200" dirty="0" err="1">
-                <a:solidFill>
-                  <a:schemeClr val="bg1">
-                    <a:lumMod val="65000"/>
-                  </a:schemeClr>
-                </a:solidFill>
-              </a:rPr>
-              <a:t>by</a:t>
-            </a:r>
-            <a:r>
-              <a:rPr lang="de-DE" sz="1200" dirty="0">
-                <a:solidFill>
-                  <a:schemeClr val="bg1">
-                    <a:lumMod val="65000"/>
-                  </a:schemeClr>
-                </a:solidFill>
-              </a:rPr>
-              <a:t> Density Gradient </a:t>
-            </a:r>
-            <a:r>
-              <a:rPr lang="de-DE" sz="1200" dirty="0" err="1">
-                <a:solidFill>
-                  <a:schemeClr val="bg1">
-                    <a:lumMod val="65000"/>
-                  </a:schemeClr>
-                </a:solidFill>
-              </a:rPr>
-              <a:t>Ultracentrifugation</a:t>
-            </a:r>
-            <a:r>
-              <a:rPr lang="de-DE" sz="1200" dirty="0">
-                <a:solidFill>
-                  <a:schemeClr val="bg1">
-                    <a:lumMod val="65000"/>
-                  </a:schemeClr>
-                </a:solidFill>
-              </a:rPr>
-              <a:t>. </a:t>
-            </a:r>
-            <a:r>
-              <a:rPr lang="de-DE" sz="1200" dirty="0" err="1">
-                <a:solidFill>
-                  <a:schemeClr val="bg1">
-                    <a:lumMod val="65000"/>
-                  </a:schemeClr>
-                </a:solidFill>
-              </a:rPr>
-              <a:t>Molecular</a:t>
-            </a:r>
-            <a:r>
-              <a:rPr lang="de-DE" sz="1200" dirty="0">
-                <a:solidFill>
-                  <a:schemeClr val="bg1">
-                    <a:lumMod val="65000"/>
-                  </a:schemeClr>
-                </a:solidFill>
-              </a:rPr>
-              <a:t> </a:t>
-            </a:r>
-            <a:r>
-              <a:rPr lang="de-DE" sz="1200" dirty="0" err="1">
-                <a:solidFill>
-                  <a:schemeClr val="bg1">
-                    <a:lumMod val="65000"/>
-                  </a:schemeClr>
-                </a:solidFill>
-              </a:rPr>
-              <a:t>Cell</a:t>
-            </a:r>
-            <a:r>
-              <a:rPr lang="de-DE" sz="1200" dirty="0">
-                <a:solidFill>
-                  <a:schemeClr val="bg1">
-                    <a:lumMod val="65000"/>
-                  </a:schemeClr>
-                </a:solidFill>
-              </a:rPr>
-              <a:t> </a:t>
-            </a:r>
-            <a:r>
-              <a:rPr lang="de-DE" sz="1200" i="1" dirty="0">
+              <a:t>: Proteome-wide and Quantitative Identification of RNA-Dependent Proteins by Density Gradient Ultracentrifugation. Molecular Cell </a:t>
+            </a:r>
+            <a:r>
+              <a:rPr lang="en-GB" sz="1200" i="1" noProof="0" dirty="0">
                 <a:solidFill>
                   <a:schemeClr val="bg1">
                     <a:lumMod val="65000"/>
@@ -11511,7 +9988,7 @@
               <a:t>75</a:t>
             </a:r>
             <a:r>
-              <a:rPr lang="de-DE" sz="1200" i="0" dirty="0">
+              <a:rPr lang="en-GB" sz="1200" i="0" noProof="0" dirty="0">
                 <a:solidFill>
                   <a:schemeClr val="bg1">
                     <a:lumMod val="65000"/>
@@ -11520,7 +9997,7 @@
               </a:rPr>
               <a:t>, 184-199.e110.</a:t>
             </a:r>
-            <a:endParaRPr lang="de-DE" sz="1200" dirty="0">
+            <a:endParaRPr lang="en-GB" sz="1200" noProof="0" dirty="0">
               <a:solidFill>
                 <a:schemeClr val="bg1">
                   <a:lumMod val="65000"/>
@@ -11560,7 +10037,7 @@
           </a:bodyPr>
           <a:lstStyle/>
           <a:p>
-            <a:endParaRPr lang="de-DE" dirty="0"/>
+            <a:endParaRPr lang="en-GB" noProof="0" dirty="0"/>
           </a:p>
         </p:txBody>
       </p:sp>
@@ -11920,36 +10397,8 @@
           <a:p>
             <a:pPr algn="ctr"/>
             <a:r>
-              <a:rPr lang="de-DE" dirty="0" err="1"/>
-              <a:t>Meaning</a:t>
-            </a:r>
-            <a:r>
-              <a:rPr lang="de-DE" dirty="0"/>
-              <a:t> </a:t>
-            </a:r>
-            <a:r>
-              <a:rPr lang="de-DE" dirty="0" err="1"/>
-              <a:t>of</a:t>
-            </a:r>
-            <a:r>
-              <a:rPr lang="de-DE" dirty="0"/>
-              <a:t> </a:t>
-            </a:r>
-            <a:r>
-              <a:rPr lang="de-DE" dirty="0" err="1"/>
-              <a:t>the</a:t>
-            </a:r>
-            <a:r>
-              <a:rPr lang="de-DE" dirty="0"/>
-              <a:t> </a:t>
-            </a:r>
-            <a:r>
-              <a:rPr lang="de-DE" dirty="0" err="1"/>
-              <a:t>shifts</a:t>
-            </a:r>
-            <a:r>
-              <a:rPr lang="de-DE" dirty="0"/>
-              <a:t>  </a:t>
+              <a:rPr lang="en-GB" noProof="0" dirty="0"/>
+              <a:t>Meaning of the shifts  </a:t>
             </a:r>
           </a:p>
         </p:txBody>
@@ -12030,12 +10479,8 @@
           <a:lstStyle/>
           <a:p>
             <a:r>
-              <a:rPr lang="de-DE" dirty="0" err="1"/>
-              <a:t>Left</a:t>
-            </a:r>
-            <a:r>
-              <a:rPr lang="de-DE" dirty="0"/>
-              <a:t> shift (1.)</a:t>
+              <a:rPr lang="en-GB" noProof="0" dirty="0"/>
+              <a:t>Left shift (1.)</a:t>
             </a:r>
           </a:p>
         </p:txBody>
@@ -12116,7 +10561,7 @@
           <a:lstStyle/>
           <a:p>
             <a:r>
-              <a:rPr lang="de-DE" dirty="0"/>
+              <a:rPr lang="en-GB" noProof="0" dirty="0"/>
               <a:t>Right shift (1.)</a:t>
             </a:r>
           </a:p>
@@ -12198,12 +10643,8 @@
           <a:lstStyle/>
           <a:p>
             <a:r>
-              <a:rPr lang="de-DE" dirty="0" err="1"/>
-              <a:t>No</a:t>
-            </a:r>
-            <a:r>
-              <a:rPr lang="de-DE" dirty="0"/>
-              <a:t> shift (3.)</a:t>
+              <a:rPr lang="en-GB" noProof="0" dirty="0"/>
+              <a:t>No shift (3.)</a:t>
             </a:r>
           </a:p>
         </p:txBody>
@@ -12284,7 +10725,7 @@
           <a:lstStyle/>
           <a:p>
             <a:r>
-              <a:rPr lang="de-DE" dirty="0"/>
+              <a:rPr lang="en-GB" noProof="0" dirty="0"/>
               <a:t>Partial shift (2.) </a:t>
             </a:r>
           </a:p>
@@ -12366,12 +10807,8 @@
           <a:lstStyle/>
           <a:p>
             <a:r>
-              <a:rPr lang="de-DE" dirty="0" err="1"/>
-              <a:t>Precipitated</a:t>
-            </a:r>
-            <a:r>
-              <a:rPr lang="de-DE" dirty="0"/>
-              <a:t> (1.)</a:t>
+              <a:rPr lang="en-GB" noProof="0" dirty="0"/>
+              <a:t>Precipitated (1.)</a:t>
             </a:r>
           </a:p>
         </p:txBody>
@@ -12410,77 +10847,35 @@
           <a:lstStyle/>
           <a:p>
             <a:r>
-              <a:rPr lang="de-DE" sz="2000" dirty="0"/>
-              <a:t>Classification </a:t>
-            </a:r>
-            <a:r>
-              <a:rPr lang="de-DE" sz="2000" dirty="0" err="1"/>
-              <a:t>of</a:t>
-            </a:r>
-            <a:r>
-              <a:rPr lang="de-DE" sz="2000" dirty="0"/>
-              <a:t> </a:t>
-            </a:r>
-            <a:r>
-              <a:rPr lang="de-DE" sz="2000" dirty="0" err="1"/>
-              <a:t>proteins</a:t>
-            </a:r>
-            <a:r>
-              <a:rPr lang="de-DE" sz="2000" dirty="0"/>
-              <a:t>:</a:t>
-            </a:r>
-          </a:p>
-          <a:p>
-            <a:endParaRPr lang="de-DE" sz="2000" dirty="0"/>
-          </a:p>
-          <a:p>
-            <a:r>
-              <a:rPr lang="de-DE" sz="2000" dirty="0"/>
-              <a:t>1. RNA-</a:t>
-            </a:r>
-            <a:r>
-              <a:rPr lang="de-DE" sz="2000" dirty="0" err="1"/>
-              <a:t>dependent</a:t>
-            </a:r>
-            <a:endParaRPr lang="de-DE" sz="2000" dirty="0"/>
-          </a:p>
-          <a:p>
-            <a:endParaRPr lang="de-DE" sz="800" dirty="0"/>
-          </a:p>
-          <a:p>
-            <a:r>
-              <a:rPr lang="de-DE" sz="2000" dirty="0"/>
-              <a:t>2. </a:t>
-            </a:r>
-            <a:r>
-              <a:rPr lang="de-DE" sz="2000" dirty="0" err="1"/>
-              <a:t>Partially</a:t>
-            </a:r>
-            <a:r>
-              <a:rPr lang="de-DE" sz="2000" dirty="0"/>
-              <a:t> RNA-</a:t>
-            </a:r>
-            <a:r>
-              <a:rPr lang="de-DE" sz="2000" dirty="0" err="1"/>
-              <a:t>dependent</a:t>
-            </a:r>
-            <a:endParaRPr lang="de-DE" sz="2000" dirty="0"/>
-          </a:p>
-          <a:p>
-            <a:endParaRPr lang="de-DE" sz="800" dirty="0"/>
-          </a:p>
-          <a:p>
-            <a:r>
-              <a:rPr lang="de-DE" sz="2000" dirty="0"/>
-              <a:t>3. Not RNA-</a:t>
-            </a:r>
-            <a:r>
-              <a:rPr lang="de-DE" sz="2000" dirty="0" err="1"/>
-              <a:t>dependent</a:t>
-            </a:r>
-            <a:r>
-              <a:rPr lang="de-DE" sz="2000" dirty="0"/>
-              <a:t> </a:t>
+              <a:rPr lang="en-GB" sz="2000" noProof="0" dirty="0"/>
+              <a:t>Classification of proteins:</a:t>
+            </a:r>
+          </a:p>
+          <a:p>
+            <a:endParaRPr lang="en-GB" sz="2000" noProof="0" dirty="0"/>
+          </a:p>
+          <a:p>
+            <a:r>
+              <a:rPr lang="en-GB" sz="2000" noProof="0" dirty="0"/>
+              <a:t>1. RNA-dependent</a:t>
+            </a:r>
+          </a:p>
+          <a:p>
+            <a:endParaRPr lang="en-GB" sz="800" noProof="0" dirty="0"/>
+          </a:p>
+          <a:p>
+            <a:r>
+              <a:rPr lang="en-GB" sz="2000" noProof="0" dirty="0"/>
+              <a:t>2. Partially RNA-dependent</a:t>
+            </a:r>
+          </a:p>
+          <a:p>
+            <a:endParaRPr lang="en-GB" sz="800" noProof="0" dirty="0"/>
+          </a:p>
+          <a:p>
+            <a:r>
+              <a:rPr lang="en-GB" sz="2000" noProof="0" dirty="0"/>
+              <a:t>3. Not RNA-dependent </a:t>
             </a:r>
           </a:p>
         </p:txBody>
@@ -12987,135 +11382,34 @@
           <a:lstStyle/>
           <a:p>
             <a:r>
-              <a:rPr lang="de-DE" sz="2000" dirty="0" err="1"/>
-              <a:t>Mass</a:t>
-            </a:r>
-            <a:r>
-              <a:rPr lang="de-DE" sz="2000" dirty="0"/>
-              <a:t> </a:t>
-            </a:r>
-            <a:r>
-              <a:rPr lang="de-DE" sz="2000" dirty="0" err="1"/>
-              <a:t>spectrometric</a:t>
-            </a:r>
-            <a:r>
-              <a:rPr lang="de-DE" sz="2000" dirty="0"/>
-              <a:t> quantitative </a:t>
-            </a:r>
-            <a:r>
-              <a:rPr lang="de-DE" sz="2000" dirty="0" err="1"/>
-              <a:t>results</a:t>
-            </a:r>
-            <a:r>
-              <a:rPr lang="de-DE" sz="2000" dirty="0"/>
-              <a:t> per </a:t>
-            </a:r>
-            <a:r>
-              <a:rPr lang="de-DE" sz="2000" dirty="0" err="1"/>
-              <a:t>protein</a:t>
-            </a:r>
-            <a:r>
-              <a:rPr lang="de-DE" sz="2000" dirty="0"/>
-              <a:t> per </a:t>
-            </a:r>
-            <a:r>
-              <a:rPr lang="de-DE" sz="2000" dirty="0" err="1"/>
-              <a:t>fraction</a:t>
-            </a:r>
-            <a:endParaRPr lang="de-DE" sz="2000" dirty="0"/>
+              <a:rPr lang="en-GB" sz="2000" noProof="0" dirty="0"/>
+              <a:t>Mass spectrometric quantitative results per protein per fraction</a:t>
+            </a:r>
           </a:p>
           <a:p>
             <a:pPr marL="0" indent="0">
               <a:buNone/>
             </a:pPr>
-            <a:endParaRPr lang="de-DE" sz="800" dirty="0"/>
-          </a:p>
-          <a:p>
-            <a:r>
-              <a:rPr lang="de-DE" sz="2000" dirty="0" err="1"/>
-              <a:t>Comparison</a:t>
-            </a:r>
-            <a:r>
-              <a:rPr lang="de-DE" sz="2000" dirty="0"/>
-              <a:t> </a:t>
-            </a:r>
-            <a:r>
-              <a:rPr lang="de-DE" sz="2000" dirty="0" err="1"/>
-              <a:t>of</a:t>
-            </a:r>
-            <a:r>
-              <a:rPr lang="de-DE" sz="2000" dirty="0"/>
-              <a:t> </a:t>
-            </a:r>
-            <a:r>
-              <a:rPr lang="de-DE" sz="2000" dirty="0" err="1"/>
-              <a:t>the</a:t>
-            </a:r>
-            <a:r>
-              <a:rPr lang="de-DE" sz="2000" dirty="0"/>
-              <a:t> </a:t>
-            </a:r>
-            <a:r>
-              <a:rPr lang="de-DE" sz="2000" dirty="0" err="1"/>
-              <a:t>occurence</a:t>
-            </a:r>
-            <a:r>
-              <a:rPr lang="de-DE" sz="2000" dirty="0"/>
-              <a:t> </a:t>
-            </a:r>
-            <a:r>
-              <a:rPr lang="de-DE" sz="2000" dirty="0" err="1"/>
-              <a:t>of</a:t>
-            </a:r>
-            <a:r>
-              <a:rPr lang="de-DE" sz="2000" dirty="0"/>
-              <a:t> </a:t>
-            </a:r>
-            <a:r>
-              <a:rPr lang="de-DE" sz="2000" dirty="0" err="1"/>
-              <a:t>proteins</a:t>
-            </a:r>
-            <a:r>
-              <a:rPr lang="de-DE" sz="2000" dirty="0"/>
-              <a:t> in different </a:t>
-            </a:r>
-            <a:r>
-              <a:rPr lang="de-DE" sz="2000" dirty="0" err="1"/>
-              <a:t>fractions</a:t>
-            </a:r>
-            <a:r>
-              <a:rPr lang="de-DE" sz="2000" dirty="0"/>
-              <a:t> </a:t>
-            </a:r>
-            <a:r>
-              <a:rPr lang="de-DE" sz="2000" dirty="0" err="1"/>
-              <a:t>of</a:t>
-            </a:r>
-            <a:r>
-              <a:rPr lang="de-DE" sz="2000" dirty="0"/>
-              <a:t> Control and </a:t>
-            </a:r>
-            <a:r>
-              <a:rPr lang="de-DE" sz="2000" dirty="0" err="1"/>
-              <a:t>RNase</a:t>
-            </a:r>
-            <a:r>
-              <a:rPr lang="de-DE" sz="2000" dirty="0"/>
-              <a:t> </a:t>
-            </a:r>
-          </a:p>
-          <a:p>
-            <a:endParaRPr lang="de-DE" sz="800" dirty="0"/>
-          </a:p>
-          <a:p>
-            <a:endParaRPr lang="de-DE" sz="800" dirty="0"/>
+            <a:endParaRPr lang="en-GB" sz="800" noProof="0" dirty="0"/>
+          </a:p>
+          <a:p>
+            <a:r>
+              <a:rPr lang="en-GB" sz="2000" noProof="0" dirty="0"/>
+              <a:t>Comparison of the occurrence of proteins in different fractions of Control and RNase </a:t>
+            </a:r>
+          </a:p>
+          <a:p>
+            <a:endParaRPr lang="en-GB" sz="800" noProof="0" dirty="0"/>
+          </a:p>
+          <a:p>
+            <a:endParaRPr lang="en-GB" sz="800" noProof="0" dirty="0"/>
           </a:p>
           <a:p>
             <a:pPr marL="0" indent="0">
               <a:buNone/>
             </a:pPr>
             <a:r>
-              <a:rPr lang="de-DE" b="1" dirty="0">
+              <a:rPr lang="en-GB" b="1" noProof="0" dirty="0">
                 <a:sym typeface="Wingdings" panose="05000000000000000000" pitchFamily="2" charset="2"/>
               </a:rPr>
               <a:t> </a:t>
@@ -13124,19 +11418,18 @@
               <a:rPr lang="en-GB" b="1" noProof="0" dirty="0"/>
               <a:t>Which proteins are RNA-dependent?</a:t>
             </a:r>
-            <a:endParaRPr lang="de-DE" b="1" dirty="0"/>
           </a:p>
           <a:p>
             <a:pPr marL="0" indent="0">
               <a:buNone/>
             </a:pPr>
-            <a:endParaRPr lang="de-DE" dirty="0"/>
+            <a:endParaRPr lang="en-GB" noProof="0" dirty="0"/>
           </a:p>
           <a:p>
             <a:pPr marL="0" indent="0">
               <a:buNone/>
             </a:pPr>
-            <a:endParaRPr lang="de-DE" dirty="0"/>
+            <a:endParaRPr lang="en-GB" noProof="0" dirty="0"/>
           </a:p>
         </p:txBody>
       </p:sp>
@@ -13252,24 +11545,8 @@
           <a:p>
             <a:pPr algn="ctr"/>
             <a:r>
-              <a:rPr lang="de-DE" sz="1400" dirty="0"/>
-              <a:t>Control and </a:t>
-            </a:r>
-            <a:r>
-              <a:rPr lang="de-DE" sz="1400" dirty="0" err="1"/>
-              <a:t>RNase</a:t>
-            </a:r>
-            <a:r>
-              <a:rPr lang="de-DE" sz="1400" dirty="0"/>
-              <a:t> </a:t>
-            </a:r>
-            <a:r>
-              <a:rPr lang="de-DE" sz="1400" dirty="0" err="1"/>
-              <a:t>fractions</a:t>
-            </a:r>
-            <a:r>
-              <a:rPr lang="de-DE" sz="1400" dirty="0"/>
-              <a:t> </a:t>
+              <a:rPr lang="en-GB" sz="1400" noProof="0" dirty="0"/>
+              <a:t>Control and RNase fractions </a:t>
             </a:r>
           </a:p>
         </p:txBody>
@@ -13303,7 +11580,7 @@
           <a:lstStyle/>
           <a:p>
             <a:r>
-              <a:rPr lang="de-DE" sz="1400" dirty="0"/>
+              <a:rPr lang="en-GB" sz="1400" noProof="0" dirty="0"/>
               <a:t>Different Proteins </a:t>
             </a:r>
           </a:p>
@@ -13338,7 +11615,7 @@
           <a:lstStyle/>
           <a:p>
             <a:r>
-              <a:rPr lang="de-DE" dirty="0"/>
+              <a:rPr lang="en-GB" noProof="0" dirty="0"/>
               <a:t>Dimension: 4765 x 150</a:t>
             </a:r>
           </a:p>
@@ -13372,52 +11649,8 @@
           <a:p>
             <a:pPr algn="ctr"/>
             <a:r>
-              <a:rPr lang="de-DE" dirty="0" err="1"/>
-              <a:t>What</a:t>
-            </a:r>
-            <a:r>
-              <a:rPr lang="de-DE" dirty="0"/>
-              <a:t> </a:t>
-            </a:r>
-            <a:r>
-              <a:rPr lang="de-DE" dirty="0" err="1"/>
-              <a:t>is</a:t>
-            </a:r>
-            <a:r>
-              <a:rPr lang="de-DE" dirty="0"/>
-              <a:t> </a:t>
-            </a:r>
-            <a:r>
-              <a:rPr lang="de-DE" dirty="0" err="1"/>
-              <a:t>our</a:t>
-            </a:r>
-            <a:r>
-              <a:rPr lang="de-DE" dirty="0"/>
-              <a:t> </a:t>
-            </a:r>
-            <a:r>
-              <a:rPr lang="de-DE" dirty="0" err="1"/>
-              <a:t>data</a:t>
-            </a:r>
-            <a:r>
-              <a:rPr lang="de-DE" dirty="0"/>
-              <a:t> </a:t>
-            </a:r>
-            <a:r>
-              <a:rPr lang="de-DE" dirty="0" err="1"/>
-              <a:t>set</a:t>
-            </a:r>
-            <a:r>
-              <a:rPr lang="de-DE" dirty="0"/>
-              <a:t> </a:t>
-            </a:r>
-            <a:r>
-              <a:rPr lang="de-DE" dirty="0" err="1"/>
-              <a:t>showing</a:t>
-            </a:r>
-            <a:r>
-              <a:rPr lang="de-DE" dirty="0"/>
-              <a:t>?  </a:t>
+              <a:rPr lang="en-GB" noProof="0" dirty="0"/>
+              <a:t>What is our data set showing?  </a:t>
             </a:r>
           </a:p>
         </p:txBody>
@@ -14368,29 +12601,14 @@
           <a:lstStyle/>
           <a:p>
             <a:r>
-              <a:rPr lang="en-GB" sz="1000" u="sng" noProof="0" dirty="0" err="1"/>
+              <a:rPr lang="en-US" sz="1000" u="sng" noProof="0" dirty="0" err="1"/>
               <a:t>Bioinfo</a:t>
             </a:r>
             <a:r>
-              <a:rPr lang="en-GB" sz="1000" u="sng" noProof="0" dirty="0"/>
-              <a:t>-Slides </a:t>
-            </a:r>
-            <a:r>
-              <a:rPr lang="en-GB" sz="1000" u="sng" noProof="0" dirty="0" err="1"/>
-              <a:t>aus</a:t>
-            </a:r>
-            <a:r>
-              <a:rPr lang="en-GB" sz="1000" u="sng" noProof="0" dirty="0"/>
-              <a:t> </a:t>
-            </a:r>
-            <a:r>
-              <a:rPr lang="en-GB" sz="1000" u="sng" noProof="0" dirty="0" err="1"/>
-              <a:t>dem</a:t>
-            </a:r>
-            <a:r>
-              <a:rPr lang="en-GB" sz="1000" u="sng" noProof="0" dirty="0"/>
-              <a:t> 3. Semester</a:t>
-            </a:r>
+              <a:rPr lang="en-US" sz="1000" u="sng" noProof="0" dirty="0"/>
+              <a:t> slides from the 3rd semester</a:t>
+            </a:r>
+            <a:endParaRPr lang="en-GB" sz="1000" u="sng" noProof="0" dirty="0"/>
           </a:p>
         </p:txBody>
       </p:sp>
@@ -14424,7 +12642,7 @@
           <a:p>
             <a:pPr algn="ctr"/>
             <a:r>
-              <a:rPr lang="de-DE" dirty="0"/>
+              <a:rPr lang="en-GB" noProof="0" dirty="0"/>
               <a:t>19.05.-25.05.</a:t>
             </a:r>
           </a:p>
@@ -15242,29 +13460,14 @@
           <a:lstStyle/>
           <a:p>
             <a:r>
-              <a:rPr lang="en-GB" sz="1000" u="sng" noProof="0" dirty="0" err="1"/>
+              <a:rPr lang="en-US" sz="1000" u="sng" noProof="0" dirty="0" err="1"/>
               <a:t>Bioinfo</a:t>
             </a:r>
             <a:r>
-              <a:rPr lang="en-GB" sz="1000" u="sng" noProof="0" dirty="0"/>
-              <a:t>-Slides </a:t>
-            </a:r>
-            <a:r>
-              <a:rPr lang="en-GB" sz="1000" u="sng" noProof="0" dirty="0" err="1"/>
-              <a:t>aus</a:t>
-            </a:r>
-            <a:r>
-              <a:rPr lang="en-GB" sz="1000" u="sng" noProof="0" dirty="0"/>
-              <a:t> </a:t>
-            </a:r>
-            <a:r>
-              <a:rPr lang="en-GB" sz="1000" u="sng" noProof="0" dirty="0" err="1"/>
-              <a:t>dem</a:t>
-            </a:r>
-            <a:r>
-              <a:rPr lang="en-GB" sz="1000" u="sng" noProof="0" dirty="0"/>
-              <a:t> 3. Semester</a:t>
-            </a:r>
+              <a:rPr lang="en-US" sz="1000" u="sng" noProof="0" dirty="0"/>
+              <a:t> slides from the 3rd semester</a:t>
+            </a:r>
+            <a:endParaRPr lang="en-GB" sz="1000" u="sng" noProof="0" dirty="0"/>
           </a:p>
         </p:txBody>
       </p:sp>
@@ -15298,7 +13501,7 @@
           <a:p>
             <a:pPr algn="ctr"/>
             <a:r>
-              <a:rPr lang="de-DE" dirty="0"/>
+              <a:rPr lang="en-GB" noProof="0" dirty="0"/>
               <a:t>26.05.-01.06.</a:t>
             </a:r>
           </a:p>
@@ -15945,14 +14148,13 @@
               </a:ext>
             </a:extLst>
           </a:blip>
-          <a:stretch>
-            <a:fillRect/>
-          </a:stretch>
+          <a:srcRect t="3086"/>
+          <a:stretch/>
         </p:blipFill>
         <p:spPr>
           <a:xfrm>
-            <a:off x="7239001" y="1650999"/>
-            <a:ext cx="4953000" cy="4664477"/>
+            <a:off x="7081299" y="1651001"/>
+            <a:ext cx="5110702" cy="4664476"/>
           </a:xfrm>
           <a:prstGeom prst="rect">
             <a:avLst/>
@@ -15981,13 +14183,13 @@
               </a:ext>
             </a:extLst>
           </a:blip>
-          <a:srcRect l="442"/>
+          <a:srcRect l="442" t="4961"/>
           <a:stretch/>
         </p:blipFill>
         <p:spPr>
           <a:xfrm>
-            <a:off x="6045201" y="1650999"/>
-            <a:ext cx="6062135" cy="4607908"/>
+            <a:off x="5796493" y="1707771"/>
+            <a:ext cx="6456887" cy="4664477"/>
           </a:xfrm>
           <a:prstGeom prst="rect">
             <a:avLst/>
@@ -16023,29 +14225,14 @@
           <a:lstStyle/>
           <a:p>
             <a:r>
-              <a:rPr lang="en-GB" sz="1000" u="sng" noProof="0" dirty="0" err="1"/>
+              <a:rPr lang="en-US" sz="1000" u="sng" noProof="0" dirty="0" err="1"/>
               <a:t>Bioinfo</a:t>
             </a:r>
             <a:r>
-              <a:rPr lang="en-GB" sz="1000" u="sng" noProof="0" dirty="0"/>
-              <a:t>-Slides </a:t>
-            </a:r>
-            <a:r>
-              <a:rPr lang="en-GB" sz="1000" u="sng" noProof="0" dirty="0" err="1"/>
-              <a:t>aus</a:t>
-            </a:r>
-            <a:r>
-              <a:rPr lang="en-GB" sz="1000" u="sng" noProof="0" dirty="0"/>
-              <a:t> </a:t>
-            </a:r>
-            <a:r>
-              <a:rPr lang="en-GB" sz="1000" u="sng" noProof="0" dirty="0" err="1"/>
-              <a:t>dem</a:t>
-            </a:r>
-            <a:r>
-              <a:rPr lang="en-GB" sz="1000" u="sng" noProof="0" dirty="0"/>
-              <a:t> 3. Semester</a:t>
-            </a:r>
+              <a:rPr lang="en-US" sz="1000" u="sng" noProof="0" dirty="0"/>
+              <a:t> slides from the 3rd semester</a:t>
+            </a:r>
+            <a:endParaRPr lang="en-GB" sz="1000" u="sng" noProof="0" dirty="0"/>
           </a:p>
         </p:txBody>
       </p:sp>
@@ -16079,7 +14266,7 @@
           <a:p>
             <a:pPr algn="ctr"/>
             <a:r>
-              <a:rPr lang="de-DE" dirty="0"/>
+              <a:rPr lang="en-GB" noProof="0" dirty="0"/>
               <a:t>02.06.-15.06.</a:t>
             </a:r>
           </a:p>

</xml_diff>